<commit_message>
part 0 added and ppt modified
</commit_message>
<xml_diff>
--- a/max-labs.pptx
+++ b/max-labs.pptx
@@ -5,7 +5,7 @@
     <p:sldMasterId id="2147483648" r:id="rId1"/>
   </p:sldMasterIdLst>
   <p:notesMasterIdLst>
-    <p:notesMasterId r:id="rId26"/>
+    <p:notesMasterId r:id="rId28"/>
   </p:notesMasterIdLst>
   <p:sldIdLst>
     <p:sldId id="276" r:id="rId2"/>
@@ -16,22 +16,24 @@
     <p:sldId id="279" r:id="rId7"/>
     <p:sldId id="280" r:id="rId8"/>
     <p:sldId id="282" r:id="rId9"/>
-    <p:sldId id="263" r:id="rId10"/>
-    <p:sldId id="258" r:id="rId11"/>
-    <p:sldId id="259" r:id="rId12"/>
-    <p:sldId id="260" r:id="rId13"/>
-    <p:sldId id="264" r:id="rId14"/>
-    <p:sldId id="261" r:id="rId15"/>
-    <p:sldId id="266" r:id="rId16"/>
-    <p:sldId id="267" r:id="rId17"/>
-    <p:sldId id="269" r:id="rId18"/>
-    <p:sldId id="268" r:id="rId19"/>
-    <p:sldId id="265" r:id="rId20"/>
-    <p:sldId id="262" r:id="rId21"/>
-    <p:sldId id="270" r:id="rId22"/>
-    <p:sldId id="271" r:id="rId23"/>
-    <p:sldId id="272" r:id="rId24"/>
-    <p:sldId id="277" r:id="rId25"/>
+    <p:sldId id="283" r:id="rId10"/>
+    <p:sldId id="263" r:id="rId11"/>
+    <p:sldId id="258" r:id="rId12"/>
+    <p:sldId id="259" r:id="rId13"/>
+    <p:sldId id="260" r:id="rId14"/>
+    <p:sldId id="264" r:id="rId15"/>
+    <p:sldId id="261" r:id="rId16"/>
+    <p:sldId id="266" r:id="rId17"/>
+    <p:sldId id="267" r:id="rId18"/>
+    <p:sldId id="269" r:id="rId19"/>
+    <p:sldId id="268" r:id="rId20"/>
+    <p:sldId id="265" r:id="rId21"/>
+    <p:sldId id="262" r:id="rId22"/>
+    <p:sldId id="270" r:id="rId23"/>
+    <p:sldId id="271" r:id="rId24"/>
+    <p:sldId id="272" r:id="rId25"/>
+    <p:sldId id="277" r:id="rId26"/>
+    <p:sldId id="284" r:id="rId27"/>
   </p:sldIdLst>
   <p:sldSz cx="12192000" cy="6858000"/>
   <p:notesSz cx="6858000" cy="9144000"/>
@@ -645,7 +647,7 @@
     </p:spTree>
     <p:extLst>
       <p:ext uri="{BB962C8B-B14F-4D97-AF65-F5344CB8AC3E}">
-        <p14:creationId xmlns:p14="http://schemas.microsoft.com/office/powerpoint/2010/main" val="2746921390"/>
+        <p14:creationId xmlns:p14="http://schemas.microsoft.com/office/powerpoint/2010/main" val="1109416630"/>
       </p:ext>
     </p:extLst>
   </p:cSld>
@@ -729,7 +731,7 @@
     </p:spTree>
     <p:extLst>
       <p:ext uri="{BB962C8B-B14F-4D97-AF65-F5344CB8AC3E}">
-        <p14:creationId xmlns:p14="http://schemas.microsoft.com/office/powerpoint/2010/main" val="172430023"/>
+        <p14:creationId xmlns:p14="http://schemas.microsoft.com/office/powerpoint/2010/main" val="2746921390"/>
       </p:ext>
     </p:extLst>
   </p:cSld>
@@ -813,7 +815,7 @@
     </p:spTree>
     <p:extLst>
       <p:ext uri="{BB962C8B-B14F-4D97-AF65-F5344CB8AC3E}">
-        <p14:creationId xmlns:p14="http://schemas.microsoft.com/office/powerpoint/2010/main" val="3132330181"/>
+        <p14:creationId xmlns:p14="http://schemas.microsoft.com/office/powerpoint/2010/main" val="172430023"/>
       </p:ext>
     </p:extLst>
   </p:cSld>
@@ -897,7 +899,7 @@
     </p:spTree>
     <p:extLst>
       <p:ext uri="{BB962C8B-B14F-4D97-AF65-F5344CB8AC3E}">
-        <p14:creationId xmlns:p14="http://schemas.microsoft.com/office/powerpoint/2010/main" val="599897455"/>
+        <p14:creationId xmlns:p14="http://schemas.microsoft.com/office/powerpoint/2010/main" val="3132330181"/>
       </p:ext>
     </p:extLst>
   </p:cSld>
@@ -981,7 +983,7 @@
     </p:spTree>
     <p:extLst>
       <p:ext uri="{BB962C8B-B14F-4D97-AF65-F5344CB8AC3E}">
-        <p14:creationId xmlns:p14="http://schemas.microsoft.com/office/powerpoint/2010/main" val="3188157379"/>
+        <p14:creationId xmlns:p14="http://schemas.microsoft.com/office/powerpoint/2010/main" val="599897455"/>
       </p:ext>
     </p:extLst>
   </p:cSld>
@@ -1065,7 +1067,7 @@
     </p:spTree>
     <p:extLst>
       <p:ext uri="{BB962C8B-B14F-4D97-AF65-F5344CB8AC3E}">
-        <p14:creationId xmlns:p14="http://schemas.microsoft.com/office/powerpoint/2010/main" val="812202392"/>
+        <p14:creationId xmlns:p14="http://schemas.microsoft.com/office/powerpoint/2010/main" val="3188157379"/>
       </p:ext>
     </p:extLst>
   </p:cSld>
@@ -1149,7 +1151,7 @@
     </p:spTree>
     <p:extLst>
       <p:ext uri="{BB962C8B-B14F-4D97-AF65-F5344CB8AC3E}">
-        <p14:creationId xmlns:p14="http://schemas.microsoft.com/office/powerpoint/2010/main" val="1903802874"/>
+        <p14:creationId xmlns:p14="http://schemas.microsoft.com/office/powerpoint/2010/main" val="812202392"/>
       </p:ext>
     </p:extLst>
   </p:cSld>
@@ -1233,7 +1235,7 @@
     </p:spTree>
     <p:extLst>
       <p:ext uri="{BB962C8B-B14F-4D97-AF65-F5344CB8AC3E}">
-        <p14:creationId xmlns:p14="http://schemas.microsoft.com/office/powerpoint/2010/main" val="3196501524"/>
+        <p14:creationId xmlns:p14="http://schemas.microsoft.com/office/powerpoint/2010/main" val="1903802874"/>
       </p:ext>
     </p:extLst>
   </p:cSld>
@@ -1317,7 +1319,7 @@
     </p:spTree>
     <p:extLst>
       <p:ext uri="{BB962C8B-B14F-4D97-AF65-F5344CB8AC3E}">
-        <p14:creationId xmlns:p14="http://schemas.microsoft.com/office/powerpoint/2010/main" val="1293226978"/>
+        <p14:creationId xmlns:p14="http://schemas.microsoft.com/office/powerpoint/2010/main" val="3196501524"/>
       </p:ext>
     </p:extLst>
   </p:cSld>
@@ -1401,7 +1403,7 @@
     </p:spTree>
     <p:extLst>
       <p:ext uri="{BB962C8B-B14F-4D97-AF65-F5344CB8AC3E}">
-        <p14:creationId xmlns:p14="http://schemas.microsoft.com/office/powerpoint/2010/main" val="2457669165"/>
+        <p14:creationId xmlns:p14="http://schemas.microsoft.com/office/powerpoint/2010/main" val="1293226978"/>
       </p:ext>
     </p:extLst>
   </p:cSld>
@@ -1569,7 +1571,7 @@
     </p:spTree>
     <p:extLst>
       <p:ext uri="{BB962C8B-B14F-4D97-AF65-F5344CB8AC3E}">
-        <p14:creationId xmlns:p14="http://schemas.microsoft.com/office/powerpoint/2010/main" val="2736274450"/>
+        <p14:creationId xmlns:p14="http://schemas.microsoft.com/office/powerpoint/2010/main" val="2457669165"/>
       </p:ext>
     </p:extLst>
   </p:cSld>
@@ -1653,7 +1655,7 @@
     </p:spTree>
     <p:extLst>
       <p:ext uri="{BB962C8B-B14F-4D97-AF65-F5344CB8AC3E}">
-        <p14:creationId xmlns:p14="http://schemas.microsoft.com/office/powerpoint/2010/main" val="3122525664"/>
+        <p14:creationId xmlns:p14="http://schemas.microsoft.com/office/powerpoint/2010/main" val="2736274450"/>
       </p:ext>
     </p:extLst>
   </p:cSld>
@@ -1737,7 +1739,7 @@
     </p:spTree>
     <p:extLst>
       <p:ext uri="{BB962C8B-B14F-4D97-AF65-F5344CB8AC3E}">
-        <p14:creationId xmlns:p14="http://schemas.microsoft.com/office/powerpoint/2010/main" val="1039659132"/>
+        <p14:creationId xmlns:p14="http://schemas.microsoft.com/office/powerpoint/2010/main" val="3122525664"/>
       </p:ext>
     </p:extLst>
   </p:cSld>
@@ -1821,7 +1823,7 @@
     </p:spTree>
     <p:extLst>
       <p:ext uri="{BB962C8B-B14F-4D97-AF65-F5344CB8AC3E}">
-        <p14:creationId xmlns:p14="http://schemas.microsoft.com/office/powerpoint/2010/main" val="718445899"/>
+        <p14:creationId xmlns:p14="http://schemas.microsoft.com/office/powerpoint/2010/main" val="1039659132"/>
       </p:ext>
     </p:extLst>
   </p:cSld>
@@ -1905,7 +1907,175 @@
     </p:spTree>
     <p:extLst>
       <p:ext uri="{BB962C8B-B14F-4D97-AF65-F5344CB8AC3E}">
+        <p14:creationId xmlns:p14="http://schemas.microsoft.com/office/powerpoint/2010/main" val="718445899"/>
+      </p:ext>
+    </p:extLst>
+  </p:cSld>
+  <p:clrMapOvr>
+    <a:masterClrMapping/>
+  </p:clrMapOvr>
+</p:notes>
+</file>
+
+<file path=ppt/notesSlides/notesSlide25.xml><?xml version="1.0" encoding="utf-8"?>
+<p:notes xmlns:a="http://schemas.openxmlformats.org/drawingml/2006/main" xmlns:r="http://schemas.openxmlformats.org/officeDocument/2006/relationships" xmlns:p="http://schemas.openxmlformats.org/presentationml/2006/main">
+  <p:cSld>
+    <p:spTree>
+      <p:nvGrpSpPr>
+        <p:cNvPr id="1" name=""/>
+        <p:cNvGrpSpPr/>
+        <p:nvPr/>
+      </p:nvGrpSpPr>
+      <p:grpSpPr>
+        <a:xfrm>
+          <a:off x="0" y="0"/>
+          <a:ext cx="0" cy="0"/>
+          <a:chOff x="0" y="0"/>
+          <a:chExt cx="0" cy="0"/>
+        </a:xfrm>
+      </p:grpSpPr>
+      <p:sp>
+        <p:nvSpPr>
+          <p:cNvPr id="2" name="Slide Image Placeholder 1"/>
+          <p:cNvSpPr>
+            <a:spLocks noGrp="1" noRot="1" noChangeAspect="1"/>
+          </p:cNvSpPr>
+          <p:nvPr>
+            <p:ph type="sldImg"/>
+          </p:nvPr>
+        </p:nvSpPr>
+        <p:spPr/>
+      </p:sp>
+      <p:sp>
+        <p:nvSpPr>
+          <p:cNvPr id="3" name="Notes Placeholder 2"/>
+          <p:cNvSpPr>
+            <a:spLocks noGrp="1"/>
+          </p:cNvSpPr>
+          <p:nvPr>
+            <p:ph type="body" idx="1"/>
+          </p:nvPr>
+        </p:nvSpPr>
+        <p:spPr/>
+        <p:txBody>
+          <a:bodyPr/>
+          <a:lstStyle/>
+          <a:p>
+            <a:endParaRPr lang="en-US" dirty="0"/>
+          </a:p>
+        </p:txBody>
+      </p:sp>
+      <p:sp>
+        <p:nvSpPr>
+          <p:cNvPr id="4" name="Slide Number Placeholder 3"/>
+          <p:cNvSpPr>
+            <a:spLocks noGrp="1"/>
+          </p:cNvSpPr>
+          <p:nvPr>
+            <p:ph type="sldNum" sz="quarter" idx="10"/>
+          </p:nvPr>
+        </p:nvSpPr>
+        <p:spPr/>
+        <p:txBody>
+          <a:bodyPr/>
+          <a:lstStyle/>
+          <a:p>
+            <a:fld id="{031E4353-AF47-7A45-BFA8-F4B4B41541BF}" type="slidenum">
+              <a:rPr lang="en-US" smtClean="0"/>
+              <a:t>25</a:t>
+            </a:fld>
+            <a:endParaRPr lang="en-US" dirty="0"/>
+          </a:p>
+        </p:txBody>
+      </p:sp>
+    </p:spTree>
+    <p:extLst>
+      <p:ext uri="{BB962C8B-B14F-4D97-AF65-F5344CB8AC3E}">
         <p14:creationId xmlns:p14="http://schemas.microsoft.com/office/powerpoint/2010/main" val="3795293371"/>
+      </p:ext>
+    </p:extLst>
+  </p:cSld>
+  <p:clrMapOvr>
+    <a:masterClrMapping/>
+  </p:clrMapOvr>
+</p:notes>
+</file>
+
+<file path=ppt/notesSlides/notesSlide26.xml><?xml version="1.0" encoding="utf-8"?>
+<p:notes xmlns:a="http://schemas.openxmlformats.org/drawingml/2006/main" xmlns:r="http://schemas.openxmlformats.org/officeDocument/2006/relationships" xmlns:p="http://schemas.openxmlformats.org/presentationml/2006/main">
+  <p:cSld>
+    <p:spTree>
+      <p:nvGrpSpPr>
+        <p:cNvPr id="1" name=""/>
+        <p:cNvGrpSpPr/>
+        <p:nvPr/>
+      </p:nvGrpSpPr>
+      <p:grpSpPr>
+        <a:xfrm>
+          <a:off x="0" y="0"/>
+          <a:ext cx="0" cy="0"/>
+          <a:chOff x="0" y="0"/>
+          <a:chExt cx="0" cy="0"/>
+        </a:xfrm>
+      </p:grpSpPr>
+      <p:sp>
+        <p:nvSpPr>
+          <p:cNvPr id="2" name="Slide Image Placeholder 1"/>
+          <p:cNvSpPr>
+            <a:spLocks noGrp="1" noRot="1" noChangeAspect="1"/>
+          </p:cNvSpPr>
+          <p:nvPr>
+            <p:ph type="sldImg"/>
+          </p:nvPr>
+        </p:nvSpPr>
+        <p:spPr/>
+      </p:sp>
+      <p:sp>
+        <p:nvSpPr>
+          <p:cNvPr id="3" name="Notes Placeholder 2"/>
+          <p:cNvSpPr>
+            <a:spLocks noGrp="1"/>
+          </p:cNvSpPr>
+          <p:nvPr>
+            <p:ph type="body" idx="1"/>
+          </p:nvPr>
+        </p:nvSpPr>
+        <p:spPr/>
+        <p:txBody>
+          <a:bodyPr/>
+          <a:lstStyle/>
+          <a:p>
+            <a:endParaRPr lang="en-US" dirty="0"/>
+          </a:p>
+        </p:txBody>
+      </p:sp>
+      <p:sp>
+        <p:nvSpPr>
+          <p:cNvPr id="4" name="Slide Number Placeholder 3"/>
+          <p:cNvSpPr>
+            <a:spLocks noGrp="1"/>
+          </p:cNvSpPr>
+          <p:nvPr>
+            <p:ph type="sldNum" sz="quarter" idx="10"/>
+          </p:nvPr>
+        </p:nvSpPr>
+        <p:spPr/>
+        <p:txBody>
+          <a:bodyPr/>
+          <a:lstStyle/>
+          <a:p>
+            <a:fld id="{031E4353-AF47-7A45-BFA8-F4B4B41541BF}" type="slidenum">
+              <a:rPr lang="en-US" smtClean="0"/>
+              <a:t>26</a:t>
+            </a:fld>
+            <a:endParaRPr lang="en-US" dirty="0"/>
+          </a:p>
+        </p:txBody>
+      </p:sp>
+    </p:spTree>
+    <p:extLst>
+      <p:ext uri="{BB962C8B-B14F-4D97-AF65-F5344CB8AC3E}">
+        <p14:creationId xmlns:p14="http://schemas.microsoft.com/office/powerpoint/2010/main" val="3448323828"/>
       </p:ext>
     </p:extLst>
   </p:cSld>
@@ -2493,7 +2663,7 @@
     </p:spTree>
     <p:extLst>
       <p:ext uri="{BB962C8B-B14F-4D97-AF65-F5344CB8AC3E}">
-        <p14:creationId xmlns:p14="http://schemas.microsoft.com/office/powerpoint/2010/main" val="1109416630"/>
+        <p14:creationId xmlns:p14="http://schemas.microsoft.com/office/powerpoint/2010/main" val="854397015"/>
       </p:ext>
     </p:extLst>
   </p:cSld>
@@ -5300,7 +5470,7 @@
           <a:p>
             <a:fld id="{5C2624FC-1444-B647-AD6C-82E24AD25842}" type="datetimeFigureOut">
               <a:rPr lang="en-US" smtClean="0"/>
-              <a:t>10/24/19</a:t>
+              <a:t>10/28/19</a:t>
             </a:fld>
             <a:endParaRPr lang="en-US" dirty="0"/>
           </a:p>
@@ -5393,6 +5563,146 @@
               <a:t>‹#›</a:t>
             </a:fld>
             <a:endParaRPr lang="en-US" dirty="0"/>
+          </a:p>
+        </p:txBody>
+      </p:sp>
+      <p:sp>
+        <p:nvSpPr>
+          <p:cNvPr id="7" name="TextBox 6">
+            <a:extLst>
+              <a:ext uri="{FF2B5EF4-FFF2-40B4-BE49-F238E27FC236}">
+                <a16:creationId xmlns:a16="http://schemas.microsoft.com/office/drawing/2014/main" id="{809DF65F-9D63-FF4C-8B8E-8CE0A18BA298}"/>
+              </a:ext>
+            </a:extLst>
+          </p:cNvPr>
+          <p:cNvSpPr txBox="1"/>
+          <p:nvPr userDrawn="1"/>
+        </p:nvSpPr>
+        <p:spPr>
+          <a:xfrm>
+            <a:off x="104553" y="32440"/>
+            <a:ext cx="3680637" cy="276999"/>
+          </a:xfrm>
+          <a:prstGeom prst="rect">
+            <a:avLst/>
+          </a:prstGeom>
+          <a:noFill/>
+        </p:spPr>
+        <p:txBody>
+          <a:bodyPr wrap="square" rtlCol="0">
+            <a:spAutoFit/>
+          </a:bodyPr>
+          <a:lstStyle/>
+          <a:p>
+            <a:pPr marL="0" marR="0" lvl="0" indent="0" algn="l" defTabSz="914400" rtl="0" eaLnBrk="1" fontAlgn="auto" latinLnBrk="0" hangingPunct="1">
+              <a:lnSpc>
+                <a:spcPct val="100000"/>
+              </a:lnSpc>
+              <a:spcBef>
+                <a:spcPts val="0"/>
+              </a:spcBef>
+              <a:spcAft>
+                <a:spcPts val="0"/>
+              </a:spcAft>
+              <a:buClrTx/>
+              <a:buSzTx/>
+              <a:buFontTx/>
+              <a:buNone/>
+              <a:tabLst/>
+              <a:defRPr/>
+            </a:pPr>
+            <a:r>
+              <a:rPr lang="en-US" sz="1200" dirty="0">
+                <a:solidFill>
+                  <a:schemeClr val="tx1"/>
+                </a:solidFill>
+              </a:rPr>
+              <a:t>Follow along: </a:t>
+            </a:r>
+            <a:r>
+              <a:rPr lang="en-US" sz="1200" dirty="0">
+                <a:solidFill>
+                  <a:schemeClr val="tx1"/>
+                </a:solidFill>
+                <a:hlinkClick r:id="rId13"/>
+              </a:rPr>
+              <a:t>https://adobe.ly/xdapi</a:t>
+            </a:r>
+            <a:endParaRPr lang="en-US" sz="1200" dirty="0">
+              <a:solidFill>
+                <a:schemeClr val="tx1"/>
+              </a:solidFill>
+            </a:endParaRPr>
+          </a:p>
+        </p:txBody>
+      </p:sp>
+      <p:sp>
+        <p:nvSpPr>
+          <p:cNvPr id="8" name="TextBox 7">
+            <a:extLst>
+              <a:ext uri="{FF2B5EF4-FFF2-40B4-BE49-F238E27FC236}">
+                <a16:creationId xmlns:a16="http://schemas.microsoft.com/office/drawing/2014/main" id="{2A62710A-60CD-BB4A-9920-619D6FE75F57}"/>
+              </a:ext>
+            </a:extLst>
+          </p:cNvPr>
+          <p:cNvSpPr txBox="1"/>
+          <p:nvPr userDrawn="1"/>
+        </p:nvSpPr>
+        <p:spPr>
+          <a:xfrm>
+            <a:off x="6025117" y="16763"/>
+            <a:ext cx="6166883" cy="276999"/>
+          </a:xfrm>
+          <a:prstGeom prst="rect">
+            <a:avLst/>
+          </a:prstGeom>
+          <a:noFill/>
+        </p:spPr>
+        <p:txBody>
+          <a:bodyPr wrap="square" rtlCol="0">
+            <a:spAutoFit/>
+          </a:bodyPr>
+          <a:lstStyle/>
+          <a:p>
+            <a:pPr marL="0" marR="0" lvl="0" indent="0" algn="r" defTabSz="914400" rtl="0" eaLnBrk="1" fontAlgn="auto" latinLnBrk="0" hangingPunct="1">
+              <a:lnSpc>
+                <a:spcPct val="100000"/>
+              </a:lnSpc>
+              <a:spcBef>
+                <a:spcPts val="0"/>
+              </a:spcBef>
+              <a:spcAft>
+                <a:spcPts val="0"/>
+              </a:spcAft>
+              <a:buClrTx/>
+              <a:buSzTx/>
+              <a:buFontTx/>
+              <a:buNone/>
+              <a:tabLst/>
+              <a:defRPr/>
+            </a:pPr>
+            <a:r>
+              <a:rPr lang="en-US" sz="1200" dirty="0">
+                <a:solidFill>
+                  <a:schemeClr val="tx1"/>
+                </a:solidFill>
+              </a:rPr>
+              <a:t>XD API Labs at 11am &amp; 4pm RSVP: </a:t>
+            </a:r>
+            <a:r>
+              <a:rPr lang="en-US" sz="1200" dirty="0">
+                <a:solidFill>
+                  <a:schemeClr val="tx1"/>
+                </a:solidFill>
+                <a:hlinkClick r:id="rId14"/>
+              </a:rPr>
+              <a:t>https://adobe.ly/xdlabs</a:t>
+            </a:r>
+            <a:endParaRPr lang="en-US" sz="1200" dirty="0">
+              <a:solidFill>
+                <a:schemeClr val="tx1"/>
+              </a:solidFill>
+            </a:endParaRPr>
           </a:p>
         </p:txBody>
       </p:sp>
@@ -5824,6 +6134,403 @@
                   </a:schemeClr>
                 </a:solidFill>
               </a:rPr>
+              <a:t>Create a Rectangle Instance</a:t>
+            </a:r>
+          </a:p>
+        </p:txBody>
+      </p:sp>
+      <p:sp>
+        <p:nvSpPr>
+          <p:cNvPr id="5" name="Down Arrow 4">
+            <a:extLst>
+              <a:ext uri="{FF2B5EF4-FFF2-40B4-BE49-F238E27FC236}">
+                <a16:creationId xmlns:a16="http://schemas.microsoft.com/office/drawing/2014/main" id="{948CEE77-B360-DE4B-8F69-6918DE6A523A}"/>
+              </a:ext>
+            </a:extLst>
+          </p:cNvPr>
+          <p:cNvSpPr/>
+          <p:nvPr/>
+        </p:nvSpPr>
+        <p:spPr>
+          <a:xfrm>
+            <a:off x="5420139" y="2984329"/>
+            <a:ext cx="1351722" cy="1417983"/>
+          </a:xfrm>
+          <a:prstGeom prst="downArrow">
+            <a:avLst/>
+          </a:prstGeom>
+        </p:spPr>
+        <p:style>
+          <a:lnRef idx="2">
+            <a:schemeClr val="accent1">
+              <a:shade val="50000"/>
+            </a:schemeClr>
+          </a:lnRef>
+          <a:fillRef idx="1">
+            <a:schemeClr val="accent1"/>
+          </a:fillRef>
+          <a:effectRef idx="0">
+            <a:schemeClr val="accent1"/>
+          </a:effectRef>
+          <a:fontRef idx="minor">
+            <a:schemeClr val="lt1"/>
+          </a:fontRef>
+        </p:style>
+        <p:txBody>
+          <a:bodyPr rtlCol="0" anchor="ctr"/>
+          <a:lstStyle/>
+          <a:p>
+            <a:pPr algn="ctr"/>
+            <a:endParaRPr lang="en-US" dirty="0"/>
+          </a:p>
+        </p:txBody>
+      </p:sp>
+      <p:sp>
+        <p:nvSpPr>
+          <p:cNvPr id="12" name="Rectangle 11">
+            <a:extLst>
+              <a:ext uri="{FF2B5EF4-FFF2-40B4-BE49-F238E27FC236}">
+                <a16:creationId xmlns:a16="http://schemas.microsoft.com/office/drawing/2014/main" id="{4202D67D-925A-8E46-A725-492B9933C266}"/>
+              </a:ext>
+            </a:extLst>
+          </p:cNvPr>
+          <p:cNvSpPr/>
+          <p:nvPr/>
+        </p:nvSpPr>
+        <p:spPr>
+          <a:xfrm>
+            <a:off x="5254394" y="4717770"/>
+            <a:ext cx="1828800" cy="1828800"/>
+          </a:xfrm>
+          <a:prstGeom prst="rect">
+            <a:avLst/>
+          </a:prstGeom>
+          <a:noFill/>
+        </p:spPr>
+        <p:style>
+          <a:lnRef idx="2">
+            <a:schemeClr val="accent1">
+              <a:shade val="50000"/>
+            </a:schemeClr>
+          </a:lnRef>
+          <a:fillRef idx="1">
+            <a:schemeClr val="accent1"/>
+          </a:fillRef>
+          <a:effectRef idx="0">
+            <a:schemeClr val="accent1"/>
+          </a:effectRef>
+          <a:fontRef idx="minor">
+            <a:schemeClr val="lt1"/>
+          </a:fontRef>
+        </p:style>
+        <p:txBody>
+          <a:bodyPr rtlCol="0" anchor="ctr"/>
+          <a:lstStyle/>
+          <a:p>
+            <a:pPr algn="ctr"/>
+            <a:endParaRPr lang="en-US" dirty="0"/>
+          </a:p>
+        </p:txBody>
+      </p:sp>
+      <p:sp>
+        <p:nvSpPr>
+          <p:cNvPr id="13" name="Rectangle 12">
+            <a:extLst>
+              <a:ext uri="{FF2B5EF4-FFF2-40B4-BE49-F238E27FC236}">
+                <a16:creationId xmlns:a16="http://schemas.microsoft.com/office/drawing/2014/main" id="{A4F5ACA1-F995-4E4E-BAD4-9487E1E92CE1}"/>
+              </a:ext>
+            </a:extLst>
+          </p:cNvPr>
+          <p:cNvSpPr/>
+          <p:nvPr/>
+        </p:nvSpPr>
+        <p:spPr>
+          <a:xfrm>
+            <a:off x="1895061" y="1191543"/>
+            <a:ext cx="8401878" cy="1477328"/>
+          </a:xfrm>
+          <a:prstGeom prst="rect">
+            <a:avLst/>
+          </a:prstGeom>
+        </p:spPr>
+        <p:txBody>
+          <a:bodyPr wrap="square">
+            <a:spAutoFit/>
+          </a:bodyPr>
+          <a:lstStyle/>
+          <a:p>
+            <a:r>
+              <a:rPr lang="en-US" sz="3000" dirty="0">
+                <a:solidFill>
+                  <a:srgbClr val="569CD6"/>
+                </a:solidFill>
+                <a:latin typeface="Menlo" panose="020B0609030804020204" pitchFamily="49" charset="0"/>
+              </a:rPr>
+              <a:t>const</a:t>
+            </a:r>
+            <a:r>
+              <a:rPr lang="en-US" sz="3000" dirty="0">
+                <a:solidFill>
+                  <a:srgbClr val="D4D4D4"/>
+                </a:solidFill>
+                <a:latin typeface="Menlo" panose="020B0609030804020204" pitchFamily="49" charset="0"/>
+              </a:rPr>
+              <a:t> </a:t>
+            </a:r>
+            <a:r>
+              <a:rPr lang="en-US" sz="3000" dirty="0">
+                <a:solidFill>
+                  <a:schemeClr val="accent1">
+                    <a:lumMod val="75000"/>
+                  </a:schemeClr>
+                </a:solidFill>
+                <a:latin typeface="Menlo" panose="020B0609030804020204" pitchFamily="49" charset="0"/>
+              </a:rPr>
+              <a:t>shape</a:t>
+            </a:r>
+            <a:r>
+              <a:rPr lang="en-US" sz="3000" dirty="0">
+                <a:solidFill>
+                  <a:srgbClr val="D4D4D4"/>
+                </a:solidFill>
+                <a:latin typeface="Menlo" panose="020B0609030804020204" pitchFamily="49" charset="0"/>
+              </a:rPr>
+              <a:t> = </a:t>
+            </a:r>
+            <a:r>
+              <a:rPr lang="en-US" sz="3000" dirty="0">
+                <a:solidFill>
+                  <a:srgbClr val="569CD6"/>
+                </a:solidFill>
+                <a:latin typeface="Menlo" panose="020B0609030804020204" pitchFamily="49" charset="0"/>
+              </a:rPr>
+              <a:t>new</a:t>
+            </a:r>
+            <a:r>
+              <a:rPr lang="en-US" sz="3000" dirty="0">
+                <a:solidFill>
+                  <a:srgbClr val="D4D4D4"/>
+                </a:solidFill>
+                <a:latin typeface="Menlo" panose="020B0609030804020204" pitchFamily="49" charset="0"/>
+              </a:rPr>
+              <a:t> </a:t>
+            </a:r>
+            <a:r>
+              <a:rPr lang="en-US" sz="3000" dirty="0">
+                <a:solidFill>
+                  <a:srgbClr val="4EC9B0"/>
+                </a:solidFill>
+                <a:latin typeface="Menlo" panose="020B0609030804020204" pitchFamily="49" charset="0"/>
+              </a:rPr>
+              <a:t>Rectangle</a:t>
+            </a:r>
+            <a:r>
+              <a:rPr lang="en-US" sz="3000" dirty="0">
+                <a:solidFill>
+                  <a:srgbClr val="D4D4D4"/>
+                </a:solidFill>
+                <a:latin typeface="Menlo" panose="020B0609030804020204" pitchFamily="49" charset="0"/>
+              </a:rPr>
+              <a:t>();</a:t>
+            </a:r>
+          </a:p>
+          <a:p>
+            <a:r>
+              <a:rPr lang="en-US" sz="3000" dirty="0">
+                <a:solidFill>
+                  <a:schemeClr val="accent1">
+                    <a:lumMod val="75000"/>
+                  </a:schemeClr>
+                </a:solidFill>
+                <a:latin typeface="Menlo" panose="020B0609030804020204" pitchFamily="49" charset="0"/>
+              </a:rPr>
+              <a:t>shape</a:t>
+            </a:r>
+            <a:r>
+              <a:rPr lang="en-US" sz="3000" dirty="0">
+                <a:solidFill>
+                  <a:srgbClr val="D4D4D4"/>
+                </a:solidFill>
+                <a:latin typeface="Menlo" panose="020B0609030804020204" pitchFamily="49" charset="0"/>
+              </a:rPr>
+              <a:t>.</a:t>
+            </a:r>
+            <a:r>
+              <a:rPr lang="en-US" sz="3000" dirty="0">
+                <a:solidFill>
+                  <a:schemeClr val="accent1">
+                    <a:lumMod val="75000"/>
+                  </a:schemeClr>
+                </a:solidFill>
+                <a:latin typeface="Menlo" panose="020B0609030804020204" pitchFamily="49" charset="0"/>
+              </a:rPr>
+              <a:t>width</a:t>
+            </a:r>
+            <a:r>
+              <a:rPr lang="en-US" sz="3000" dirty="0">
+                <a:solidFill>
+                  <a:srgbClr val="D4D4D4"/>
+                </a:solidFill>
+                <a:latin typeface="Menlo" panose="020B0609030804020204" pitchFamily="49" charset="0"/>
+              </a:rPr>
+              <a:t> = </a:t>
+            </a:r>
+            <a:r>
+              <a:rPr lang="en-US" sz="3000" dirty="0">
+                <a:solidFill>
+                  <a:schemeClr val="accent2"/>
+                </a:solidFill>
+                <a:latin typeface="Menlo" panose="020B0609030804020204" pitchFamily="49" charset="0"/>
+              </a:rPr>
+              <a:t>100</a:t>
+            </a:r>
+            <a:r>
+              <a:rPr lang="en-US" sz="3000" dirty="0">
+                <a:solidFill>
+                  <a:srgbClr val="D4D4D4"/>
+                </a:solidFill>
+                <a:latin typeface="Menlo" panose="020B0609030804020204" pitchFamily="49" charset="0"/>
+              </a:rPr>
+              <a:t>;</a:t>
+            </a:r>
+          </a:p>
+          <a:p>
+            <a:r>
+              <a:rPr lang="en-US" sz="3000" dirty="0">
+                <a:solidFill>
+                  <a:schemeClr val="accent1">
+                    <a:lumMod val="75000"/>
+                  </a:schemeClr>
+                </a:solidFill>
+                <a:latin typeface="Menlo" panose="020B0609030804020204" pitchFamily="49" charset="0"/>
+              </a:rPr>
+              <a:t>shape</a:t>
+            </a:r>
+            <a:r>
+              <a:rPr lang="en-US" sz="3000" dirty="0">
+                <a:solidFill>
+                  <a:srgbClr val="D4D4D4"/>
+                </a:solidFill>
+                <a:latin typeface="Menlo" panose="020B0609030804020204" pitchFamily="49" charset="0"/>
+              </a:rPr>
+              <a:t>.</a:t>
+            </a:r>
+            <a:r>
+              <a:rPr lang="en-US" sz="3000" dirty="0">
+                <a:solidFill>
+                  <a:schemeClr val="accent1">
+                    <a:lumMod val="75000"/>
+                  </a:schemeClr>
+                </a:solidFill>
+                <a:latin typeface="Menlo" panose="020B0609030804020204" pitchFamily="49" charset="0"/>
+              </a:rPr>
+              <a:t>height</a:t>
+            </a:r>
+            <a:r>
+              <a:rPr lang="en-US" sz="3000" dirty="0">
+                <a:solidFill>
+                  <a:srgbClr val="D4D4D4"/>
+                </a:solidFill>
+                <a:latin typeface="Menlo" panose="020B0609030804020204" pitchFamily="49" charset="0"/>
+              </a:rPr>
+              <a:t> = </a:t>
+            </a:r>
+            <a:r>
+              <a:rPr lang="en-US" sz="3000" dirty="0">
+                <a:solidFill>
+                  <a:schemeClr val="accent2"/>
+                </a:solidFill>
+                <a:latin typeface="Menlo" panose="020B0609030804020204" pitchFamily="49" charset="0"/>
+              </a:rPr>
+              <a:t>100</a:t>
+            </a:r>
+            <a:r>
+              <a:rPr lang="en-US" sz="3000" dirty="0">
+                <a:solidFill>
+                  <a:srgbClr val="D4D4D4"/>
+                </a:solidFill>
+                <a:latin typeface="Menlo" panose="020B0609030804020204" pitchFamily="49" charset="0"/>
+              </a:rPr>
+              <a:t>;</a:t>
+            </a:r>
+            <a:endParaRPr lang="en-US" sz="3000" b="0" dirty="0">
+              <a:solidFill>
+                <a:srgbClr val="D4D4D4"/>
+              </a:solidFill>
+              <a:effectLst/>
+              <a:latin typeface="Menlo" panose="020B0609030804020204" pitchFamily="49" charset="0"/>
+            </a:endParaRPr>
+          </a:p>
+        </p:txBody>
+      </p:sp>
+    </p:spTree>
+    <p:extLst>
+      <p:ext uri="{BB962C8B-B14F-4D97-AF65-F5344CB8AC3E}">
+        <p14:creationId xmlns:p14="http://schemas.microsoft.com/office/powerpoint/2010/main" val="1132534878"/>
+      </p:ext>
+    </p:extLst>
+  </p:cSld>
+  <p:clrMapOvr>
+    <a:masterClrMapping/>
+  </p:clrMapOvr>
+</p:sld>
+</file>
+
+<file path=ppt/slides/slide11.xml><?xml version="1.0" encoding="utf-8"?>
+<p:sld xmlns:a="http://schemas.openxmlformats.org/drawingml/2006/main" xmlns:r="http://schemas.openxmlformats.org/officeDocument/2006/relationships" xmlns:p="http://schemas.openxmlformats.org/presentationml/2006/main">
+  <p:cSld>
+    <p:spTree>
+      <p:nvGrpSpPr>
+        <p:cNvPr id="1" name=""/>
+        <p:cNvGrpSpPr/>
+        <p:nvPr/>
+      </p:nvGrpSpPr>
+      <p:grpSpPr>
+        <a:xfrm>
+          <a:off x="0" y="0"/>
+          <a:ext cx="0" cy="0"/>
+          <a:chOff x="0" y="0"/>
+          <a:chExt cx="0" cy="0"/>
+        </a:xfrm>
+      </p:grpSpPr>
+      <p:sp>
+        <p:nvSpPr>
+          <p:cNvPr id="21" name="TextBox 20">
+            <a:extLst>
+              <a:ext uri="{FF2B5EF4-FFF2-40B4-BE49-F238E27FC236}">
+                <a16:creationId xmlns:a16="http://schemas.microsoft.com/office/drawing/2014/main" id="{887247C4-8834-874B-8F45-B85DB5798056}"/>
+              </a:ext>
+            </a:extLst>
+          </p:cNvPr>
+          <p:cNvSpPr txBox="1"/>
+          <p:nvPr/>
+        </p:nvSpPr>
+        <p:spPr>
+          <a:xfrm>
+            <a:off x="2551044" y="104840"/>
+            <a:ext cx="7089913" cy="784830"/>
+          </a:xfrm>
+          <a:prstGeom prst="rect">
+            <a:avLst/>
+          </a:prstGeom>
+          <a:noFill/>
+        </p:spPr>
+        <p:txBody>
+          <a:bodyPr wrap="square" rtlCol="0">
+            <a:spAutoFit/>
+          </a:bodyPr>
+          <a:lstStyle/>
+          <a:p>
+            <a:pPr algn="ctr"/>
+            <a:r>
+              <a:rPr lang="en-US" sz="4500" dirty="0">
+                <a:solidFill>
+                  <a:schemeClr val="tx1">
+                    <a:lumMod val="50000"/>
+                    <a:lumOff val="50000"/>
+                  </a:schemeClr>
+                </a:solidFill>
+              </a:rPr>
               <a:t>Color the Rectangle</a:t>
             </a:r>
           </a:p>
@@ -6064,7 +6771,7 @@
 </p:sld>
 </file>
 
-<file path=ppt/slides/slide11.xml><?xml version="1.0" encoding="utf-8"?>
+<file path=ppt/slides/slide12.xml><?xml version="1.0" encoding="utf-8"?>
 <p:sld xmlns:a="http://schemas.openxmlformats.org/drawingml/2006/main" xmlns:r="http://schemas.openxmlformats.org/officeDocument/2006/relationships" xmlns:p="http://schemas.openxmlformats.org/presentationml/2006/main">
   <p:cSld>
     <p:spTree>
@@ -6418,7 +7125,7 @@
 </p:sld>
 </file>
 
-<file path=ppt/slides/slide12.xml><?xml version="1.0" encoding="utf-8"?>
+<file path=ppt/slides/slide13.xml><?xml version="1.0" encoding="utf-8"?>
 <p:sld xmlns:a="http://schemas.openxmlformats.org/drawingml/2006/main" xmlns:r="http://schemas.openxmlformats.org/officeDocument/2006/relationships" xmlns:p="http://schemas.openxmlformats.org/presentationml/2006/main">
   <p:cSld>
     <p:spTree>
@@ -6768,7 +7475,7 @@
 </p:sld>
 </file>
 
-<file path=ppt/slides/slide13.xml><?xml version="1.0" encoding="utf-8"?>
+<file path=ppt/slides/slide14.xml><?xml version="1.0" encoding="utf-8"?>
 <p:sld xmlns:a="http://schemas.openxmlformats.org/drawingml/2006/main" xmlns:r="http://schemas.openxmlformats.org/officeDocument/2006/relationships" xmlns:p="http://schemas.openxmlformats.org/presentationml/2006/main">
   <p:cSld>
     <p:spTree>
@@ -6847,7 +7554,7 @@
 </p:sld>
 </file>
 
-<file path=ppt/slides/slide14.xml><?xml version="1.0" encoding="utf-8"?>
+<file path=ppt/slides/slide15.xml><?xml version="1.0" encoding="utf-8"?>
 <p:sld xmlns:a="http://schemas.openxmlformats.org/drawingml/2006/main" xmlns:r="http://schemas.openxmlformats.org/officeDocument/2006/relationships" xmlns:p="http://schemas.openxmlformats.org/presentationml/2006/main">
   <p:cSld>
     <p:spTree>
@@ -7244,7 +7951,7 @@
 </p:sld>
 </file>
 
-<file path=ppt/slides/slide15.xml><?xml version="1.0" encoding="utf-8"?>
+<file path=ppt/slides/slide16.xml><?xml version="1.0" encoding="utf-8"?>
 <p:sld xmlns:a="http://schemas.openxmlformats.org/drawingml/2006/main" xmlns:r="http://schemas.openxmlformats.org/officeDocument/2006/relationships" xmlns:p="http://schemas.openxmlformats.org/presentationml/2006/main">
   <p:cSld>
     <p:spTree>
@@ -8112,7 +8819,7 @@
 </p:sld>
 </file>
 
-<file path=ppt/slides/slide16.xml><?xml version="1.0" encoding="utf-8"?>
+<file path=ppt/slides/slide17.xml><?xml version="1.0" encoding="utf-8"?>
 <p:sld xmlns:a="http://schemas.openxmlformats.org/drawingml/2006/main" xmlns:r="http://schemas.openxmlformats.org/officeDocument/2006/relationships" xmlns:p="http://schemas.openxmlformats.org/presentationml/2006/main">
   <p:cSld>
     <p:spTree>
@@ -9006,7 +9713,7 @@
 </p:sld>
 </file>
 
-<file path=ppt/slides/slide17.xml><?xml version="1.0" encoding="utf-8"?>
+<file path=ppt/slides/slide18.xml><?xml version="1.0" encoding="utf-8"?>
 <p:sld xmlns:a="http://schemas.openxmlformats.org/drawingml/2006/main" xmlns:r="http://schemas.openxmlformats.org/officeDocument/2006/relationships" xmlns:p="http://schemas.openxmlformats.org/presentationml/2006/main">
   <p:cSld>
     <p:spTree>
@@ -9355,7 +10062,7 @@
 </p:sld>
 </file>
 
-<file path=ppt/slides/slide18.xml><?xml version="1.0" encoding="utf-8"?>
+<file path=ppt/slides/slide19.xml><?xml version="1.0" encoding="utf-8"?>
 <p:sld xmlns:a="http://schemas.openxmlformats.org/drawingml/2006/main" xmlns:r="http://schemas.openxmlformats.org/officeDocument/2006/relationships" xmlns:p="http://schemas.openxmlformats.org/presentationml/2006/main">
   <p:cSld>
     <p:spTree>
@@ -10343,85 +11050,6 @@
 </p:sld>
 </file>
 
-<file path=ppt/slides/slide19.xml><?xml version="1.0" encoding="utf-8"?>
-<p:sld xmlns:a="http://schemas.openxmlformats.org/drawingml/2006/main" xmlns:r="http://schemas.openxmlformats.org/officeDocument/2006/relationships" xmlns:p="http://schemas.openxmlformats.org/presentationml/2006/main">
-  <p:cSld>
-    <p:spTree>
-      <p:nvGrpSpPr>
-        <p:cNvPr id="1" name=""/>
-        <p:cNvGrpSpPr/>
-        <p:nvPr/>
-      </p:nvGrpSpPr>
-      <p:grpSpPr>
-        <a:xfrm>
-          <a:off x="0" y="0"/>
-          <a:ext cx="0" cy="0"/>
-          <a:chOff x="0" y="0"/>
-          <a:chExt cx="0" cy="0"/>
-        </a:xfrm>
-      </p:grpSpPr>
-      <p:sp>
-        <p:nvSpPr>
-          <p:cNvPr id="2" name="TextBox 1">
-            <a:extLst>
-              <a:ext uri="{FF2B5EF4-FFF2-40B4-BE49-F238E27FC236}">
-                <a16:creationId xmlns:a16="http://schemas.microsoft.com/office/drawing/2014/main" id="{67B4816E-72C2-F84B-80B4-E397406F2CDA}"/>
-              </a:ext>
-            </a:extLst>
-          </p:cNvPr>
-          <p:cNvSpPr txBox="1"/>
-          <p:nvPr/>
-        </p:nvSpPr>
-        <p:spPr>
-          <a:xfrm>
-            <a:off x="1782418" y="2921169"/>
-            <a:ext cx="8627165" cy="1015663"/>
-          </a:xfrm>
-          <a:prstGeom prst="rect">
-            <a:avLst/>
-          </a:prstGeom>
-          <a:noFill/>
-        </p:spPr>
-        <p:txBody>
-          <a:bodyPr wrap="square" rtlCol="0">
-            <a:spAutoFit/>
-          </a:bodyPr>
-          <a:lstStyle/>
-          <a:p>
-            <a:r>
-              <a:rPr lang="en-US" sz="6000" dirty="0">
-                <a:solidFill>
-                  <a:schemeClr val="accent4">
-                    <a:lumMod val="75000"/>
-                  </a:schemeClr>
-                </a:solidFill>
-              </a:rPr>
-              <a:t>PART3</a:t>
-            </a:r>
-            <a:r>
-              <a:rPr lang="en-US" sz="6000" dirty="0">
-                <a:solidFill>
-                  <a:srgbClr val="0070C0"/>
-                </a:solidFill>
-              </a:rPr>
-              <a:t>  Creating a dialog UI</a:t>
-            </a:r>
-          </a:p>
-        </p:txBody>
-      </p:sp>
-    </p:spTree>
-    <p:extLst>
-      <p:ext uri="{BB962C8B-B14F-4D97-AF65-F5344CB8AC3E}">
-        <p14:creationId xmlns:p14="http://schemas.microsoft.com/office/powerpoint/2010/main" val="1847897279"/>
-      </p:ext>
-    </p:extLst>
-  </p:cSld>
-  <p:clrMapOvr>
-    <a:masterClrMapping/>
-  </p:clrMapOvr>
-</p:sld>
-</file>
-
 <file path=ppt/slides/slide2.xml><?xml version="1.0" encoding="utf-8"?>
 <p:sld xmlns:a="http://schemas.openxmlformats.org/drawingml/2006/main" xmlns:r="http://schemas.openxmlformats.org/officeDocument/2006/relationships" xmlns:p="http://schemas.openxmlformats.org/presentationml/2006/main">
   <p:cSld>
@@ -10502,6 +11130,85 @@
 </file>
 
 <file path=ppt/slides/slide20.xml><?xml version="1.0" encoding="utf-8"?>
+<p:sld xmlns:a="http://schemas.openxmlformats.org/drawingml/2006/main" xmlns:r="http://schemas.openxmlformats.org/officeDocument/2006/relationships" xmlns:p="http://schemas.openxmlformats.org/presentationml/2006/main">
+  <p:cSld>
+    <p:spTree>
+      <p:nvGrpSpPr>
+        <p:cNvPr id="1" name=""/>
+        <p:cNvGrpSpPr/>
+        <p:nvPr/>
+      </p:nvGrpSpPr>
+      <p:grpSpPr>
+        <a:xfrm>
+          <a:off x="0" y="0"/>
+          <a:ext cx="0" cy="0"/>
+          <a:chOff x="0" y="0"/>
+          <a:chExt cx="0" cy="0"/>
+        </a:xfrm>
+      </p:grpSpPr>
+      <p:sp>
+        <p:nvSpPr>
+          <p:cNvPr id="2" name="TextBox 1">
+            <a:extLst>
+              <a:ext uri="{FF2B5EF4-FFF2-40B4-BE49-F238E27FC236}">
+                <a16:creationId xmlns:a16="http://schemas.microsoft.com/office/drawing/2014/main" id="{67B4816E-72C2-F84B-80B4-E397406F2CDA}"/>
+              </a:ext>
+            </a:extLst>
+          </p:cNvPr>
+          <p:cNvSpPr txBox="1"/>
+          <p:nvPr/>
+        </p:nvSpPr>
+        <p:spPr>
+          <a:xfrm>
+            <a:off x="1782418" y="2921169"/>
+            <a:ext cx="8627165" cy="1015663"/>
+          </a:xfrm>
+          <a:prstGeom prst="rect">
+            <a:avLst/>
+          </a:prstGeom>
+          <a:noFill/>
+        </p:spPr>
+        <p:txBody>
+          <a:bodyPr wrap="square" rtlCol="0">
+            <a:spAutoFit/>
+          </a:bodyPr>
+          <a:lstStyle/>
+          <a:p>
+            <a:r>
+              <a:rPr lang="en-US" sz="6000" dirty="0">
+                <a:solidFill>
+                  <a:schemeClr val="accent4">
+                    <a:lumMod val="75000"/>
+                  </a:schemeClr>
+                </a:solidFill>
+              </a:rPr>
+              <a:t>PART3</a:t>
+            </a:r>
+            <a:r>
+              <a:rPr lang="en-US" sz="6000" dirty="0">
+                <a:solidFill>
+                  <a:srgbClr val="0070C0"/>
+                </a:solidFill>
+              </a:rPr>
+              <a:t>  Creating a dialog UI</a:t>
+            </a:r>
+          </a:p>
+        </p:txBody>
+      </p:sp>
+    </p:spTree>
+    <p:extLst>
+      <p:ext uri="{BB962C8B-B14F-4D97-AF65-F5344CB8AC3E}">
+        <p14:creationId xmlns:p14="http://schemas.microsoft.com/office/powerpoint/2010/main" val="1847897279"/>
+      </p:ext>
+    </p:extLst>
+  </p:cSld>
+  <p:clrMapOvr>
+    <a:masterClrMapping/>
+  </p:clrMapOvr>
+</p:sld>
+</file>
+
+<file path=ppt/slides/slide21.xml><?xml version="1.0" encoding="utf-8"?>
 <p:sld xmlns:a="http://schemas.openxmlformats.org/drawingml/2006/main" xmlns:r="http://schemas.openxmlformats.org/officeDocument/2006/relationships" xmlns:p="http://schemas.openxmlformats.org/presentationml/2006/main">
   <p:cSld>
     <p:spTree>
@@ -10907,7 +11614,7 @@
 </p:sld>
 </file>
 
-<file path=ppt/slides/slide21.xml><?xml version="1.0" encoding="utf-8"?>
+<file path=ppt/slides/slide22.xml><?xml version="1.0" encoding="utf-8"?>
 <p:sld xmlns:a="http://schemas.openxmlformats.org/drawingml/2006/main" xmlns:r="http://schemas.openxmlformats.org/officeDocument/2006/relationships" xmlns:p="http://schemas.openxmlformats.org/presentationml/2006/main">
   <p:cSld>
     <p:spTree>
@@ -11365,7 +12072,7 @@
 </p:sld>
 </file>
 
-<file path=ppt/slides/slide22.xml><?xml version="1.0" encoding="utf-8"?>
+<file path=ppt/slides/slide23.xml><?xml version="1.0" encoding="utf-8"?>
 <p:sld xmlns:a="http://schemas.openxmlformats.org/drawingml/2006/main" xmlns:r="http://schemas.openxmlformats.org/officeDocument/2006/relationships" xmlns:p="http://schemas.openxmlformats.org/presentationml/2006/main">
   <p:cSld>
     <p:spTree>
@@ -11896,85 +12603,6 @@
 </p:sld>
 </file>
 
-<file path=ppt/slides/slide23.xml><?xml version="1.0" encoding="utf-8"?>
-<p:sld xmlns:a="http://schemas.openxmlformats.org/drawingml/2006/main" xmlns:r="http://schemas.openxmlformats.org/officeDocument/2006/relationships" xmlns:p="http://schemas.openxmlformats.org/presentationml/2006/main">
-  <p:cSld>
-    <p:spTree>
-      <p:nvGrpSpPr>
-        <p:cNvPr id="1" name=""/>
-        <p:cNvGrpSpPr/>
-        <p:nvPr/>
-      </p:nvGrpSpPr>
-      <p:grpSpPr>
-        <a:xfrm>
-          <a:off x="0" y="0"/>
-          <a:ext cx="0" cy="0"/>
-          <a:chOff x="0" y="0"/>
-          <a:chExt cx="0" cy="0"/>
-        </a:xfrm>
-      </p:grpSpPr>
-      <p:sp>
-        <p:nvSpPr>
-          <p:cNvPr id="2" name="TextBox 1">
-            <a:extLst>
-              <a:ext uri="{FF2B5EF4-FFF2-40B4-BE49-F238E27FC236}">
-                <a16:creationId xmlns:a16="http://schemas.microsoft.com/office/drawing/2014/main" id="{67B4816E-72C2-F84B-80B4-E397406F2CDA}"/>
-              </a:ext>
-            </a:extLst>
-          </p:cNvPr>
-          <p:cNvSpPr txBox="1"/>
-          <p:nvPr/>
-        </p:nvSpPr>
-        <p:spPr>
-          <a:xfrm>
-            <a:off x="1782418" y="2921169"/>
-            <a:ext cx="9198695" cy="1015663"/>
-          </a:xfrm>
-          <a:prstGeom prst="rect">
-            <a:avLst/>
-          </a:prstGeom>
-          <a:noFill/>
-        </p:spPr>
-        <p:txBody>
-          <a:bodyPr wrap="square" rtlCol="0">
-            <a:spAutoFit/>
-          </a:bodyPr>
-          <a:lstStyle/>
-          <a:p>
-            <a:r>
-              <a:rPr lang="en-US" sz="6000" dirty="0">
-                <a:solidFill>
-                  <a:schemeClr val="accent4">
-                    <a:lumMod val="75000"/>
-                  </a:schemeClr>
-                </a:solidFill>
-              </a:rPr>
-              <a:t>PART4</a:t>
-            </a:r>
-            <a:r>
-              <a:rPr lang="en-US" sz="6000" dirty="0">
-                <a:solidFill>
-                  <a:srgbClr val="0070C0"/>
-                </a:solidFill>
-              </a:rPr>
-              <a:t>  Putting it all together</a:t>
-            </a:r>
-          </a:p>
-        </p:txBody>
-      </p:sp>
-    </p:spTree>
-    <p:extLst>
-      <p:ext uri="{BB962C8B-B14F-4D97-AF65-F5344CB8AC3E}">
-        <p14:creationId xmlns:p14="http://schemas.microsoft.com/office/powerpoint/2010/main" val="2982983865"/>
-      </p:ext>
-    </p:extLst>
-  </p:cSld>
-  <p:clrMapOvr>
-    <a:masterClrMapping/>
-  </p:clrMapOvr>
-</p:sld>
-</file>
-
 <file path=ppt/slides/slide24.xml><?xml version="1.0" encoding="utf-8"?>
 <p:sld xmlns:a="http://schemas.openxmlformats.org/drawingml/2006/main" xmlns:r="http://schemas.openxmlformats.org/officeDocument/2006/relationships" xmlns:p="http://schemas.openxmlformats.org/presentationml/2006/main">
   <p:cSld>
@@ -12006,6 +12634,85 @@
         </p:nvSpPr>
         <p:spPr>
           <a:xfrm>
+            <a:off x="1782418" y="2921169"/>
+            <a:ext cx="9198695" cy="1015663"/>
+          </a:xfrm>
+          <a:prstGeom prst="rect">
+            <a:avLst/>
+          </a:prstGeom>
+          <a:noFill/>
+        </p:spPr>
+        <p:txBody>
+          <a:bodyPr wrap="square" rtlCol="0">
+            <a:spAutoFit/>
+          </a:bodyPr>
+          <a:lstStyle/>
+          <a:p>
+            <a:r>
+              <a:rPr lang="en-US" sz="6000" dirty="0">
+                <a:solidFill>
+                  <a:schemeClr val="accent4">
+                    <a:lumMod val="75000"/>
+                  </a:schemeClr>
+                </a:solidFill>
+              </a:rPr>
+              <a:t>PART4</a:t>
+            </a:r>
+            <a:r>
+              <a:rPr lang="en-US" sz="6000" dirty="0">
+                <a:solidFill>
+                  <a:srgbClr val="0070C0"/>
+                </a:solidFill>
+              </a:rPr>
+              <a:t>  Putting it all together</a:t>
+            </a:r>
+          </a:p>
+        </p:txBody>
+      </p:sp>
+    </p:spTree>
+    <p:extLst>
+      <p:ext uri="{BB962C8B-B14F-4D97-AF65-F5344CB8AC3E}">
+        <p14:creationId xmlns:p14="http://schemas.microsoft.com/office/powerpoint/2010/main" val="2982983865"/>
+      </p:ext>
+    </p:extLst>
+  </p:cSld>
+  <p:clrMapOvr>
+    <a:masterClrMapping/>
+  </p:clrMapOvr>
+</p:sld>
+</file>
+
+<file path=ppt/slides/slide25.xml><?xml version="1.0" encoding="utf-8"?>
+<p:sld xmlns:a="http://schemas.openxmlformats.org/drawingml/2006/main" xmlns:r="http://schemas.openxmlformats.org/officeDocument/2006/relationships" xmlns:p="http://schemas.openxmlformats.org/presentationml/2006/main">
+  <p:cSld>
+    <p:spTree>
+      <p:nvGrpSpPr>
+        <p:cNvPr id="1" name=""/>
+        <p:cNvGrpSpPr/>
+        <p:nvPr/>
+      </p:nvGrpSpPr>
+      <p:grpSpPr>
+        <a:xfrm>
+          <a:off x="0" y="0"/>
+          <a:ext cx="0" cy="0"/>
+          <a:chOff x="0" y="0"/>
+          <a:chExt cx="0" cy="0"/>
+        </a:xfrm>
+      </p:grpSpPr>
+      <p:sp>
+        <p:nvSpPr>
+          <p:cNvPr id="2" name="TextBox 1">
+            <a:extLst>
+              <a:ext uri="{FF2B5EF4-FFF2-40B4-BE49-F238E27FC236}">
+                <a16:creationId xmlns:a16="http://schemas.microsoft.com/office/drawing/2014/main" id="{67B4816E-72C2-F84B-80B4-E397406F2CDA}"/>
+              </a:ext>
+            </a:extLst>
+          </p:cNvPr>
+          <p:cNvSpPr txBox="1"/>
+          <p:nvPr/>
+        </p:nvSpPr>
+        <p:spPr>
+          <a:xfrm>
             <a:off x="2743923" y="2921168"/>
             <a:ext cx="9198695" cy="1015663"/>
           </a:xfrm>
@@ -12045,6 +12752,75 @@
     <p:extLst>
       <p:ext uri="{BB962C8B-B14F-4D97-AF65-F5344CB8AC3E}">
         <p14:creationId xmlns:p14="http://schemas.microsoft.com/office/powerpoint/2010/main" val="1075431048"/>
+      </p:ext>
+    </p:extLst>
+  </p:cSld>
+  <p:clrMapOvr>
+    <a:masterClrMapping/>
+  </p:clrMapOvr>
+</p:sld>
+</file>
+
+<file path=ppt/slides/slide26.xml><?xml version="1.0" encoding="utf-8"?>
+<p:sld xmlns:a="http://schemas.openxmlformats.org/drawingml/2006/main" xmlns:r="http://schemas.openxmlformats.org/officeDocument/2006/relationships" xmlns:p="http://schemas.openxmlformats.org/presentationml/2006/main">
+  <p:cSld>
+    <p:spTree>
+      <p:nvGrpSpPr>
+        <p:cNvPr id="1" name=""/>
+        <p:cNvGrpSpPr/>
+        <p:nvPr/>
+      </p:nvGrpSpPr>
+      <p:grpSpPr>
+        <a:xfrm>
+          <a:off x="0" y="0"/>
+          <a:ext cx="0" cy="0"/>
+          <a:chOff x="0" y="0"/>
+          <a:chExt cx="0" cy="0"/>
+        </a:xfrm>
+      </p:grpSpPr>
+      <p:sp>
+        <p:nvSpPr>
+          <p:cNvPr id="2" name="TextBox 1">
+            <a:extLst>
+              <a:ext uri="{FF2B5EF4-FFF2-40B4-BE49-F238E27FC236}">
+                <a16:creationId xmlns:a16="http://schemas.microsoft.com/office/drawing/2014/main" id="{67B4816E-72C2-F84B-80B4-E397406F2CDA}"/>
+              </a:ext>
+            </a:extLst>
+          </p:cNvPr>
+          <p:cNvSpPr txBox="1"/>
+          <p:nvPr/>
+        </p:nvSpPr>
+        <p:spPr>
+          <a:xfrm>
+            <a:off x="2713081" y="2921168"/>
+            <a:ext cx="6765837" cy="1015663"/>
+          </a:xfrm>
+          <a:prstGeom prst="rect">
+            <a:avLst/>
+          </a:prstGeom>
+          <a:noFill/>
+        </p:spPr>
+        <p:txBody>
+          <a:bodyPr wrap="square" rtlCol="0">
+            <a:spAutoFit/>
+          </a:bodyPr>
+          <a:lstStyle/>
+          <a:p>
+            <a:r>
+              <a:rPr lang="en-US" sz="6000" dirty="0">
+                <a:solidFill>
+                  <a:srgbClr val="0070C0"/>
+                </a:solidFill>
+              </a:rPr>
+              <a:t>Provide us feedback!</a:t>
+            </a:r>
+          </a:p>
+        </p:txBody>
+      </p:sp>
+    </p:spTree>
+    <p:extLst>
+      <p:ext uri="{BB962C8B-B14F-4D97-AF65-F5344CB8AC3E}">
+        <p14:creationId xmlns:p14="http://schemas.microsoft.com/office/powerpoint/2010/main" val="389310598"/>
       </p:ext>
     </p:extLst>
   </p:cSld>
@@ -12085,8 +12861,8 @@
         </p:nvSpPr>
         <p:spPr>
           <a:xfrm>
-            <a:off x="1950775" y="1697676"/>
-            <a:ext cx="8532627" cy="2862322"/>
+            <a:off x="1440006" y="2413337"/>
+            <a:ext cx="8532627" cy="1015663"/>
           </a:xfrm>
           <a:prstGeom prst="rect">
             <a:avLst/>
@@ -12108,7 +12884,18 @@
                 </a:solidFill>
                 <a:hlinkClick r:id="rId3"/>
               </a:rPr>
-              <a:t>http://bit.ly/xdpluginlabs</a:t>
+              <a:t>http://adobe.ly/</a:t>
+            </a:r>
+            <a:r>
+              <a:rPr lang="en-US" sz="6000" dirty="0">
+                <a:solidFill>
+                  <a:schemeClr val="accent4">
+                    <a:lumMod val="75000"/>
+                  </a:schemeClr>
+                </a:solidFill>
+                <a:hlinkClick r:id="rId4"/>
+              </a:rPr>
+              <a:t>xdapi</a:t>
             </a:r>
             <a:endParaRPr lang="en-US" sz="6000" dirty="0">
               <a:solidFill>
@@ -12118,7 +12905,58 @@
               </a:solidFill>
             </a:endParaRPr>
           </a:p>
-          <a:p>
+        </p:txBody>
+      </p:sp>
+      <p:sp>
+        <p:nvSpPr>
+          <p:cNvPr id="3" name="TextBox 2">
+            <a:extLst>
+              <a:ext uri="{FF2B5EF4-FFF2-40B4-BE49-F238E27FC236}">
+                <a16:creationId xmlns:a16="http://schemas.microsoft.com/office/drawing/2014/main" id="{2D488449-81B9-1240-A8A4-E2CC11B1FDD9}"/>
+              </a:ext>
+            </a:extLst>
+          </p:cNvPr>
+          <p:cNvSpPr txBox="1"/>
+          <p:nvPr/>
+        </p:nvSpPr>
+        <p:spPr>
+          <a:xfrm>
+            <a:off x="1440006" y="3429000"/>
+            <a:ext cx="9863720" cy="1015663"/>
+          </a:xfrm>
+          <a:prstGeom prst="rect">
+            <a:avLst/>
+          </a:prstGeom>
+          <a:noFill/>
+        </p:spPr>
+        <p:txBody>
+          <a:bodyPr wrap="square" rtlCol="0">
+            <a:spAutoFit/>
+          </a:bodyPr>
+          <a:lstStyle/>
+          <a:p>
+            <a:r>
+              <a:rPr lang="en-US" sz="6000" dirty="0">
+                <a:solidFill>
+                  <a:schemeClr val="accent4">
+                    <a:lumMod val="75000"/>
+                  </a:schemeClr>
+                </a:solidFill>
+                <a:hlinkClick r:id="rId3"/>
+              </a:rPr>
+              <a:t>http://adobe.ly/</a:t>
+            </a:r>
+            <a:r>
+              <a:rPr lang="en-US" sz="6000" dirty="0">
+                <a:solidFill>
+                  <a:schemeClr val="accent4">
+                    <a:lumMod val="75000"/>
+                  </a:schemeClr>
+                </a:solidFill>
+                <a:hlinkClick r:id="rId4"/>
+              </a:rPr>
+              <a:t>xdapifeedback</a:t>
+            </a:r>
             <a:endParaRPr lang="en-US" sz="6000" dirty="0">
               <a:solidFill>
                 <a:schemeClr val="accent4">
@@ -12126,16 +12964,6 @@
                 </a:schemeClr>
               </a:solidFill>
             </a:endParaRPr>
-          </a:p>
-          <a:p>
-            <a:r>
-              <a:rPr lang="en-US" sz="6000" dirty="0">
-                <a:solidFill>
-                  <a:srgbClr val="0070C0"/>
-                </a:solidFill>
-              </a:rPr>
-              <a:t>https://console.adobe.io</a:t>
-            </a:r>
           </a:p>
         </p:txBody>
       </p:sp>
@@ -12205,7 +13033,7 @@
                   </a:schemeClr>
                 </a:solidFill>
               </a:rPr>
-              <a:t>PART1</a:t>
+              <a:t>PART0</a:t>
             </a:r>
             <a:r>
               <a:rPr lang="en-US" sz="6000" dirty="0">
@@ -13402,7 +14230,7 @@
         <p:spPr>
           <a:xfrm>
             <a:off x="2376880" y="1535471"/>
-            <a:ext cx="7438239" cy="3416320"/>
+            <a:ext cx="7438239" cy="3139321"/>
           </a:xfrm>
           <a:prstGeom prst="rect">
             <a:avLst/>
@@ -13586,8 +14414,6 @@
               </a:rPr>
               <a:t>) {</a:t>
             </a:r>
-          </a:p>
-          <a:p>
             <a:br>
               <a:rPr lang="en-US" dirty="0">
                 <a:solidFill>
@@ -13603,7 +14429,7 @@
                 </a:solidFill>
                 <a:latin typeface="Menlo" panose="020B0609030804020204" pitchFamily="49" charset="0"/>
               </a:rPr>
-              <a:t>    </a:t>
+              <a:t>    // Your code goes here</a:t>
             </a:r>
             <a:br>
               <a:rPr lang="en-US" dirty="0">
@@ -13796,10 +14622,10 @@
       </p:grpSpPr>
       <p:sp>
         <p:nvSpPr>
-          <p:cNvPr id="21" name="TextBox 20">
-            <a:extLst>
-              <a:ext uri="{FF2B5EF4-FFF2-40B4-BE49-F238E27FC236}">
-                <a16:creationId xmlns:a16="http://schemas.microsoft.com/office/drawing/2014/main" id="{887247C4-8834-874B-8F45-B85DB5798056}"/>
+          <p:cNvPr id="2" name="TextBox 1">
+            <a:extLst>
+              <a:ext uri="{FF2B5EF4-FFF2-40B4-BE49-F238E27FC236}">
+                <a16:creationId xmlns:a16="http://schemas.microsoft.com/office/drawing/2014/main" id="{67B4816E-72C2-F84B-80B4-E397406F2CDA}"/>
               </a:ext>
             </a:extLst>
           </p:cNvPr>
@@ -13808,8 +14634,8 @@
         </p:nvSpPr>
         <p:spPr>
           <a:xfrm>
-            <a:off x="2551044" y="104840"/>
-            <a:ext cx="7089913" cy="784830"/>
+            <a:off x="2272748" y="2921169"/>
+            <a:ext cx="7646504" cy="1015663"/>
           </a:xfrm>
           <a:prstGeom prst="rect">
             <a:avLst/>
@@ -13822,349 +14648,31 @@
           </a:bodyPr>
           <a:lstStyle/>
           <a:p>
-            <a:pPr algn="ctr"/>
-            <a:r>
-              <a:rPr lang="en-US" sz="4500" dirty="0">
-                <a:solidFill>
-                  <a:schemeClr val="tx1">
-                    <a:lumMod val="50000"/>
-                    <a:lumOff val="50000"/>
-                  </a:schemeClr>
-                </a:solidFill>
-              </a:rPr>
-              <a:t>Create a Rectangle Instance</a:t>
-            </a:r>
-          </a:p>
-        </p:txBody>
-      </p:sp>
-      <p:sp>
-        <p:nvSpPr>
-          <p:cNvPr id="5" name="Down Arrow 4">
-            <a:extLst>
-              <a:ext uri="{FF2B5EF4-FFF2-40B4-BE49-F238E27FC236}">
-                <a16:creationId xmlns:a16="http://schemas.microsoft.com/office/drawing/2014/main" id="{948CEE77-B360-DE4B-8F69-6918DE6A523A}"/>
-              </a:ext>
-            </a:extLst>
-          </p:cNvPr>
-          <p:cNvSpPr/>
-          <p:nvPr/>
-        </p:nvSpPr>
-        <p:spPr>
-          <a:xfrm>
-            <a:off x="5420139" y="2984329"/>
-            <a:ext cx="1351722" cy="1417983"/>
-          </a:xfrm>
-          <a:prstGeom prst="downArrow">
-            <a:avLst/>
-          </a:prstGeom>
-        </p:spPr>
-        <p:style>
-          <a:lnRef idx="2">
-            <a:schemeClr val="accent1">
-              <a:shade val="50000"/>
-            </a:schemeClr>
-          </a:lnRef>
-          <a:fillRef idx="1">
-            <a:schemeClr val="accent1"/>
-          </a:fillRef>
-          <a:effectRef idx="0">
-            <a:schemeClr val="accent1"/>
-          </a:effectRef>
-          <a:fontRef idx="minor">
-            <a:schemeClr val="lt1"/>
-          </a:fontRef>
-        </p:style>
-        <p:txBody>
-          <a:bodyPr rtlCol="0" anchor="ctr"/>
-          <a:lstStyle/>
-          <a:p>
-            <a:pPr algn="ctr"/>
-            <a:endParaRPr lang="en-US" dirty="0"/>
-          </a:p>
-        </p:txBody>
-      </p:sp>
-      <p:sp>
-        <p:nvSpPr>
-          <p:cNvPr id="12" name="Rectangle 11">
-            <a:extLst>
-              <a:ext uri="{FF2B5EF4-FFF2-40B4-BE49-F238E27FC236}">
-                <a16:creationId xmlns:a16="http://schemas.microsoft.com/office/drawing/2014/main" id="{4202D67D-925A-8E46-A725-492B9933C266}"/>
-              </a:ext>
-            </a:extLst>
-          </p:cNvPr>
-          <p:cNvSpPr/>
-          <p:nvPr/>
-        </p:nvSpPr>
-        <p:spPr>
-          <a:xfrm>
-            <a:off x="5254394" y="4717770"/>
-            <a:ext cx="1828800" cy="1828800"/>
-          </a:xfrm>
-          <a:prstGeom prst="rect">
-            <a:avLst/>
-          </a:prstGeom>
-          <a:noFill/>
-        </p:spPr>
-        <p:style>
-          <a:lnRef idx="2">
-            <a:schemeClr val="accent1">
-              <a:shade val="50000"/>
-            </a:schemeClr>
-          </a:lnRef>
-          <a:fillRef idx="1">
-            <a:schemeClr val="accent1"/>
-          </a:fillRef>
-          <a:effectRef idx="0">
-            <a:schemeClr val="accent1"/>
-          </a:effectRef>
-          <a:fontRef idx="minor">
-            <a:schemeClr val="lt1"/>
-          </a:fontRef>
-        </p:style>
-        <p:txBody>
-          <a:bodyPr rtlCol="0" anchor="ctr"/>
-          <a:lstStyle/>
-          <a:p>
-            <a:pPr algn="ctr"/>
-            <a:endParaRPr lang="en-US" dirty="0"/>
-          </a:p>
-        </p:txBody>
-      </p:sp>
-      <p:sp>
-        <p:nvSpPr>
-          <p:cNvPr id="13" name="Rectangle 12">
-            <a:extLst>
-              <a:ext uri="{FF2B5EF4-FFF2-40B4-BE49-F238E27FC236}">
-                <a16:creationId xmlns:a16="http://schemas.microsoft.com/office/drawing/2014/main" id="{A4F5ACA1-F995-4E4E-BAD4-9487E1E92CE1}"/>
-              </a:ext>
-            </a:extLst>
-          </p:cNvPr>
-          <p:cNvSpPr/>
-          <p:nvPr/>
-        </p:nvSpPr>
-        <p:spPr>
-          <a:xfrm>
-            <a:off x="1895061" y="1191543"/>
-            <a:ext cx="8401878" cy="1477328"/>
-          </a:xfrm>
-          <a:prstGeom prst="rect">
-            <a:avLst/>
-          </a:prstGeom>
-        </p:spPr>
-        <p:txBody>
-          <a:bodyPr wrap="square">
-            <a:spAutoFit/>
-          </a:bodyPr>
-          <a:lstStyle/>
-          <a:p>
-            <a:r>
-              <a:rPr lang="en-US" sz="3000" dirty="0">
-                <a:solidFill>
-                  <a:srgbClr val="569CD6"/>
-                </a:solidFill>
-                <a:latin typeface="Menlo" panose="020B0609030804020204" pitchFamily="49" charset="0"/>
-              </a:rPr>
-              <a:t>const</a:t>
-            </a:r>
-            <a:r>
-              <a:rPr lang="en-US" sz="3000" dirty="0">
-                <a:solidFill>
-                  <a:srgbClr val="D4D4D4"/>
-                </a:solidFill>
-                <a:latin typeface="Menlo" panose="020B0609030804020204" pitchFamily="49" charset="0"/>
-              </a:rPr>
-              <a:t> </a:t>
-            </a:r>
-            <a:r>
-              <a:rPr lang="en-US" sz="3000" dirty="0">
-                <a:solidFill>
-                  <a:schemeClr val="accent1">
+            <a:r>
+              <a:rPr lang="en-US" sz="6000" dirty="0">
+                <a:solidFill>
+                  <a:schemeClr val="accent4">
                     <a:lumMod val="75000"/>
                   </a:schemeClr>
                 </a:solidFill>
-                <a:latin typeface="Menlo" panose="020B0609030804020204" pitchFamily="49" charset="0"/>
-              </a:rPr>
-              <a:t>shape</a:t>
-            </a:r>
-            <a:r>
-              <a:rPr lang="en-US" sz="3000" dirty="0">
-                <a:solidFill>
-                  <a:srgbClr val="D4D4D4"/>
-                </a:solidFill>
-                <a:latin typeface="Menlo" panose="020B0609030804020204" pitchFamily="49" charset="0"/>
-              </a:rPr>
-              <a:t> = </a:t>
-            </a:r>
-            <a:r>
-              <a:rPr lang="en-US" sz="3000" dirty="0">
-                <a:solidFill>
-                  <a:srgbClr val="569CD6"/>
-                </a:solidFill>
-                <a:latin typeface="Menlo" panose="020B0609030804020204" pitchFamily="49" charset="0"/>
-              </a:rPr>
-              <a:t>new</a:t>
-            </a:r>
-            <a:r>
-              <a:rPr lang="en-US" sz="3000" dirty="0">
-                <a:solidFill>
-                  <a:srgbClr val="D4D4D4"/>
-                </a:solidFill>
-                <a:latin typeface="Menlo" panose="020B0609030804020204" pitchFamily="49" charset="0"/>
-              </a:rPr>
-              <a:t> </a:t>
-            </a:r>
-            <a:r>
-              <a:rPr lang="en-US" sz="3000" dirty="0">
-                <a:solidFill>
-                  <a:srgbClr val="4EC9B0"/>
-                </a:solidFill>
-                <a:latin typeface="Menlo" panose="020B0609030804020204" pitchFamily="49" charset="0"/>
-              </a:rPr>
-              <a:t>Rectangle</a:t>
-            </a:r>
-            <a:r>
-              <a:rPr lang="en-US" sz="3000" dirty="0">
-                <a:solidFill>
-                  <a:srgbClr val="D4D4D4"/>
-                </a:solidFill>
-                <a:latin typeface="Menlo" panose="020B0609030804020204" pitchFamily="49" charset="0"/>
-              </a:rPr>
-              <a:t>();</a:t>
-            </a:r>
-          </a:p>
-          <a:p>
-            <a:r>
-              <a:rPr lang="en-US" sz="3000" dirty="0">
-                <a:solidFill>
-                  <a:schemeClr val="accent1">
-                    <a:lumMod val="75000"/>
-                  </a:schemeClr>
-                </a:solidFill>
-                <a:latin typeface="Menlo" panose="020B0609030804020204" pitchFamily="49" charset="0"/>
-              </a:rPr>
-              <a:t>shape</a:t>
-            </a:r>
-            <a:r>
-              <a:rPr lang="en-US" sz="3000" dirty="0">
-                <a:solidFill>
-                  <a:srgbClr val="D4D4D4"/>
-                </a:solidFill>
-                <a:latin typeface="Menlo" panose="020B0609030804020204" pitchFamily="49" charset="0"/>
-              </a:rPr>
-              <a:t>.</a:t>
-            </a:r>
-            <a:r>
-              <a:rPr lang="en-US" sz="3000" dirty="0">
-                <a:solidFill>
-                  <a:schemeClr val="accent1">
-                    <a:lumMod val="75000"/>
-                  </a:schemeClr>
-                </a:solidFill>
-                <a:latin typeface="Menlo" panose="020B0609030804020204" pitchFamily="49" charset="0"/>
-              </a:rPr>
-              <a:t>width</a:t>
-            </a:r>
-            <a:r>
-              <a:rPr lang="en-US" sz="3000" dirty="0">
-                <a:solidFill>
-                  <a:srgbClr val="D4D4D4"/>
-                </a:solidFill>
-                <a:latin typeface="Menlo" panose="020B0609030804020204" pitchFamily="49" charset="0"/>
-              </a:rPr>
-              <a:t> = </a:t>
-            </a:r>
-            <a:r>
-              <a:rPr lang="en-US" sz="3000" dirty="0">
-                <a:solidFill>
-                  <a:schemeClr val="accent2"/>
-                </a:solidFill>
-                <a:latin typeface="Menlo" panose="020B0609030804020204" pitchFamily="49" charset="0"/>
-              </a:rPr>
-              <a:t>100</a:t>
-            </a:r>
-            <a:r>
-              <a:rPr lang="en-US" sz="3000" dirty="0">
-                <a:solidFill>
-                  <a:srgbClr val="D4D4D4"/>
-                </a:solidFill>
-                <a:latin typeface="Menlo" panose="020B0609030804020204" pitchFamily="49" charset="0"/>
-              </a:rPr>
-              <a:t>;</a:t>
-            </a:r>
-          </a:p>
-          <a:p>
-            <a:r>
-              <a:rPr lang="en-US" sz="3000" dirty="0">
-                <a:solidFill>
-                  <a:schemeClr val="accent1">
-                    <a:lumMod val="75000"/>
-                  </a:schemeClr>
-                </a:solidFill>
-                <a:latin typeface="Menlo" panose="020B0609030804020204" pitchFamily="49" charset="0"/>
-              </a:rPr>
-              <a:t>shape</a:t>
-            </a:r>
-            <a:r>
-              <a:rPr lang="en-US" sz="3000" dirty="0">
-                <a:solidFill>
-                  <a:srgbClr val="D4D4D4"/>
-                </a:solidFill>
-                <a:latin typeface="Menlo" panose="020B0609030804020204" pitchFamily="49" charset="0"/>
-              </a:rPr>
-              <a:t>.</a:t>
-            </a:r>
-            <a:r>
-              <a:rPr lang="en-US" sz="3000" dirty="0">
-                <a:solidFill>
-                  <a:schemeClr val="accent1">
-                    <a:lumMod val="75000"/>
-                  </a:schemeClr>
-                </a:solidFill>
-                <a:latin typeface="Menlo" panose="020B0609030804020204" pitchFamily="49" charset="0"/>
-              </a:rPr>
-              <a:t>height</a:t>
-            </a:r>
-            <a:r>
-              <a:rPr lang="en-US" sz="3000" dirty="0">
-                <a:solidFill>
-                  <a:srgbClr val="D4D4D4"/>
-                </a:solidFill>
-                <a:latin typeface="Menlo" panose="020B0609030804020204" pitchFamily="49" charset="0"/>
-              </a:rPr>
-              <a:t> = </a:t>
-            </a:r>
-            <a:r>
-              <a:rPr lang="en-US" sz="3000" dirty="0">
-                <a:solidFill>
-                  <a:schemeClr val="accent2"/>
-                </a:solidFill>
-                <a:latin typeface="Menlo" panose="020B0609030804020204" pitchFamily="49" charset="0"/>
-              </a:rPr>
-              <a:t>100</a:t>
-            </a:r>
-            <a:r>
-              <a:rPr lang="en-US" sz="3000" dirty="0">
-                <a:solidFill>
-                  <a:srgbClr val="D4D4D4"/>
-                </a:solidFill>
-                <a:latin typeface="Menlo" panose="020B0609030804020204" pitchFamily="49" charset="0"/>
-              </a:rPr>
-              <a:t>;</a:t>
-            </a:r>
-            <a:endParaRPr lang="en-US" sz="3000" b="0" dirty="0">
-              <a:solidFill>
-                <a:srgbClr val="D4D4D4"/>
-              </a:solidFill>
-              <a:effectLst/>
-              <a:latin typeface="Menlo" panose="020B0609030804020204" pitchFamily="49" charset="0"/>
-            </a:endParaRPr>
+              </a:rPr>
+              <a:t>PART1</a:t>
+            </a:r>
+            <a:r>
+              <a:rPr lang="en-US" sz="6000" dirty="0">
+                <a:solidFill>
+                  <a:srgbClr val="0070C0"/>
+                </a:solidFill>
+              </a:rPr>
+              <a:t>  Getting started</a:t>
+            </a:r>
           </a:p>
         </p:txBody>
       </p:sp>
     </p:spTree>
     <p:extLst>
       <p:ext uri="{BB962C8B-B14F-4D97-AF65-F5344CB8AC3E}">
-        <p14:creationId xmlns:p14="http://schemas.microsoft.com/office/powerpoint/2010/main" val="1132534878"/>
+        <p14:creationId xmlns:p14="http://schemas.microsoft.com/office/powerpoint/2010/main" val="2085856702"/>
       </p:ext>
     </p:extLst>
   </p:cSld>

</xml_diff>

<commit_message>
updated based on last set of feedback
</commit_message>
<xml_diff>
--- a/max-labs.pptx
+++ b/max-labs.pptx
@@ -5,34 +5,36 @@
     <p:sldMasterId id="2147483648" r:id="rId1"/>
   </p:sldMasterIdLst>
   <p:notesMasterIdLst>
-    <p:notesMasterId r:id="rId27"/>
+    <p:notesMasterId r:id="rId29"/>
   </p:notesMasterIdLst>
   <p:sldIdLst>
     <p:sldId id="276" r:id="rId2"/>
     <p:sldId id="257" r:id="rId3"/>
     <p:sldId id="274" r:id="rId4"/>
-    <p:sldId id="281" r:id="rId5"/>
-    <p:sldId id="279" r:id="rId6"/>
-    <p:sldId id="280" r:id="rId7"/>
-    <p:sldId id="282" r:id="rId8"/>
-    <p:sldId id="283" r:id="rId9"/>
-    <p:sldId id="263" r:id="rId10"/>
-    <p:sldId id="258" r:id="rId11"/>
-    <p:sldId id="259" r:id="rId12"/>
-    <p:sldId id="260" r:id="rId13"/>
-    <p:sldId id="264" r:id="rId14"/>
-    <p:sldId id="261" r:id="rId15"/>
-    <p:sldId id="266" r:id="rId16"/>
-    <p:sldId id="267" r:id="rId17"/>
-    <p:sldId id="269" r:id="rId18"/>
-    <p:sldId id="268" r:id="rId19"/>
-    <p:sldId id="265" r:id="rId20"/>
-    <p:sldId id="262" r:id="rId21"/>
-    <p:sldId id="270" r:id="rId22"/>
-    <p:sldId id="271" r:id="rId23"/>
-    <p:sldId id="272" r:id="rId24"/>
-    <p:sldId id="277" r:id="rId25"/>
-    <p:sldId id="284" r:id="rId26"/>
+    <p:sldId id="286" r:id="rId5"/>
+    <p:sldId id="281" r:id="rId6"/>
+    <p:sldId id="279" r:id="rId7"/>
+    <p:sldId id="280" r:id="rId8"/>
+    <p:sldId id="282" r:id="rId9"/>
+    <p:sldId id="283" r:id="rId10"/>
+    <p:sldId id="263" r:id="rId11"/>
+    <p:sldId id="258" r:id="rId12"/>
+    <p:sldId id="259" r:id="rId13"/>
+    <p:sldId id="260" r:id="rId14"/>
+    <p:sldId id="264" r:id="rId15"/>
+    <p:sldId id="261" r:id="rId16"/>
+    <p:sldId id="266" r:id="rId17"/>
+    <p:sldId id="267" r:id="rId18"/>
+    <p:sldId id="269" r:id="rId19"/>
+    <p:sldId id="268" r:id="rId20"/>
+    <p:sldId id="285" r:id="rId21"/>
+    <p:sldId id="265" r:id="rId22"/>
+    <p:sldId id="262" r:id="rId23"/>
+    <p:sldId id="270" r:id="rId24"/>
+    <p:sldId id="271" r:id="rId25"/>
+    <p:sldId id="272" r:id="rId26"/>
+    <p:sldId id="277" r:id="rId27"/>
+    <p:sldId id="284" r:id="rId28"/>
   </p:sldIdLst>
   <p:sldSz cx="12192000" cy="6858000"/>
   <p:notesSz cx="6858000" cy="9144000"/>
@@ -221,7 +223,7 @@
           <a:p>
             <a:fld id="{1CF9B939-B623-E445-92B9-3DB0777E2225}" type="datetimeFigureOut">
               <a:rPr lang="en-US" smtClean="0"/>
-              <a:t>10/24/19</a:t>
+              <a:t>10/30/19</a:t>
             </a:fld>
             <a:endParaRPr lang="en-US" dirty="0"/>
           </a:p>
@@ -532,7 +534,10 @@
           <a:bodyPr/>
           <a:lstStyle/>
           <a:p>
-            <a:endParaRPr lang="en-US" dirty="0"/>
+            <a:r>
+              <a:rPr lang="en-US" dirty="0"/>
+              <a:t>Show off two XD plugins</a:t>
+            </a:r>
           </a:p>
         </p:txBody>
       </p:sp>
@@ -646,7 +651,7 @@
     </p:spTree>
     <p:extLst>
       <p:ext uri="{BB962C8B-B14F-4D97-AF65-F5344CB8AC3E}">
-        <p14:creationId xmlns:p14="http://schemas.microsoft.com/office/powerpoint/2010/main" val="2746921390"/>
+        <p14:creationId xmlns:p14="http://schemas.microsoft.com/office/powerpoint/2010/main" val="1109416630"/>
       </p:ext>
     </p:extLst>
   </p:cSld>
@@ -730,7 +735,7 @@
     </p:spTree>
     <p:extLst>
       <p:ext uri="{BB962C8B-B14F-4D97-AF65-F5344CB8AC3E}">
-        <p14:creationId xmlns:p14="http://schemas.microsoft.com/office/powerpoint/2010/main" val="172430023"/>
+        <p14:creationId xmlns:p14="http://schemas.microsoft.com/office/powerpoint/2010/main" val="2746921390"/>
       </p:ext>
     </p:extLst>
   </p:cSld>
@@ -814,7 +819,7 @@
     </p:spTree>
     <p:extLst>
       <p:ext uri="{BB962C8B-B14F-4D97-AF65-F5344CB8AC3E}">
-        <p14:creationId xmlns:p14="http://schemas.microsoft.com/office/powerpoint/2010/main" val="3132330181"/>
+        <p14:creationId xmlns:p14="http://schemas.microsoft.com/office/powerpoint/2010/main" val="172430023"/>
       </p:ext>
     </p:extLst>
   </p:cSld>
@@ -898,7 +903,7 @@
     </p:spTree>
     <p:extLst>
       <p:ext uri="{BB962C8B-B14F-4D97-AF65-F5344CB8AC3E}">
-        <p14:creationId xmlns:p14="http://schemas.microsoft.com/office/powerpoint/2010/main" val="599897455"/>
+        <p14:creationId xmlns:p14="http://schemas.microsoft.com/office/powerpoint/2010/main" val="3132330181"/>
       </p:ext>
     </p:extLst>
   </p:cSld>
@@ -982,7 +987,7 @@
     </p:spTree>
     <p:extLst>
       <p:ext uri="{BB962C8B-B14F-4D97-AF65-F5344CB8AC3E}">
-        <p14:creationId xmlns:p14="http://schemas.microsoft.com/office/powerpoint/2010/main" val="3188157379"/>
+        <p14:creationId xmlns:p14="http://schemas.microsoft.com/office/powerpoint/2010/main" val="599897455"/>
       </p:ext>
     </p:extLst>
   </p:cSld>
@@ -1066,7 +1071,7 @@
     </p:spTree>
     <p:extLst>
       <p:ext uri="{BB962C8B-B14F-4D97-AF65-F5344CB8AC3E}">
-        <p14:creationId xmlns:p14="http://schemas.microsoft.com/office/powerpoint/2010/main" val="812202392"/>
+        <p14:creationId xmlns:p14="http://schemas.microsoft.com/office/powerpoint/2010/main" val="3188157379"/>
       </p:ext>
     </p:extLst>
   </p:cSld>
@@ -1120,7 +1125,10 @@
           <a:bodyPr/>
           <a:lstStyle/>
           <a:p>
-            <a:endParaRPr lang="en-US" dirty="0"/>
+            <a:r>
+              <a:rPr lang="en-US" dirty="0"/>
+              <a:t>Change the quotes</a:t>
+            </a:r>
           </a:p>
         </p:txBody>
       </p:sp>
@@ -1150,7 +1158,7 @@
     </p:spTree>
     <p:extLst>
       <p:ext uri="{BB962C8B-B14F-4D97-AF65-F5344CB8AC3E}">
-        <p14:creationId xmlns:p14="http://schemas.microsoft.com/office/powerpoint/2010/main" val="1903802874"/>
+        <p14:creationId xmlns:p14="http://schemas.microsoft.com/office/powerpoint/2010/main" val="812202392"/>
       </p:ext>
     </p:extLst>
   </p:cSld>
@@ -1234,7 +1242,7 @@
     </p:spTree>
     <p:extLst>
       <p:ext uri="{BB962C8B-B14F-4D97-AF65-F5344CB8AC3E}">
-        <p14:creationId xmlns:p14="http://schemas.microsoft.com/office/powerpoint/2010/main" val="3196501524"/>
+        <p14:creationId xmlns:p14="http://schemas.microsoft.com/office/powerpoint/2010/main" val="1903802874"/>
       </p:ext>
     </p:extLst>
   </p:cSld>
@@ -1318,7 +1326,7 @@
     </p:spTree>
     <p:extLst>
       <p:ext uri="{BB962C8B-B14F-4D97-AF65-F5344CB8AC3E}">
-        <p14:creationId xmlns:p14="http://schemas.microsoft.com/office/powerpoint/2010/main" val="1293226978"/>
+        <p14:creationId xmlns:p14="http://schemas.microsoft.com/office/powerpoint/2010/main" val="3196501524"/>
       </p:ext>
     </p:extLst>
   </p:cSld>
@@ -1402,7 +1410,7 @@
     </p:spTree>
     <p:extLst>
       <p:ext uri="{BB962C8B-B14F-4D97-AF65-F5344CB8AC3E}">
-        <p14:creationId xmlns:p14="http://schemas.microsoft.com/office/powerpoint/2010/main" val="2457669165"/>
+        <p14:creationId xmlns:p14="http://schemas.microsoft.com/office/powerpoint/2010/main" val="1293226978"/>
       </p:ext>
     </p:extLst>
   </p:cSld>
@@ -1540,7 +1548,10 @@
           <a:bodyPr/>
           <a:lstStyle/>
           <a:p>
-            <a:endParaRPr lang="en-US" dirty="0"/>
+            <a:r>
+              <a:rPr lang="en-US" dirty="0"/>
+              <a:t>Put extra samples link to the readme</a:t>
+            </a:r>
           </a:p>
         </p:txBody>
       </p:sp>
@@ -1570,7 +1581,7 @@
     </p:spTree>
     <p:extLst>
       <p:ext uri="{BB962C8B-B14F-4D97-AF65-F5344CB8AC3E}">
-        <p14:creationId xmlns:p14="http://schemas.microsoft.com/office/powerpoint/2010/main" val="2736274450"/>
+        <p14:creationId xmlns:p14="http://schemas.microsoft.com/office/powerpoint/2010/main" val="2459036997"/>
       </p:ext>
     </p:extLst>
   </p:cSld>
@@ -1654,7 +1665,7 @@
     </p:spTree>
     <p:extLst>
       <p:ext uri="{BB962C8B-B14F-4D97-AF65-F5344CB8AC3E}">
-        <p14:creationId xmlns:p14="http://schemas.microsoft.com/office/powerpoint/2010/main" val="3122525664"/>
+        <p14:creationId xmlns:p14="http://schemas.microsoft.com/office/powerpoint/2010/main" val="2457669165"/>
       </p:ext>
     </p:extLst>
   </p:cSld>
@@ -1738,7 +1749,7 @@
     </p:spTree>
     <p:extLst>
       <p:ext uri="{BB962C8B-B14F-4D97-AF65-F5344CB8AC3E}">
-        <p14:creationId xmlns:p14="http://schemas.microsoft.com/office/powerpoint/2010/main" val="1039659132"/>
+        <p14:creationId xmlns:p14="http://schemas.microsoft.com/office/powerpoint/2010/main" val="2736274450"/>
       </p:ext>
     </p:extLst>
   </p:cSld>
@@ -1822,7 +1833,7 @@
     </p:spTree>
     <p:extLst>
       <p:ext uri="{BB962C8B-B14F-4D97-AF65-F5344CB8AC3E}">
-        <p14:creationId xmlns:p14="http://schemas.microsoft.com/office/powerpoint/2010/main" val="718445899"/>
+        <p14:creationId xmlns:p14="http://schemas.microsoft.com/office/powerpoint/2010/main" val="3122525664"/>
       </p:ext>
     </p:extLst>
   </p:cSld>
@@ -1906,7 +1917,7 @@
     </p:spTree>
     <p:extLst>
       <p:ext uri="{BB962C8B-B14F-4D97-AF65-F5344CB8AC3E}">
-        <p14:creationId xmlns:p14="http://schemas.microsoft.com/office/powerpoint/2010/main" val="3795293371"/>
+        <p14:creationId xmlns:p14="http://schemas.microsoft.com/office/powerpoint/2010/main" val="1039659132"/>
       </p:ext>
     </p:extLst>
   </p:cSld>
@@ -1982,6 +1993,177 @@
             <a:fld id="{031E4353-AF47-7A45-BFA8-F4B4B41541BF}" type="slidenum">
               <a:rPr lang="en-US" smtClean="0"/>
               <a:t>25</a:t>
+            </a:fld>
+            <a:endParaRPr lang="en-US" dirty="0"/>
+          </a:p>
+        </p:txBody>
+      </p:sp>
+    </p:spTree>
+    <p:extLst>
+      <p:ext uri="{BB962C8B-B14F-4D97-AF65-F5344CB8AC3E}">
+        <p14:creationId xmlns:p14="http://schemas.microsoft.com/office/powerpoint/2010/main" val="718445899"/>
+      </p:ext>
+    </p:extLst>
+  </p:cSld>
+  <p:clrMapOvr>
+    <a:masterClrMapping/>
+  </p:clrMapOvr>
+</p:notes>
+</file>
+
+<file path=ppt/notesSlides/notesSlide26.xml><?xml version="1.0" encoding="utf-8"?>
+<p:notes xmlns:a="http://schemas.openxmlformats.org/drawingml/2006/main" xmlns:r="http://schemas.openxmlformats.org/officeDocument/2006/relationships" xmlns:p="http://schemas.openxmlformats.org/presentationml/2006/main">
+  <p:cSld>
+    <p:spTree>
+      <p:nvGrpSpPr>
+        <p:cNvPr id="1" name=""/>
+        <p:cNvGrpSpPr/>
+        <p:nvPr/>
+      </p:nvGrpSpPr>
+      <p:grpSpPr>
+        <a:xfrm>
+          <a:off x="0" y="0"/>
+          <a:ext cx="0" cy="0"/>
+          <a:chOff x="0" y="0"/>
+          <a:chExt cx="0" cy="0"/>
+        </a:xfrm>
+      </p:grpSpPr>
+      <p:sp>
+        <p:nvSpPr>
+          <p:cNvPr id="2" name="Slide Image Placeholder 1"/>
+          <p:cNvSpPr>
+            <a:spLocks noGrp="1" noRot="1" noChangeAspect="1"/>
+          </p:cNvSpPr>
+          <p:nvPr>
+            <p:ph type="sldImg"/>
+          </p:nvPr>
+        </p:nvSpPr>
+        <p:spPr/>
+      </p:sp>
+      <p:sp>
+        <p:nvSpPr>
+          <p:cNvPr id="3" name="Notes Placeholder 2"/>
+          <p:cNvSpPr>
+            <a:spLocks noGrp="1"/>
+          </p:cNvSpPr>
+          <p:nvPr>
+            <p:ph type="body" idx="1"/>
+          </p:nvPr>
+        </p:nvSpPr>
+        <p:spPr/>
+        <p:txBody>
+          <a:bodyPr/>
+          <a:lstStyle/>
+          <a:p>
+            <a:endParaRPr lang="en-US" dirty="0"/>
+          </a:p>
+        </p:txBody>
+      </p:sp>
+      <p:sp>
+        <p:nvSpPr>
+          <p:cNvPr id="4" name="Slide Number Placeholder 3"/>
+          <p:cNvSpPr>
+            <a:spLocks noGrp="1"/>
+          </p:cNvSpPr>
+          <p:nvPr>
+            <p:ph type="sldNum" sz="quarter" idx="10"/>
+          </p:nvPr>
+        </p:nvSpPr>
+        <p:spPr/>
+        <p:txBody>
+          <a:bodyPr/>
+          <a:lstStyle/>
+          <a:p>
+            <a:fld id="{031E4353-AF47-7A45-BFA8-F4B4B41541BF}" type="slidenum">
+              <a:rPr lang="en-US" smtClean="0"/>
+              <a:t>26</a:t>
+            </a:fld>
+            <a:endParaRPr lang="en-US" dirty="0"/>
+          </a:p>
+        </p:txBody>
+      </p:sp>
+    </p:spTree>
+    <p:extLst>
+      <p:ext uri="{BB962C8B-B14F-4D97-AF65-F5344CB8AC3E}">
+        <p14:creationId xmlns:p14="http://schemas.microsoft.com/office/powerpoint/2010/main" val="3795293371"/>
+      </p:ext>
+    </p:extLst>
+  </p:cSld>
+  <p:clrMapOvr>
+    <a:masterClrMapping/>
+  </p:clrMapOvr>
+</p:notes>
+</file>
+
+<file path=ppt/notesSlides/notesSlide27.xml><?xml version="1.0" encoding="utf-8"?>
+<p:notes xmlns:a="http://schemas.openxmlformats.org/drawingml/2006/main" xmlns:r="http://schemas.openxmlformats.org/officeDocument/2006/relationships" xmlns:p="http://schemas.openxmlformats.org/presentationml/2006/main">
+  <p:cSld>
+    <p:spTree>
+      <p:nvGrpSpPr>
+        <p:cNvPr id="1" name=""/>
+        <p:cNvGrpSpPr/>
+        <p:nvPr/>
+      </p:nvGrpSpPr>
+      <p:grpSpPr>
+        <a:xfrm>
+          <a:off x="0" y="0"/>
+          <a:ext cx="0" cy="0"/>
+          <a:chOff x="0" y="0"/>
+          <a:chExt cx="0" cy="0"/>
+        </a:xfrm>
+      </p:grpSpPr>
+      <p:sp>
+        <p:nvSpPr>
+          <p:cNvPr id="2" name="Slide Image Placeholder 1"/>
+          <p:cNvSpPr>
+            <a:spLocks noGrp="1" noRot="1" noChangeAspect="1"/>
+          </p:cNvSpPr>
+          <p:nvPr>
+            <p:ph type="sldImg"/>
+          </p:nvPr>
+        </p:nvSpPr>
+        <p:spPr/>
+      </p:sp>
+      <p:sp>
+        <p:nvSpPr>
+          <p:cNvPr id="3" name="Notes Placeholder 2"/>
+          <p:cNvSpPr>
+            <a:spLocks noGrp="1"/>
+          </p:cNvSpPr>
+          <p:nvPr>
+            <p:ph type="body" idx="1"/>
+          </p:nvPr>
+        </p:nvSpPr>
+        <p:spPr/>
+        <p:txBody>
+          <a:bodyPr/>
+          <a:lstStyle/>
+          <a:p>
+            <a:r>
+              <a:rPr lang="en-US" dirty="0"/>
+              <a:t>Put extra samples link to the readme</a:t>
+            </a:r>
+          </a:p>
+        </p:txBody>
+      </p:sp>
+      <p:sp>
+        <p:nvSpPr>
+          <p:cNvPr id="4" name="Slide Number Placeholder 3"/>
+          <p:cNvSpPr>
+            <a:spLocks noGrp="1"/>
+          </p:cNvSpPr>
+          <p:nvPr>
+            <p:ph type="sldNum" sz="quarter" idx="10"/>
+          </p:nvPr>
+        </p:nvSpPr>
+        <p:spPr/>
+        <p:txBody>
+          <a:bodyPr/>
+          <a:lstStyle/>
+          <a:p>
+            <a:fld id="{031E4353-AF47-7A45-BFA8-F4B4B41541BF}" type="slidenum">
+              <a:rPr lang="en-US" smtClean="0"/>
+              <a:t>27</a:t>
             </a:fld>
             <a:endParaRPr lang="en-US" dirty="0"/>
           </a:p>
@@ -2044,7 +2226,10 @@
           <a:bodyPr/>
           <a:lstStyle/>
           <a:p>
-            <a:endParaRPr lang="en-US" dirty="0"/>
+            <a:r>
+              <a:rPr lang="en-US" dirty="0"/>
+              <a:t>Make the links work</a:t>
+            </a:r>
           </a:p>
         </p:txBody>
       </p:sp>
@@ -2158,7 +2343,7 @@
     </p:spTree>
     <p:extLst>
       <p:ext uri="{BB962C8B-B14F-4D97-AF65-F5344CB8AC3E}">
-        <p14:creationId xmlns:p14="http://schemas.microsoft.com/office/powerpoint/2010/main" val="3004579218"/>
+        <p14:creationId xmlns:p14="http://schemas.microsoft.com/office/powerpoint/2010/main" val="4169685731"/>
       </p:ext>
     </p:extLst>
   </p:cSld>
@@ -2242,7 +2427,7 @@
     </p:spTree>
     <p:extLst>
       <p:ext uri="{BB962C8B-B14F-4D97-AF65-F5344CB8AC3E}">
-        <p14:creationId xmlns:p14="http://schemas.microsoft.com/office/powerpoint/2010/main" val="2951887686"/>
+        <p14:creationId xmlns:p14="http://schemas.microsoft.com/office/powerpoint/2010/main" val="3004579218"/>
       </p:ext>
     </p:extLst>
   </p:cSld>
@@ -2296,7 +2481,10 @@
           <a:bodyPr/>
           <a:lstStyle/>
           <a:p>
-            <a:endParaRPr lang="en-US" dirty="0"/>
+            <a:r>
+              <a:rPr lang="en-US" dirty="0"/>
+              <a:t>Make sure everyone is on the same page</a:t>
+            </a:r>
           </a:p>
         </p:txBody>
       </p:sp>
@@ -2326,7 +2514,7 @@
     </p:spTree>
     <p:extLst>
       <p:ext uri="{BB962C8B-B14F-4D97-AF65-F5344CB8AC3E}">
-        <p14:creationId xmlns:p14="http://schemas.microsoft.com/office/powerpoint/2010/main" val="2022866707"/>
+        <p14:creationId xmlns:p14="http://schemas.microsoft.com/office/powerpoint/2010/main" val="2951887686"/>
       </p:ext>
     </p:extLst>
   </p:cSld>
@@ -2380,7 +2568,10 @@
           <a:bodyPr/>
           <a:lstStyle/>
           <a:p>
-            <a:endParaRPr lang="en-US" dirty="0"/>
+            <a:r>
+              <a:rPr lang="en-US" dirty="0"/>
+              <a:t>Remove label and update the min version to 21.0</a:t>
+            </a:r>
           </a:p>
         </p:txBody>
       </p:sp>
@@ -2410,7 +2601,7 @@
     </p:spTree>
     <p:extLst>
       <p:ext uri="{BB962C8B-B14F-4D97-AF65-F5344CB8AC3E}">
-        <p14:creationId xmlns:p14="http://schemas.microsoft.com/office/powerpoint/2010/main" val="2420210491"/>
+        <p14:creationId xmlns:p14="http://schemas.microsoft.com/office/powerpoint/2010/main" val="2022866707"/>
       </p:ext>
     </p:extLst>
   </p:cSld>
@@ -2494,7 +2685,7 @@
     </p:spTree>
     <p:extLst>
       <p:ext uri="{BB962C8B-B14F-4D97-AF65-F5344CB8AC3E}">
-        <p14:creationId xmlns:p14="http://schemas.microsoft.com/office/powerpoint/2010/main" val="854397015"/>
+        <p14:creationId xmlns:p14="http://schemas.microsoft.com/office/powerpoint/2010/main" val="2420210491"/>
       </p:ext>
     </p:extLst>
   </p:cSld>
@@ -2578,7 +2769,7 @@
     </p:spTree>
     <p:extLst>
       <p:ext uri="{BB962C8B-B14F-4D97-AF65-F5344CB8AC3E}">
-        <p14:creationId xmlns:p14="http://schemas.microsoft.com/office/powerpoint/2010/main" val="1109416630"/>
+        <p14:creationId xmlns:p14="http://schemas.microsoft.com/office/powerpoint/2010/main" val="854397015"/>
       </p:ext>
     </p:extLst>
   </p:cSld>
@@ -2735,7 +2926,7 @@
           <a:p>
             <a:fld id="{5C2624FC-1444-B647-AD6C-82E24AD25842}" type="datetimeFigureOut">
               <a:rPr lang="en-US" smtClean="0"/>
-              <a:t>10/24/19</a:t>
+              <a:t>10/30/19</a:t>
             </a:fld>
             <a:endParaRPr lang="en-US" dirty="0"/>
           </a:p>
@@ -2933,7 +3124,7 @@
           <a:p>
             <a:fld id="{5C2624FC-1444-B647-AD6C-82E24AD25842}" type="datetimeFigureOut">
               <a:rPr lang="en-US" smtClean="0"/>
-              <a:t>10/24/19</a:t>
+              <a:t>10/30/19</a:t>
             </a:fld>
             <a:endParaRPr lang="en-US" dirty="0"/>
           </a:p>
@@ -3141,7 +3332,7 @@
           <a:p>
             <a:fld id="{5C2624FC-1444-B647-AD6C-82E24AD25842}" type="datetimeFigureOut">
               <a:rPr lang="en-US" smtClean="0"/>
-              <a:t>10/24/19</a:t>
+              <a:t>10/30/19</a:t>
             </a:fld>
             <a:endParaRPr lang="en-US" dirty="0"/>
           </a:p>
@@ -3339,7 +3530,7 @@
           <a:p>
             <a:fld id="{5C2624FC-1444-B647-AD6C-82E24AD25842}" type="datetimeFigureOut">
               <a:rPr lang="en-US" smtClean="0"/>
-              <a:t>10/24/19</a:t>
+              <a:t>10/30/19</a:t>
             </a:fld>
             <a:endParaRPr lang="en-US" dirty="0"/>
           </a:p>
@@ -3614,7 +3805,7 @@
           <a:p>
             <a:fld id="{5C2624FC-1444-B647-AD6C-82E24AD25842}" type="datetimeFigureOut">
               <a:rPr lang="en-US" smtClean="0"/>
-              <a:t>10/24/19</a:t>
+              <a:t>10/30/19</a:t>
             </a:fld>
             <a:endParaRPr lang="en-US" dirty="0"/>
           </a:p>
@@ -3879,7 +4070,7 @@
           <a:p>
             <a:fld id="{5C2624FC-1444-B647-AD6C-82E24AD25842}" type="datetimeFigureOut">
               <a:rPr lang="en-US" smtClean="0"/>
-              <a:t>10/24/19</a:t>
+              <a:t>10/30/19</a:t>
             </a:fld>
             <a:endParaRPr lang="en-US" dirty="0"/>
           </a:p>
@@ -4291,7 +4482,7 @@
           <a:p>
             <a:fld id="{5C2624FC-1444-B647-AD6C-82E24AD25842}" type="datetimeFigureOut">
               <a:rPr lang="en-US" smtClean="0"/>
-              <a:t>10/24/19</a:t>
+              <a:t>10/30/19</a:t>
             </a:fld>
             <a:endParaRPr lang="en-US" dirty="0"/>
           </a:p>
@@ -4432,7 +4623,7 @@
           <a:p>
             <a:fld id="{5C2624FC-1444-B647-AD6C-82E24AD25842}" type="datetimeFigureOut">
               <a:rPr lang="en-US" smtClean="0"/>
-              <a:t>10/24/19</a:t>
+              <a:t>10/30/19</a:t>
             </a:fld>
             <a:endParaRPr lang="en-US" dirty="0"/>
           </a:p>
@@ -4545,7 +4736,7 @@
           <a:p>
             <a:fld id="{5C2624FC-1444-B647-AD6C-82E24AD25842}" type="datetimeFigureOut">
               <a:rPr lang="en-US" smtClean="0"/>
-              <a:t>10/24/19</a:t>
+              <a:t>10/30/19</a:t>
             </a:fld>
             <a:endParaRPr lang="en-US" dirty="0"/>
           </a:p>
@@ -4856,7 +5047,7 @@
           <a:p>
             <a:fld id="{5C2624FC-1444-B647-AD6C-82E24AD25842}" type="datetimeFigureOut">
               <a:rPr lang="en-US" smtClean="0"/>
-              <a:t>10/24/19</a:t>
+              <a:t>10/30/19</a:t>
             </a:fld>
             <a:endParaRPr lang="en-US" dirty="0"/>
           </a:p>
@@ -5144,7 +5335,7 @@
           <a:p>
             <a:fld id="{5C2624FC-1444-B647-AD6C-82E24AD25842}" type="datetimeFigureOut">
               <a:rPr lang="en-US" smtClean="0"/>
-              <a:t>10/24/19</a:t>
+              <a:t>10/30/19</a:t>
             </a:fld>
             <a:endParaRPr lang="en-US" dirty="0"/>
           </a:p>
@@ -5385,7 +5576,7 @@
           <a:p>
             <a:fld id="{5C2624FC-1444-B647-AD6C-82E24AD25842}" type="datetimeFigureOut">
               <a:rPr lang="en-US" smtClean="0"/>
-              <a:t>10/28/19</a:t>
+              <a:t>10/30/19</a:t>
             </a:fld>
             <a:endParaRPr lang="en-US" dirty="0"/>
           </a:p>
@@ -6049,6 +6240,403 @@
                   </a:schemeClr>
                 </a:solidFill>
               </a:rPr>
+              <a:t>Create a Rectangle Instance</a:t>
+            </a:r>
+          </a:p>
+        </p:txBody>
+      </p:sp>
+      <p:sp>
+        <p:nvSpPr>
+          <p:cNvPr id="5" name="Down Arrow 4">
+            <a:extLst>
+              <a:ext uri="{FF2B5EF4-FFF2-40B4-BE49-F238E27FC236}">
+                <a16:creationId xmlns:a16="http://schemas.microsoft.com/office/drawing/2014/main" id="{948CEE77-B360-DE4B-8F69-6918DE6A523A}"/>
+              </a:ext>
+            </a:extLst>
+          </p:cNvPr>
+          <p:cNvSpPr/>
+          <p:nvPr/>
+        </p:nvSpPr>
+        <p:spPr>
+          <a:xfrm>
+            <a:off x="5420139" y="2984329"/>
+            <a:ext cx="1351722" cy="1417983"/>
+          </a:xfrm>
+          <a:prstGeom prst="downArrow">
+            <a:avLst/>
+          </a:prstGeom>
+        </p:spPr>
+        <p:style>
+          <a:lnRef idx="2">
+            <a:schemeClr val="accent1">
+              <a:shade val="50000"/>
+            </a:schemeClr>
+          </a:lnRef>
+          <a:fillRef idx="1">
+            <a:schemeClr val="accent1"/>
+          </a:fillRef>
+          <a:effectRef idx="0">
+            <a:schemeClr val="accent1"/>
+          </a:effectRef>
+          <a:fontRef idx="minor">
+            <a:schemeClr val="lt1"/>
+          </a:fontRef>
+        </p:style>
+        <p:txBody>
+          <a:bodyPr rtlCol="0" anchor="ctr"/>
+          <a:lstStyle/>
+          <a:p>
+            <a:pPr algn="ctr"/>
+            <a:endParaRPr lang="en-US" dirty="0"/>
+          </a:p>
+        </p:txBody>
+      </p:sp>
+      <p:sp>
+        <p:nvSpPr>
+          <p:cNvPr id="12" name="Rectangle 11">
+            <a:extLst>
+              <a:ext uri="{FF2B5EF4-FFF2-40B4-BE49-F238E27FC236}">
+                <a16:creationId xmlns:a16="http://schemas.microsoft.com/office/drawing/2014/main" id="{4202D67D-925A-8E46-A725-492B9933C266}"/>
+              </a:ext>
+            </a:extLst>
+          </p:cNvPr>
+          <p:cNvSpPr/>
+          <p:nvPr/>
+        </p:nvSpPr>
+        <p:spPr>
+          <a:xfrm>
+            <a:off x="5254394" y="4717770"/>
+            <a:ext cx="1828800" cy="1828800"/>
+          </a:xfrm>
+          <a:prstGeom prst="rect">
+            <a:avLst/>
+          </a:prstGeom>
+          <a:noFill/>
+        </p:spPr>
+        <p:style>
+          <a:lnRef idx="2">
+            <a:schemeClr val="accent1">
+              <a:shade val="50000"/>
+            </a:schemeClr>
+          </a:lnRef>
+          <a:fillRef idx="1">
+            <a:schemeClr val="accent1"/>
+          </a:fillRef>
+          <a:effectRef idx="0">
+            <a:schemeClr val="accent1"/>
+          </a:effectRef>
+          <a:fontRef idx="minor">
+            <a:schemeClr val="lt1"/>
+          </a:fontRef>
+        </p:style>
+        <p:txBody>
+          <a:bodyPr rtlCol="0" anchor="ctr"/>
+          <a:lstStyle/>
+          <a:p>
+            <a:pPr algn="ctr"/>
+            <a:endParaRPr lang="en-US" dirty="0"/>
+          </a:p>
+        </p:txBody>
+      </p:sp>
+      <p:sp>
+        <p:nvSpPr>
+          <p:cNvPr id="13" name="Rectangle 12">
+            <a:extLst>
+              <a:ext uri="{FF2B5EF4-FFF2-40B4-BE49-F238E27FC236}">
+                <a16:creationId xmlns:a16="http://schemas.microsoft.com/office/drawing/2014/main" id="{A4F5ACA1-F995-4E4E-BAD4-9487E1E92CE1}"/>
+              </a:ext>
+            </a:extLst>
+          </p:cNvPr>
+          <p:cNvSpPr/>
+          <p:nvPr/>
+        </p:nvSpPr>
+        <p:spPr>
+          <a:xfrm>
+            <a:off x="1895061" y="1191543"/>
+            <a:ext cx="8401878" cy="1477328"/>
+          </a:xfrm>
+          <a:prstGeom prst="rect">
+            <a:avLst/>
+          </a:prstGeom>
+        </p:spPr>
+        <p:txBody>
+          <a:bodyPr wrap="square">
+            <a:spAutoFit/>
+          </a:bodyPr>
+          <a:lstStyle/>
+          <a:p>
+            <a:r>
+              <a:rPr lang="en-US" sz="3000" dirty="0">
+                <a:solidFill>
+                  <a:srgbClr val="569CD6"/>
+                </a:solidFill>
+                <a:latin typeface="Menlo" panose="020B0609030804020204" pitchFamily="49" charset="0"/>
+              </a:rPr>
+              <a:t>const</a:t>
+            </a:r>
+            <a:r>
+              <a:rPr lang="en-US" sz="3000" dirty="0">
+                <a:solidFill>
+                  <a:srgbClr val="D4D4D4"/>
+                </a:solidFill>
+                <a:latin typeface="Menlo" panose="020B0609030804020204" pitchFamily="49" charset="0"/>
+              </a:rPr>
+              <a:t> </a:t>
+            </a:r>
+            <a:r>
+              <a:rPr lang="en-US" sz="3000" dirty="0">
+                <a:solidFill>
+                  <a:schemeClr val="accent1">
+                    <a:lumMod val="75000"/>
+                  </a:schemeClr>
+                </a:solidFill>
+                <a:latin typeface="Menlo" panose="020B0609030804020204" pitchFamily="49" charset="0"/>
+              </a:rPr>
+              <a:t>shape</a:t>
+            </a:r>
+            <a:r>
+              <a:rPr lang="en-US" sz="3000" dirty="0">
+                <a:solidFill>
+                  <a:srgbClr val="D4D4D4"/>
+                </a:solidFill>
+                <a:latin typeface="Menlo" panose="020B0609030804020204" pitchFamily="49" charset="0"/>
+              </a:rPr>
+              <a:t> = </a:t>
+            </a:r>
+            <a:r>
+              <a:rPr lang="en-US" sz="3000" dirty="0">
+                <a:solidFill>
+                  <a:srgbClr val="569CD6"/>
+                </a:solidFill>
+                <a:latin typeface="Menlo" panose="020B0609030804020204" pitchFamily="49" charset="0"/>
+              </a:rPr>
+              <a:t>new</a:t>
+            </a:r>
+            <a:r>
+              <a:rPr lang="en-US" sz="3000" dirty="0">
+                <a:solidFill>
+                  <a:srgbClr val="D4D4D4"/>
+                </a:solidFill>
+                <a:latin typeface="Menlo" panose="020B0609030804020204" pitchFamily="49" charset="0"/>
+              </a:rPr>
+              <a:t> </a:t>
+            </a:r>
+            <a:r>
+              <a:rPr lang="en-US" sz="3000" dirty="0">
+                <a:solidFill>
+                  <a:srgbClr val="4EC9B0"/>
+                </a:solidFill>
+                <a:latin typeface="Menlo" panose="020B0609030804020204" pitchFamily="49" charset="0"/>
+              </a:rPr>
+              <a:t>Rectangle</a:t>
+            </a:r>
+            <a:r>
+              <a:rPr lang="en-US" sz="3000" dirty="0">
+                <a:solidFill>
+                  <a:srgbClr val="D4D4D4"/>
+                </a:solidFill>
+                <a:latin typeface="Menlo" panose="020B0609030804020204" pitchFamily="49" charset="0"/>
+              </a:rPr>
+              <a:t>();</a:t>
+            </a:r>
+          </a:p>
+          <a:p>
+            <a:r>
+              <a:rPr lang="en-US" sz="3000" dirty="0">
+                <a:solidFill>
+                  <a:schemeClr val="accent1">
+                    <a:lumMod val="75000"/>
+                  </a:schemeClr>
+                </a:solidFill>
+                <a:latin typeface="Menlo" panose="020B0609030804020204" pitchFamily="49" charset="0"/>
+              </a:rPr>
+              <a:t>shape</a:t>
+            </a:r>
+            <a:r>
+              <a:rPr lang="en-US" sz="3000" dirty="0">
+                <a:solidFill>
+                  <a:srgbClr val="D4D4D4"/>
+                </a:solidFill>
+                <a:latin typeface="Menlo" panose="020B0609030804020204" pitchFamily="49" charset="0"/>
+              </a:rPr>
+              <a:t>.</a:t>
+            </a:r>
+            <a:r>
+              <a:rPr lang="en-US" sz="3000" dirty="0">
+                <a:solidFill>
+                  <a:schemeClr val="accent1">
+                    <a:lumMod val="75000"/>
+                  </a:schemeClr>
+                </a:solidFill>
+                <a:latin typeface="Menlo" panose="020B0609030804020204" pitchFamily="49" charset="0"/>
+              </a:rPr>
+              <a:t>width</a:t>
+            </a:r>
+            <a:r>
+              <a:rPr lang="en-US" sz="3000" dirty="0">
+                <a:solidFill>
+                  <a:srgbClr val="D4D4D4"/>
+                </a:solidFill>
+                <a:latin typeface="Menlo" panose="020B0609030804020204" pitchFamily="49" charset="0"/>
+              </a:rPr>
+              <a:t> = </a:t>
+            </a:r>
+            <a:r>
+              <a:rPr lang="en-US" sz="3000" dirty="0">
+                <a:solidFill>
+                  <a:schemeClr val="accent2"/>
+                </a:solidFill>
+                <a:latin typeface="Menlo" panose="020B0609030804020204" pitchFamily="49" charset="0"/>
+              </a:rPr>
+              <a:t>100</a:t>
+            </a:r>
+            <a:r>
+              <a:rPr lang="en-US" sz="3000" dirty="0">
+                <a:solidFill>
+                  <a:srgbClr val="D4D4D4"/>
+                </a:solidFill>
+                <a:latin typeface="Menlo" panose="020B0609030804020204" pitchFamily="49" charset="0"/>
+              </a:rPr>
+              <a:t>;</a:t>
+            </a:r>
+          </a:p>
+          <a:p>
+            <a:r>
+              <a:rPr lang="en-US" sz="3000" dirty="0">
+                <a:solidFill>
+                  <a:schemeClr val="accent1">
+                    <a:lumMod val="75000"/>
+                  </a:schemeClr>
+                </a:solidFill>
+                <a:latin typeface="Menlo" panose="020B0609030804020204" pitchFamily="49" charset="0"/>
+              </a:rPr>
+              <a:t>shape</a:t>
+            </a:r>
+            <a:r>
+              <a:rPr lang="en-US" sz="3000" dirty="0">
+                <a:solidFill>
+                  <a:srgbClr val="D4D4D4"/>
+                </a:solidFill>
+                <a:latin typeface="Menlo" panose="020B0609030804020204" pitchFamily="49" charset="0"/>
+              </a:rPr>
+              <a:t>.</a:t>
+            </a:r>
+            <a:r>
+              <a:rPr lang="en-US" sz="3000" dirty="0">
+                <a:solidFill>
+                  <a:schemeClr val="accent1">
+                    <a:lumMod val="75000"/>
+                  </a:schemeClr>
+                </a:solidFill>
+                <a:latin typeface="Menlo" panose="020B0609030804020204" pitchFamily="49" charset="0"/>
+              </a:rPr>
+              <a:t>height</a:t>
+            </a:r>
+            <a:r>
+              <a:rPr lang="en-US" sz="3000" dirty="0">
+                <a:solidFill>
+                  <a:srgbClr val="D4D4D4"/>
+                </a:solidFill>
+                <a:latin typeface="Menlo" panose="020B0609030804020204" pitchFamily="49" charset="0"/>
+              </a:rPr>
+              <a:t> = </a:t>
+            </a:r>
+            <a:r>
+              <a:rPr lang="en-US" sz="3000" dirty="0">
+                <a:solidFill>
+                  <a:schemeClr val="accent2"/>
+                </a:solidFill>
+                <a:latin typeface="Menlo" panose="020B0609030804020204" pitchFamily="49" charset="0"/>
+              </a:rPr>
+              <a:t>100</a:t>
+            </a:r>
+            <a:r>
+              <a:rPr lang="en-US" sz="3000" dirty="0">
+                <a:solidFill>
+                  <a:srgbClr val="D4D4D4"/>
+                </a:solidFill>
+                <a:latin typeface="Menlo" panose="020B0609030804020204" pitchFamily="49" charset="0"/>
+              </a:rPr>
+              <a:t>;</a:t>
+            </a:r>
+            <a:endParaRPr lang="en-US" sz="3000" b="0" dirty="0">
+              <a:solidFill>
+                <a:srgbClr val="D4D4D4"/>
+              </a:solidFill>
+              <a:effectLst/>
+              <a:latin typeface="Menlo" panose="020B0609030804020204" pitchFamily="49" charset="0"/>
+            </a:endParaRPr>
+          </a:p>
+        </p:txBody>
+      </p:sp>
+    </p:spTree>
+    <p:extLst>
+      <p:ext uri="{BB962C8B-B14F-4D97-AF65-F5344CB8AC3E}">
+        <p14:creationId xmlns:p14="http://schemas.microsoft.com/office/powerpoint/2010/main" val="1132534878"/>
+      </p:ext>
+    </p:extLst>
+  </p:cSld>
+  <p:clrMapOvr>
+    <a:masterClrMapping/>
+  </p:clrMapOvr>
+</p:sld>
+</file>
+
+<file path=ppt/slides/slide11.xml><?xml version="1.0" encoding="utf-8"?>
+<p:sld xmlns:a="http://schemas.openxmlformats.org/drawingml/2006/main" xmlns:r="http://schemas.openxmlformats.org/officeDocument/2006/relationships" xmlns:p="http://schemas.openxmlformats.org/presentationml/2006/main">
+  <p:cSld>
+    <p:spTree>
+      <p:nvGrpSpPr>
+        <p:cNvPr id="1" name=""/>
+        <p:cNvGrpSpPr/>
+        <p:nvPr/>
+      </p:nvGrpSpPr>
+      <p:grpSpPr>
+        <a:xfrm>
+          <a:off x="0" y="0"/>
+          <a:ext cx="0" cy="0"/>
+          <a:chOff x="0" y="0"/>
+          <a:chExt cx="0" cy="0"/>
+        </a:xfrm>
+      </p:grpSpPr>
+      <p:sp>
+        <p:nvSpPr>
+          <p:cNvPr id="21" name="TextBox 20">
+            <a:extLst>
+              <a:ext uri="{FF2B5EF4-FFF2-40B4-BE49-F238E27FC236}">
+                <a16:creationId xmlns:a16="http://schemas.microsoft.com/office/drawing/2014/main" id="{887247C4-8834-874B-8F45-B85DB5798056}"/>
+              </a:ext>
+            </a:extLst>
+          </p:cNvPr>
+          <p:cNvSpPr txBox="1"/>
+          <p:nvPr/>
+        </p:nvSpPr>
+        <p:spPr>
+          <a:xfrm>
+            <a:off x="2551044" y="104840"/>
+            <a:ext cx="7089913" cy="784830"/>
+          </a:xfrm>
+          <a:prstGeom prst="rect">
+            <a:avLst/>
+          </a:prstGeom>
+          <a:noFill/>
+        </p:spPr>
+        <p:txBody>
+          <a:bodyPr wrap="square" rtlCol="0">
+            <a:spAutoFit/>
+          </a:bodyPr>
+          <a:lstStyle/>
+          <a:p>
+            <a:pPr algn="ctr"/>
+            <a:r>
+              <a:rPr lang="en-US" sz="4500" dirty="0">
+                <a:solidFill>
+                  <a:schemeClr val="tx1">
+                    <a:lumMod val="50000"/>
+                    <a:lumOff val="50000"/>
+                  </a:schemeClr>
+                </a:solidFill>
+              </a:rPr>
               <a:t>Color the Rectangle</a:t>
             </a:r>
           </a:p>
@@ -6289,7 +6877,7 @@
 </p:sld>
 </file>
 
-<file path=ppt/slides/slide11.xml><?xml version="1.0" encoding="utf-8"?>
+<file path=ppt/slides/slide12.xml><?xml version="1.0" encoding="utf-8"?>
 <p:sld xmlns:a="http://schemas.openxmlformats.org/drawingml/2006/main" xmlns:r="http://schemas.openxmlformats.org/officeDocument/2006/relationships" xmlns:p="http://schemas.openxmlformats.org/presentationml/2006/main">
   <p:cSld>
     <p:spTree>
@@ -6643,7 +7231,7 @@
 </p:sld>
 </file>
 
-<file path=ppt/slides/slide12.xml><?xml version="1.0" encoding="utf-8"?>
+<file path=ppt/slides/slide13.xml><?xml version="1.0" encoding="utf-8"?>
 <p:sld xmlns:a="http://schemas.openxmlformats.org/drawingml/2006/main" xmlns:r="http://schemas.openxmlformats.org/officeDocument/2006/relationships" xmlns:p="http://schemas.openxmlformats.org/presentationml/2006/main">
   <p:cSld>
     <p:spTree>
@@ -6993,7 +7581,7 @@
 </p:sld>
 </file>
 
-<file path=ppt/slides/slide13.xml><?xml version="1.0" encoding="utf-8"?>
+<file path=ppt/slides/slide14.xml><?xml version="1.0" encoding="utf-8"?>
 <p:sld xmlns:a="http://schemas.openxmlformats.org/drawingml/2006/main" xmlns:r="http://schemas.openxmlformats.org/officeDocument/2006/relationships" xmlns:p="http://schemas.openxmlformats.org/presentationml/2006/main">
   <p:cSld>
     <p:spTree>
@@ -7072,7 +7660,7 @@
 </p:sld>
 </file>
 
-<file path=ppt/slides/slide14.xml><?xml version="1.0" encoding="utf-8"?>
+<file path=ppt/slides/slide15.xml><?xml version="1.0" encoding="utf-8"?>
 <p:sld xmlns:a="http://schemas.openxmlformats.org/drawingml/2006/main" xmlns:r="http://schemas.openxmlformats.org/officeDocument/2006/relationships" xmlns:p="http://schemas.openxmlformats.org/presentationml/2006/main">
   <p:cSld>
     <p:spTree>
@@ -7469,7 +8057,7 @@
 </p:sld>
 </file>
 
-<file path=ppt/slides/slide15.xml><?xml version="1.0" encoding="utf-8"?>
+<file path=ppt/slides/slide16.xml><?xml version="1.0" encoding="utf-8"?>
 <p:sld xmlns:a="http://schemas.openxmlformats.org/drawingml/2006/main" xmlns:r="http://schemas.openxmlformats.org/officeDocument/2006/relationships" xmlns:p="http://schemas.openxmlformats.org/presentationml/2006/main">
   <p:cSld>
     <p:spTree>
@@ -8176,7 +8764,11 @@
                 </a:solidFill>
                 <a:latin typeface="Menlo" panose="020B0609030804020204" pitchFamily="49" charset="0"/>
               </a:rPr>
-              <a:t>= “</a:t>
+              <a:t>= </a:t>
+            </a:r>
+            <a:r>
+              <a:rPr lang="en-US" dirty="0"/>
+              <a:t>"</a:t>
             </a:r>
             <a:r>
               <a:rPr lang="en-US" dirty="0">
@@ -8190,13 +8782,17 @@
               <a:t>uppercase</a:t>
             </a:r>
             <a:r>
+              <a:rPr lang="en-US" dirty="0"/>
+              <a:t>"</a:t>
+            </a:r>
+            <a:r>
               <a:rPr lang="en-US" dirty="0">
                 <a:solidFill>
                   <a:srgbClr val="D4D4D4"/>
                 </a:solidFill>
                 <a:latin typeface="Menlo" panose="020B0609030804020204" pitchFamily="49" charset="0"/>
               </a:rPr>
-              <a:t>”;</a:t>
+              <a:t>;</a:t>
             </a:r>
             <a:endParaRPr lang="en-US" dirty="0">
               <a:solidFill>
@@ -8337,7 +8933,7 @@
 </p:sld>
 </file>
 
-<file path=ppt/slides/slide16.xml><?xml version="1.0" encoding="utf-8"?>
+<file path=ppt/slides/slide17.xml><?xml version="1.0" encoding="utf-8"?>
 <p:sld xmlns:a="http://schemas.openxmlformats.org/drawingml/2006/main" xmlns:r="http://schemas.openxmlformats.org/officeDocument/2006/relationships" xmlns:p="http://schemas.openxmlformats.org/presentationml/2006/main">
   <p:cSld>
     <p:spTree>
@@ -8368,8 +8964,8 @@
         </p:nvSpPr>
         <p:spPr>
           <a:xfrm>
-            <a:off x="1732721" y="104840"/>
-            <a:ext cx="8726558" cy="784830"/>
+            <a:off x="1732720" y="104840"/>
+            <a:ext cx="9337061" cy="784830"/>
           </a:xfrm>
           <a:prstGeom prst="rect">
             <a:avLst/>
@@ -8392,7 +8988,7 @@
                   </a:schemeClr>
                 </a:solidFill>
               </a:rPr>
-              <a:t>Set padding and create a Rectangle</a:t>
+              <a:t>create a Rectangle and set padding ¸</a:t>
             </a:r>
           </a:p>
         </p:txBody>
@@ -9231,7 +9827,7 @@
 </p:sld>
 </file>
 
-<file path=ppt/slides/slide17.xml><?xml version="1.0" encoding="utf-8"?>
+<file path=ppt/slides/slide18.xml><?xml version="1.0" encoding="utf-8"?>
 <p:sld xmlns:a="http://schemas.openxmlformats.org/drawingml/2006/main" xmlns:r="http://schemas.openxmlformats.org/officeDocument/2006/relationships" xmlns:p="http://schemas.openxmlformats.org/presentationml/2006/main">
   <p:cSld>
     <p:spTree>
@@ -9580,7 +10176,7 @@
 </p:sld>
 </file>
 
-<file path=ppt/slides/slide18.xml><?xml version="1.0" encoding="utf-8"?>
+<file path=ppt/slides/slide19.xml><?xml version="1.0" encoding="utf-8"?>
 <p:sld xmlns:a="http://schemas.openxmlformats.org/drawingml/2006/main" xmlns:r="http://schemas.openxmlformats.org/officeDocument/2006/relationships" xmlns:p="http://schemas.openxmlformats.org/presentationml/2006/main">
   <p:cSld>
     <p:spTree>
@@ -10568,85 +11164,6 @@
 </p:sld>
 </file>
 
-<file path=ppt/slides/slide19.xml><?xml version="1.0" encoding="utf-8"?>
-<p:sld xmlns:a="http://schemas.openxmlformats.org/drawingml/2006/main" xmlns:r="http://schemas.openxmlformats.org/officeDocument/2006/relationships" xmlns:p="http://schemas.openxmlformats.org/presentationml/2006/main">
-  <p:cSld>
-    <p:spTree>
-      <p:nvGrpSpPr>
-        <p:cNvPr id="1" name=""/>
-        <p:cNvGrpSpPr/>
-        <p:nvPr/>
-      </p:nvGrpSpPr>
-      <p:grpSpPr>
-        <a:xfrm>
-          <a:off x="0" y="0"/>
-          <a:ext cx="0" cy="0"/>
-          <a:chOff x="0" y="0"/>
-          <a:chExt cx="0" cy="0"/>
-        </a:xfrm>
-      </p:grpSpPr>
-      <p:sp>
-        <p:nvSpPr>
-          <p:cNvPr id="2" name="TextBox 1">
-            <a:extLst>
-              <a:ext uri="{FF2B5EF4-FFF2-40B4-BE49-F238E27FC236}">
-                <a16:creationId xmlns:a16="http://schemas.microsoft.com/office/drawing/2014/main" id="{67B4816E-72C2-F84B-80B4-E397406F2CDA}"/>
-              </a:ext>
-            </a:extLst>
-          </p:cNvPr>
-          <p:cNvSpPr txBox="1"/>
-          <p:nvPr/>
-        </p:nvSpPr>
-        <p:spPr>
-          <a:xfrm>
-            <a:off x="1782418" y="2921169"/>
-            <a:ext cx="8627165" cy="1015663"/>
-          </a:xfrm>
-          <a:prstGeom prst="rect">
-            <a:avLst/>
-          </a:prstGeom>
-          <a:noFill/>
-        </p:spPr>
-        <p:txBody>
-          <a:bodyPr wrap="square" rtlCol="0">
-            <a:spAutoFit/>
-          </a:bodyPr>
-          <a:lstStyle/>
-          <a:p>
-            <a:r>
-              <a:rPr lang="en-US" sz="6000" dirty="0">
-                <a:solidFill>
-                  <a:schemeClr val="accent4">
-                    <a:lumMod val="75000"/>
-                  </a:schemeClr>
-                </a:solidFill>
-              </a:rPr>
-              <a:t>PART3</a:t>
-            </a:r>
-            <a:r>
-              <a:rPr lang="en-US" sz="6000" dirty="0">
-                <a:solidFill>
-                  <a:srgbClr val="0070C0"/>
-                </a:solidFill>
-              </a:rPr>
-              <a:t>  Creating a dialog UI</a:t>
-            </a:r>
-          </a:p>
-        </p:txBody>
-      </p:sp>
-    </p:spTree>
-    <p:extLst>
-      <p:ext uri="{BB962C8B-B14F-4D97-AF65-F5344CB8AC3E}">
-        <p14:creationId xmlns:p14="http://schemas.microsoft.com/office/powerpoint/2010/main" val="1847897279"/>
-      </p:ext>
-    </p:extLst>
-  </p:cSld>
-  <p:clrMapOvr>
-    <a:masterClrMapping/>
-  </p:clrMapOvr>
-</p:sld>
-</file>
-
 <file path=ppt/slides/slide2.xml><?xml version="1.0" encoding="utf-8"?>
 <p:sld xmlns:a="http://schemas.openxmlformats.org/drawingml/2006/main" xmlns:r="http://schemas.openxmlformats.org/officeDocument/2006/relationships" xmlns:p="http://schemas.openxmlformats.org/presentationml/2006/main">
   <p:cSld>
@@ -10727,6 +11244,181 @@
 </file>
 
 <file path=ppt/slides/slide20.xml><?xml version="1.0" encoding="utf-8"?>
+<p:sld xmlns:a="http://schemas.openxmlformats.org/drawingml/2006/main" xmlns:r="http://schemas.openxmlformats.org/officeDocument/2006/relationships" xmlns:p="http://schemas.openxmlformats.org/presentationml/2006/main">
+  <p:cSld>
+    <p:spTree>
+      <p:nvGrpSpPr>
+        <p:cNvPr id="1" name=""/>
+        <p:cNvGrpSpPr/>
+        <p:nvPr/>
+      </p:nvGrpSpPr>
+      <p:grpSpPr>
+        <a:xfrm>
+          <a:off x="0" y="0"/>
+          <a:ext cx="0" cy="0"/>
+          <a:chOff x="0" y="0"/>
+          <a:chExt cx="0" cy="0"/>
+        </a:xfrm>
+      </p:grpSpPr>
+      <p:sp>
+        <p:nvSpPr>
+          <p:cNvPr id="2" name="TextBox 1">
+            <a:extLst>
+              <a:ext uri="{FF2B5EF4-FFF2-40B4-BE49-F238E27FC236}">
+                <a16:creationId xmlns:a16="http://schemas.microsoft.com/office/drawing/2014/main" id="{67B4816E-72C2-F84B-80B4-E397406F2CDA}"/>
+              </a:ext>
+            </a:extLst>
+          </p:cNvPr>
+          <p:cNvSpPr txBox="1"/>
+          <p:nvPr/>
+        </p:nvSpPr>
+        <p:spPr>
+          <a:xfrm>
+            <a:off x="1468581" y="2491677"/>
+            <a:ext cx="10612582" cy="2862322"/>
+          </a:xfrm>
+          <a:prstGeom prst="rect">
+            <a:avLst/>
+          </a:prstGeom>
+          <a:noFill/>
+        </p:spPr>
+        <p:txBody>
+          <a:bodyPr wrap="square" rtlCol="0">
+            <a:spAutoFit/>
+          </a:bodyPr>
+          <a:lstStyle/>
+          <a:p>
+            <a:r>
+              <a:rPr lang="en-US" sz="6000" dirty="0">
+                <a:solidFill>
+                  <a:srgbClr val="0070C0"/>
+                </a:solidFill>
+              </a:rPr>
+              <a:t>Provide us feedback!</a:t>
+            </a:r>
+          </a:p>
+          <a:p>
+            <a:r>
+              <a:rPr lang="en-US" sz="6000" dirty="0">
+                <a:solidFill>
+                  <a:schemeClr val="accent4">
+                    <a:lumMod val="75000"/>
+                  </a:schemeClr>
+                </a:solidFill>
+                <a:hlinkClick r:id="rId3"/>
+              </a:rPr>
+              <a:t>http://adobe.ly/xdapifeedback</a:t>
+            </a:r>
+            <a:endParaRPr lang="en-US" sz="6000" dirty="0">
+              <a:solidFill>
+                <a:schemeClr val="accent4">
+                  <a:lumMod val="75000"/>
+                </a:schemeClr>
+              </a:solidFill>
+            </a:endParaRPr>
+          </a:p>
+          <a:p>
+            <a:endParaRPr lang="en-US" sz="6000" dirty="0">
+              <a:solidFill>
+                <a:srgbClr val="0070C0"/>
+              </a:solidFill>
+            </a:endParaRPr>
+          </a:p>
+        </p:txBody>
+      </p:sp>
+    </p:spTree>
+    <p:extLst>
+      <p:ext uri="{BB962C8B-B14F-4D97-AF65-F5344CB8AC3E}">
+        <p14:creationId xmlns:p14="http://schemas.microsoft.com/office/powerpoint/2010/main" val="2095872829"/>
+      </p:ext>
+    </p:extLst>
+  </p:cSld>
+  <p:clrMapOvr>
+    <a:masterClrMapping/>
+  </p:clrMapOvr>
+</p:sld>
+</file>
+
+<file path=ppt/slides/slide21.xml><?xml version="1.0" encoding="utf-8"?>
+<p:sld xmlns:a="http://schemas.openxmlformats.org/drawingml/2006/main" xmlns:r="http://schemas.openxmlformats.org/officeDocument/2006/relationships" xmlns:p="http://schemas.openxmlformats.org/presentationml/2006/main">
+  <p:cSld>
+    <p:spTree>
+      <p:nvGrpSpPr>
+        <p:cNvPr id="1" name=""/>
+        <p:cNvGrpSpPr/>
+        <p:nvPr/>
+      </p:nvGrpSpPr>
+      <p:grpSpPr>
+        <a:xfrm>
+          <a:off x="0" y="0"/>
+          <a:ext cx="0" cy="0"/>
+          <a:chOff x="0" y="0"/>
+          <a:chExt cx="0" cy="0"/>
+        </a:xfrm>
+      </p:grpSpPr>
+      <p:sp>
+        <p:nvSpPr>
+          <p:cNvPr id="2" name="TextBox 1">
+            <a:extLst>
+              <a:ext uri="{FF2B5EF4-FFF2-40B4-BE49-F238E27FC236}">
+                <a16:creationId xmlns:a16="http://schemas.microsoft.com/office/drawing/2014/main" id="{67B4816E-72C2-F84B-80B4-E397406F2CDA}"/>
+              </a:ext>
+            </a:extLst>
+          </p:cNvPr>
+          <p:cNvSpPr txBox="1"/>
+          <p:nvPr/>
+        </p:nvSpPr>
+        <p:spPr>
+          <a:xfrm>
+            <a:off x="1782418" y="2921169"/>
+            <a:ext cx="8627165" cy="1015663"/>
+          </a:xfrm>
+          <a:prstGeom prst="rect">
+            <a:avLst/>
+          </a:prstGeom>
+          <a:noFill/>
+        </p:spPr>
+        <p:txBody>
+          <a:bodyPr wrap="square" rtlCol="0">
+            <a:spAutoFit/>
+          </a:bodyPr>
+          <a:lstStyle/>
+          <a:p>
+            <a:r>
+              <a:rPr lang="en-US" sz="6000" dirty="0">
+                <a:solidFill>
+                  <a:schemeClr val="accent4">
+                    <a:lumMod val="75000"/>
+                  </a:schemeClr>
+                </a:solidFill>
+              </a:rPr>
+              <a:t>PART3</a:t>
+            </a:r>
+            <a:r>
+              <a:rPr lang="en-US" sz="6000" dirty="0">
+                <a:solidFill>
+                  <a:srgbClr val="0070C0"/>
+                </a:solidFill>
+              </a:rPr>
+              <a:t>  Creating a dialog UI</a:t>
+            </a:r>
+          </a:p>
+        </p:txBody>
+      </p:sp>
+    </p:spTree>
+    <p:extLst>
+      <p:ext uri="{BB962C8B-B14F-4D97-AF65-F5344CB8AC3E}">
+        <p14:creationId xmlns:p14="http://schemas.microsoft.com/office/powerpoint/2010/main" val="1847897279"/>
+      </p:ext>
+    </p:extLst>
+  </p:cSld>
+  <p:clrMapOvr>
+    <a:masterClrMapping/>
+  </p:clrMapOvr>
+</p:sld>
+</file>
+
+<file path=ppt/slides/slide22.xml><?xml version="1.0" encoding="utf-8"?>
 <p:sld xmlns:a="http://schemas.openxmlformats.org/drawingml/2006/main" xmlns:r="http://schemas.openxmlformats.org/officeDocument/2006/relationships" xmlns:p="http://schemas.openxmlformats.org/presentationml/2006/main">
   <p:cSld>
     <p:spTree>
@@ -11132,7 +11824,7 @@
 </p:sld>
 </file>
 
-<file path=ppt/slides/slide21.xml><?xml version="1.0" encoding="utf-8"?>
+<file path=ppt/slides/slide23.xml><?xml version="1.0" encoding="utf-8"?>
 <p:sld xmlns:a="http://schemas.openxmlformats.org/drawingml/2006/main" xmlns:r="http://schemas.openxmlformats.org/officeDocument/2006/relationships" xmlns:p="http://schemas.openxmlformats.org/presentationml/2006/main">
   <p:cSld>
     <p:spTree>
@@ -11590,7 +12282,7 @@
 </p:sld>
 </file>
 
-<file path=ppt/slides/slide22.xml><?xml version="1.0" encoding="utf-8"?>
+<file path=ppt/slides/slide24.xml><?xml version="1.0" encoding="utf-8"?>
 <p:sld xmlns:a="http://schemas.openxmlformats.org/drawingml/2006/main" xmlns:r="http://schemas.openxmlformats.org/officeDocument/2006/relationships" xmlns:p="http://schemas.openxmlformats.org/presentationml/2006/main">
   <p:cSld>
     <p:spTree>
@@ -12121,7 +12813,7 @@
 </p:sld>
 </file>
 
-<file path=ppt/slides/slide23.xml><?xml version="1.0" encoding="utf-8"?>
+<file path=ppt/slides/slide25.xml><?xml version="1.0" encoding="utf-8"?>
 <p:sld xmlns:a="http://schemas.openxmlformats.org/drawingml/2006/main" xmlns:r="http://schemas.openxmlformats.org/officeDocument/2006/relationships" xmlns:p="http://schemas.openxmlformats.org/presentationml/2006/main">
   <p:cSld>
     <p:spTree>
@@ -12200,7 +12892,7 @@
 </p:sld>
 </file>
 
-<file path=ppt/slides/slide24.xml><?xml version="1.0" encoding="utf-8"?>
+<file path=ppt/slides/slide26.xml><?xml version="1.0" encoding="utf-8"?>
 <p:sld xmlns:a="http://schemas.openxmlformats.org/drawingml/2006/main" xmlns:r="http://schemas.openxmlformats.org/officeDocument/2006/relationships" xmlns:p="http://schemas.openxmlformats.org/presentationml/2006/main">
   <p:cSld>
     <p:spTree>
@@ -12316,7 +13008,7 @@
 </p:sld>
 </file>
 
-<file path=ppt/slides/slide25.xml><?xml version="1.0" encoding="utf-8"?>
+<file path=ppt/slides/slide27.xml><?xml version="1.0" encoding="utf-8"?>
 <p:sld xmlns:a="http://schemas.openxmlformats.org/drawingml/2006/main" xmlns:r="http://schemas.openxmlformats.org/officeDocument/2006/relationships" xmlns:p="http://schemas.openxmlformats.org/presentationml/2006/main">
   <p:cSld>
     <p:spTree>
@@ -12439,18 +13131,7 @@
                 </a:solidFill>
                 <a:hlinkClick r:id="rId3"/>
               </a:rPr>
-              <a:t>http://adobe.ly/</a:t>
-            </a:r>
-            <a:r>
-              <a:rPr lang="en-US" sz="6000" dirty="0">
-                <a:solidFill>
-                  <a:schemeClr val="accent4">
-                    <a:lumMod val="75000"/>
-                  </a:schemeClr>
-                </a:solidFill>
-                <a:hlinkClick r:id="rId4"/>
-              </a:rPr>
-              <a:t>xdapi</a:t>
+              <a:t>http://adobe.ly/xdapi</a:t>
             </a:r>
             <a:endParaRPr lang="en-US" sz="6000" dirty="0">
               <a:solidFill>
@@ -12497,20 +13178,9 @@
                     <a:lumMod val="75000"/>
                   </a:schemeClr>
                 </a:solidFill>
-                <a:hlinkClick r:id="rId3"/>
-              </a:rPr>
-              <a:t>http://adobe.ly/</a:t>
-            </a:r>
-            <a:r>
-              <a:rPr lang="en-US" sz="6000" dirty="0">
-                <a:solidFill>
-                  <a:schemeClr val="accent4">
-                    <a:lumMod val="75000"/>
-                  </a:schemeClr>
-                </a:solidFill>
                 <a:hlinkClick r:id="rId4"/>
               </a:rPr>
-              <a:t>xdapifeedback</a:t>
+              <a:t>http://adobe.ly/xdapifeedback</a:t>
             </a:r>
             <a:endParaRPr lang="en-US" sz="6000" dirty="0">
               <a:solidFill>
@@ -12590,17 +13260,17 @@
                   </a:schemeClr>
                 </a:solidFill>
               </a:rPr>
-              <a:t>Create a new folder</a:t>
+              <a:t>Get your text editor ready</a:t>
             </a:r>
           </a:p>
         </p:txBody>
       </p:sp>
       <p:pic>
         <p:nvPicPr>
-          <p:cNvPr id="5" name="Picture 4">
-            <a:extLst>
-              <a:ext uri="{FF2B5EF4-FFF2-40B4-BE49-F238E27FC236}">
-                <a16:creationId xmlns:a16="http://schemas.microsoft.com/office/drawing/2014/main" id="{0EBE9434-7077-D443-A8C5-E3D5FCAC9C83}"/>
+          <p:cNvPr id="4" name="Picture 3">
+            <a:extLst>
+              <a:ext uri="{FF2B5EF4-FFF2-40B4-BE49-F238E27FC236}">
+                <a16:creationId xmlns:a16="http://schemas.microsoft.com/office/drawing/2014/main" id="{DC9EDC0E-F44D-0E4A-9D90-7CF7297D1755}"/>
               </a:ext>
             </a:extLst>
           </p:cNvPr>
@@ -12617,53 +13287,78 @@
         </p:blipFill>
         <p:spPr>
           <a:xfrm>
-            <a:off x="2938418" y="1183284"/>
-            <a:ext cx="6315164" cy="3141794"/>
+            <a:off x="930908" y="2684003"/>
+            <a:ext cx="2260599" cy="2260599"/>
           </a:xfrm>
           <a:prstGeom prst="rect">
             <a:avLst/>
           </a:prstGeom>
         </p:spPr>
       </p:pic>
-      <p:sp>
-        <p:nvSpPr>
-          <p:cNvPr id="6" name="TextBox 5">
-            <a:extLst>
-              <a:ext uri="{FF2B5EF4-FFF2-40B4-BE49-F238E27FC236}">
-                <a16:creationId xmlns:a16="http://schemas.microsoft.com/office/drawing/2014/main" id="{CAC1CAB1-0E15-E54E-935D-57D717DA1B96}"/>
-              </a:ext>
-            </a:extLst>
-          </p:cNvPr>
-          <p:cNvSpPr txBox="1"/>
+      <p:pic>
+        <p:nvPicPr>
+          <p:cNvPr id="8" name="Picture 7">
+            <a:extLst>
+              <a:ext uri="{FF2B5EF4-FFF2-40B4-BE49-F238E27FC236}">
+                <a16:creationId xmlns:a16="http://schemas.microsoft.com/office/drawing/2014/main" id="{86D6530B-9EAA-BC46-86AC-746A7453012B}"/>
+              </a:ext>
+            </a:extLst>
+          </p:cNvPr>
+          <p:cNvPicPr>
+            <a:picLocks noChangeAspect="1"/>
+          </p:cNvPicPr>
           <p:nvPr/>
-        </p:nvSpPr>
+        </p:nvPicPr>
+        <p:blipFill>
+          <a:blip r:embed="rId4"/>
+          <a:stretch>
+            <a:fillRect/>
+          </a:stretch>
+        </p:blipFill>
         <p:spPr>
           <a:xfrm>
-            <a:off x="2891405" y="4907560"/>
-            <a:ext cx="6409189" cy="369332"/>
+            <a:off x="4965700" y="2684002"/>
+            <a:ext cx="2260600" cy="2260600"/>
           </a:xfrm>
           <a:prstGeom prst="rect">
             <a:avLst/>
           </a:prstGeom>
-          <a:noFill/>
         </p:spPr>
-        <p:txBody>
-          <a:bodyPr wrap="square" rtlCol="0">
-            <a:spAutoFit/>
-          </a:bodyPr>
-          <a:lstStyle/>
-          <a:p>
-            <a:r>
-              <a:rPr lang="en-US" dirty="0"/>
-              <a:t>Plugins &gt; Development &gt; Show Develop Folder &gt; Create new folder</a:t>
-            </a:r>
-          </a:p>
-        </p:txBody>
-      </p:sp>
+      </p:pic>
+      <p:pic>
+        <p:nvPicPr>
+          <p:cNvPr id="10" name="Picture 9">
+            <a:extLst>
+              <a:ext uri="{FF2B5EF4-FFF2-40B4-BE49-F238E27FC236}">
+                <a16:creationId xmlns:a16="http://schemas.microsoft.com/office/drawing/2014/main" id="{D3EBEBDA-ECED-9B4D-97DE-F62EE8D12633}"/>
+              </a:ext>
+            </a:extLst>
+          </p:cNvPr>
+          <p:cNvPicPr>
+            <a:picLocks noChangeAspect="1"/>
+          </p:cNvPicPr>
+          <p:nvPr/>
+        </p:nvPicPr>
+        <p:blipFill>
+          <a:blip r:embed="rId5"/>
+          <a:stretch>
+            <a:fillRect/>
+          </a:stretch>
+        </p:blipFill>
+        <p:spPr>
+          <a:xfrm>
+            <a:off x="8853827" y="2684003"/>
+            <a:ext cx="2260599" cy="2260599"/>
+          </a:xfrm>
+          <a:prstGeom prst="rect">
+            <a:avLst/>
+          </a:prstGeom>
+        </p:spPr>
+      </p:pic>
     </p:spTree>
     <p:extLst>
       <p:ext uri="{BB962C8B-B14F-4D97-AF65-F5344CB8AC3E}">
-        <p14:creationId xmlns:p14="http://schemas.microsoft.com/office/powerpoint/2010/main" val="777938897"/>
+        <p14:creationId xmlns:p14="http://schemas.microsoft.com/office/powerpoint/2010/main" val="224036940"/>
       </p:ext>
     </p:extLst>
   </p:cSld>
@@ -12704,8 +13399,8 @@
         </p:nvSpPr>
         <p:spPr>
           <a:xfrm>
-            <a:off x="2199709" y="96451"/>
-            <a:ext cx="7792582" cy="784830"/>
+            <a:off x="2551044" y="104840"/>
+            <a:ext cx="7089913" cy="784830"/>
           </a:xfrm>
           <a:prstGeom prst="rect">
             <a:avLst/>
@@ -12728,58 +13423,17 @@
                   </a:schemeClr>
                 </a:solidFill>
               </a:rPr>
-              <a:t>Create </a:t>
-            </a:r>
-            <a:r>
-              <a:rPr lang="en-US" sz="4500" dirty="0" err="1">
-                <a:solidFill>
-                  <a:schemeClr val="tx1">
-                    <a:lumMod val="50000"/>
-                    <a:lumOff val="50000"/>
-                  </a:schemeClr>
-                </a:solidFill>
-              </a:rPr>
-              <a:t>main.js</a:t>
-            </a:r>
-            <a:r>
-              <a:rPr lang="en-US" sz="4500" dirty="0">
-                <a:solidFill>
-                  <a:schemeClr val="tx1">
-                    <a:lumMod val="50000"/>
-                    <a:lumOff val="50000"/>
-                  </a:schemeClr>
-                </a:solidFill>
-              </a:rPr>
-              <a:t> and </a:t>
-            </a:r>
-            <a:r>
-              <a:rPr lang="en-US" sz="4500" dirty="0" err="1">
-                <a:solidFill>
-                  <a:schemeClr val="tx1">
-                    <a:lumMod val="50000"/>
-                    <a:lumOff val="50000"/>
-                  </a:schemeClr>
-                </a:solidFill>
-              </a:rPr>
-              <a:t>manifest.json</a:t>
-            </a:r>
-            <a:endParaRPr lang="en-US" sz="4500" dirty="0">
-              <a:solidFill>
-                <a:schemeClr val="tx1">
-                  <a:lumMod val="50000"/>
-                  <a:lumOff val="50000"/>
-                </a:schemeClr>
-              </a:solidFill>
-            </a:endParaRPr>
+              <a:t>Create a new folder</a:t>
+            </a:r>
           </a:p>
         </p:txBody>
       </p:sp>
       <p:pic>
         <p:nvPicPr>
-          <p:cNvPr id="4" name="Picture 3">
-            <a:extLst>
-              <a:ext uri="{FF2B5EF4-FFF2-40B4-BE49-F238E27FC236}">
-                <a16:creationId xmlns:a16="http://schemas.microsoft.com/office/drawing/2014/main" id="{35875864-2194-DF40-8C20-897F8048399E}"/>
+          <p:cNvPr id="5" name="Picture 4">
+            <a:extLst>
+              <a:ext uri="{FF2B5EF4-FFF2-40B4-BE49-F238E27FC236}">
+                <a16:creationId xmlns:a16="http://schemas.microsoft.com/office/drawing/2014/main" id="{0EBE9434-7077-D443-A8C5-E3D5FCAC9C83}"/>
               </a:ext>
             </a:extLst>
           </p:cNvPr>
@@ -12796,8 +13450,8 @@
         </p:blipFill>
         <p:spPr>
           <a:xfrm>
-            <a:off x="3518854" y="1095365"/>
-            <a:ext cx="5154291" cy="3852833"/>
+            <a:off x="2938418" y="1183284"/>
+            <a:ext cx="6315164" cy="3141794"/>
           </a:xfrm>
           <a:prstGeom prst="rect">
             <a:avLst/>
@@ -12806,10 +13460,10 @@
       </p:pic>
       <p:sp>
         <p:nvSpPr>
-          <p:cNvPr id="5" name="TextBox 4">
-            <a:extLst>
-              <a:ext uri="{FF2B5EF4-FFF2-40B4-BE49-F238E27FC236}">
-                <a16:creationId xmlns:a16="http://schemas.microsoft.com/office/drawing/2014/main" id="{C64AB158-6D63-494A-90E9-1DDAC37C894E}"/>
+          <p:cNvPr id="6" name="TextBox 5">
+            <a:extLst>
+              <a:ext uri="{FF2B5EF4-FFF2-40B4-BE49-F238E27FC236}">
+                <a16:creationId xmlns:a16="http://schemas.microsoft.com/office/drawing/2014/main" id="{CAC1CAB1-0E15-E54E-935D-57D717DA1B96}"/>
               </a:ext>
             </a:extLst>
           </p:cNvPr>
@@ -12818,8 +13472,8 @@
         </p:nvSpPr>
         <p:spPr>
           <a:xfrm>
-            <a:off x="3518854" y="5162282"/>
-            <a:ext cx="4809690" cy="369332"/>
+            <a:off x="2891405" y="4907560"/>
+            <a:ext cx="6409189" cy="369332"/>
           </a:xfrm>
           <a:prstGeom prst="rect">
             <a:avLst/>
@@ -12834,82 +13488,15 @@
           <a:p>
             <a:r>
               <a:rPr lang="en-US" dirty="0"/>
-              <a:t>Cerate these two files in your favorite text editor</a:t>
-            </a:r>
-          </a:p>
-        </p:txBody>
-      </p:sp>
-      <p:sp>
-        <p:nvSpPr>
-          <p:cNvPr id="6" name="Rectangle 5">
-            <a:extLst>
-              <a:ext uri="{FF2B5EF4-FFF2-40B4-BE49-F238E27FC236}">
-                <a16:creationId xmlns:a16="http://schemas.microsoft.com/office/drawing/2014/main" id="{27722368-1049-AC47-BB56-C272B2E9D8B2}"/>
-              </a:ext>
-            </a:extLst>
-          </p:cNvPr>
-          <p:cNvSpPr/>
-          <p:nvPr/>
-        </p:nvSpPr>
-        <p:spPr>
-          <a:xfrm>
-            <a:off x="3518854" y="5531614"/>
-            <a:ext cx="6096000" cy="923330"/>
-          </a:xfrm>
-          <a:prstGeom prst="rect">
-            <a:avLst/>
-          </a:prstGeom>
-        </p:spPr>
-        <p:txBody>
-          <a:bodyPr>
-            <a:spAutoFit/>
-          </a:bodyPr>
-          <a:lstStyle/>
-          <a:p>
-            <a:r>
-              <a:rPr lang="en-US" dirty="0">
-                <a:latin typeface="Menlo" panose="020B0609030804020204" pitchFamily="49" charset="0"/>
-              </a:rPr>
-              <a:t>my-first-plugin</a:t>
-            </a:r>
-            <a:br>
-              <a:rPr lang="en-US" dirty="0"/>
-            </a:br>
-            <a:r>
-              <a:rPr lang="en-US" dirty="0">
-                <a:latin typeface="Menlo" panose="020B0609030804020204" pitchFamily="49" charset="0"/>
-              </a:rPr>
-              <a:t>├── </a:t>
-            </a:r>
-            <a:r>
-              <a:rPr lang="en-US" dirty="0" err="1">
-                <a:latin typeface="Menlo" panose="020B0609030804020204" pitchFamily="49" charset="0"/>
-              </a:rPr>
-              <a:t>main.js</a:t>
-            </a:r>
-            <a:br>
-              <a:rPr lang="en-US" dirty="0"/>
-            </a:br>
-            <a:r>
-              <a:rPr lang="en-US" dirty="0">
-                <a:latin typeface="Menlo" panose="020B0609030804020204" pitchFamily="49" charset="0"/>
-              </a:rPr>
-              <a:t>└── </a:t>
-            </a:r>
-            <a:r>
-              <a:rPr lang="en-US" dirty="0" err="1">
-                <a:latin typeface="Menlo" panose="020B0609030804020204" pitchFamily="49" charset="0"/>
-              </a:rPr>
-              <a:t>manifest.json</a:t>
-            </a:r>
-            <a:endParaRPr lang="en-US" dirty="0"/>
+              <a:t>Plugins &gt; Development &gt; Show Develop Folder &gt; Create new folder</a:t>
+            </a:r>
           </a:p>
         </p:txBody>
       </p:sp>
     </p:spTree>
     <p:extLst>
       <p:ext uri="{BB962C8B-B14F-4D97-AF65-F5344CB8AC3E}">
-        <p14:creationId xmlns:p14="http://schemas.microsoft.com/office/powerpoint/2010/main" val="2287551640"/>
+        <p14:creationId xmlns:p14="http://schemas.microsoft.com/office/powerpoint/2010/main" val="777938897"/>
       </p:ext>
     </p:extLst>
   </p:cSld>
@@ -12950,8 +13537,8 @@
         </p:nvSpPr>
         <p:spPr>
           <a:xfrm>
-            <a:off x="2551044" y="104840"/>
-            <a:ext cx="7089913" cy="784830"/>
+            <a:off x="2199709" y="96451"/>
+            <a:ext cx="7792582" cy="784830"/>
           </a:xfrm>
           <a:prstGeom prst="rect">
             <a:avLst/>
@@ -12974,7 +13561,29 @@
                   </a:schemeClr>
                 </a:solidFill>
               </a:rPr>
-              <a:t>Populate </a:t>
+              <a:t>Create </a:t>
+            </a:r>
+            <a:r>
+              <a:rPr lang="en-US" sz="4500" dirty="0" err="1">
+                <a:solidFill>
+                  <a:schemeClr val="tx1">
+                    <a:lumMod val="50000"/>
+                    <a:lumOff val="50000"/>
+                  </a:schemeClr>
+                </a:solidFill>
+              </a:rPr>
+              <a:t>main.js</a:t>
+            </a:r>
+            <a:r>
+              <a:rPr lang="en-US" sz="4500" dirty="0">
+                <a:solidFill>
+                  <a:schemeClr val="tx1">
+                    <a:lumMod val="50000"/>
+                    <a:lumOff val="50000"/>
+                  </a:schemeClr>
+                </a:solidFill>
+              </a:rPr>
+              <a:t> and </a:t>
             </a:r>
             <a:r>
               <a:rPr lang="en-US" sz="4500" dirty="0" err="1">
@@ -12998,611 +13607,142 @@
           </a:p>
         </p:txBody>
       </p:sp>
-      <p:sp>
-        <p:nvSpPr>
-          <p:cNvPr id="6" name="Rectangle 5">
-            <a:extLst>
-              <a:ext uri="{FF2B5EF4-FFF2-40B4-BE49-F238E27FC236}">
-                <a16:creationId xmlns:a16="http://schemas.microsoft.com/office/drawing/2014/main" id="{7828AE25-1089-D340-8FF3-72CDC4323389}"/>
-              </a:ext>
-            </a:extLst>
-          </p:cNvPr>
-          <p:cNvSpPr/>
+      <p:pic>
+        <p:nvPicPr>
+          <p:cNvPr id="4" name="Picture 3">
+            <a:extLst>
+              <a:ext uri="{FF2B5EF4-FFF2-40B4-BE49-F238E27FC236}">
+                <a16:creationId xmlns:a16="http://schemas.microsoft.com/office/drawing/2014/main" id="{35875864-2194-DF40-8C20-897F8048399E}"/>
+              </a:ext>
+            </a:extLst>
+          </p:cNvPr>
+          <p:cNvPicPr>
+            <a:picLocks noChangeAspect="1"/>
+          </p:cNvPicPr>
           <p:nvPr/>
-        </p:nvSpPr>
+        </p:nvPicPr>
+        <p:blipFill>
+          <a:blip r:embed="rId3"/>
+          <a:stretch>
+            <a:fillRect/>
+          </a:stretch>
+        </p:blipFill>
         <p:spPr>
           <a:xfrm>
-            <a:off x="2799521" y="1166842"/>
-            <a:ext cx="6592957" cy="4524315"/>
+            <a:off x="3518854" y="1095365"/>
+            <a:ext cx="5154291" cy="3852833"/>
           </a:xfrm>
           <a:prstGeom prst="rect">
             <a:avLst/>
           </a:prstGeom>
         </p:spPr>
-        <p:txBody>
-          <a:bodyPr wrap="square">
+      </p:pic>
+      <p:sp>
+        <p:nvSpPr>
+          <p:cNvPr id="5" name="TextBox 4">
+            <a:extLst>
+              <a:ext uri="{FF2B5EF4-FFF2-40B4-BE49-F238E27FC236}">
+                <a16:creationId xmlns:a16="http://schemas.microsoft.com/office/drawing/2014/main" id="{C64AB158-6D63-494A-90E9-1DDAC37C894E}"/>
+              </a:ext>
+            </a:extLst>
+          </p:cNvPr>
+          <p:cNvSpPr txBox="1"/>
+          <p:nvPr/>
+        </p:nvSpPr>
+        <p:spPr>
+          <a:xfrm>
+            <a:off x="3518854" y="5162282"/>
+            <a:ext cx="4809690" cy="369332"/>
+          </a:xfrm>
+          <a:prstGeom prst="rect">
+            <a:avLst/>
+          </a:prstGeom>
+          <a:noFill/>
+        </p:spPr>
+        <p:txBody>
+          <a:bodyPr wrap="square" rtlCol="0">
             <a:spAutoFit/>
           </a:bodyPr>
           <a:lstStyle/>
           <a:p>
             <a:r>
-              <a:rPr lang="en-US" dirty="0">
-                <a:solidFill>
-                  <a:srgbClr val="D4D4D4"/>
-                </a:solidFill>
-                <a:latin typeface="Menlo" panose="020B0609030804020204" pitchFamily="49" charset="0"/>
-              </a:rPr>
-              <a:t>{</a:t>
-            </a:r>
-          </a:p>
-          <a:p>
-            <a:r>
-              <a:rPr lang="en-US" dirty="0">
-                <a:solidFill>
-                  <a:srgbClr val="D4D4D4"/>
-                </a:solidFill>
-                <a:latin typeface="Menlo" panose="020B0609030804020204" pitchFamily="49" charset="0"/>
-              </a:rPr>
-              <a:t>    </a:t>
-            </a:r>
-            <a:r>
-              <a:rPr lang="en-US" dirty="0">
-                <a:solidFill>
-                  <a:srgbClr val="0070C0"/>
-                </a:solidFill>
-                <a:latin typeface="Menlo" panose="020B0609030804020204" pitchFamily="49" charset="0"/>
-              </a:rPr>
-              <a:t>"id"</a:t>
-            </a:r>
-            <a:r>
-              <a:rPr lang="en-US" dirty="0">
-                <a:solidFill>
-                  <a:srgbClr val="D4D4D4"/>
-                </a:solidFill>
-                <a:latin typeface="Menlo" panose="020B0609030804020204" pitchFamily="49" charset="0"/>
-              </a:rPr>
-              <a:t>: </a:t>
-            </a:r>
-            <a:r>
-              <a:rPr lang="en-US" dirty="0">
-                <a:solidFill>
-                  <a:srgbClr val="CE9178"/>
-                </a:solidFill>
-                <a:latin typeface="Menlo" panose="020B0609030804020204" pitchFamily="49" charset="0"/>
-              </a:rPr>
-              <a:t>"your-unique-id"</a:t>
-            </a:r>
-            <a:r>
-              <a:rPr lang="en-US" dirty="0">
-                <a:solidFill>
-                  <a:srgbClr val="D4D4D4"/>
-                </a:solidFill>
-                <a:latin typeface="Menlo" panose="020B0609030804020204" pitchFamily="49" charset="0"/>
-              </a:rPr>
-              <a:t>,</a:t>
-            </a:r>
-          </a:p>
-          <a:p>
-            <a:r>
-              <a:rPr lang="en-US" dirty="0">
-                <a:solidFill>
-                  <a:srgbClr val="D4D4D4"/>
-                </a:solidFill>
-                <a:latin typeface="Menlo" panose="020B0609030804020204" pitchFamily="49" charset="0"/>
-              </a:rPr>
-              <a:t>    </a:t>
-            </a:r>
-            <a:r>
-              <a:rPr lang="en-US" dirty="0">
-                <a:solidFill>
-                  <a:srgbClr val="0070C0"/>
-                </a:solidFill>
-                <a:latin typeface="Menlo" panose="020B0609030804020204" pitchFamily="49" charset="0"/>
-              </a:rPr>
-              <a:t>"name"</a:t>
-            </a:r>
-            <a:r>
-              <a:rPr lang="en-US" dirty="0">
-                <a:solidFill>
-                  <a:srgbClr val="D4D4D4"/>
-                </a:solidFill>
-                <a:latin typeface="Menlo" panose="020B0609030804020204" pitchFamily="49" charset="0"/>
-              </a:rPr>
-              <a:t>: </a:t>
-            </a:r>
-            <a:r>
-              <a:rPr lang="en-US" dirty="0">
-                <a:solidFill>
-                  <a:srgbClr val="CE9178"/>
-                </a:solidFill>
-                <a:latin typeface="Menlo" panose="020B0609030804020204" pitchFamily="49" charset="0"/>
-              </a:rPr>
-              <a:t>"Labs Starter Plugin"</a:t>
-            </a:r>
-            <a:r>
-              <a:rPr lang="en-US" dirty="0">
-                <a:solidFill>
-                  <a:srgbClr val="D4D4D4"/>
-                </a:solidFill>
-                <a:latin typeface="Menlo" panose="020B0609030804020204" pitchFamily="49" charset="0"/>
-              </a:rPr>
-              <a:t>,</a:t>
-            </a:r>
-          </a:p>
-          <a:p>
-            <a:r>
-              <a:rPr lang="en-US" dirty="0">
-                <a:solidFill>
-                  <a:srgbClr val="D4D4D4"/>
-                </a:solidFill>
-                <a:latin typeface="Menlo" panose="020B0609030804020204" pitchFamily="49" charset="0"/>
-              </a:rPr>
-              <a:t>    </a:t>
-            </a:r>
-            <a:r>
-              <a:rPr lang="en-US" dirty="0">
-                <a:solidFill>
-                  <a:srgbClr val="0070C0"/>
-                </a:solidFill>
-                <a:latin typeface="Menlo" panose="020B0609030804020204" pitchFamily="49" charset="0"/>
-              </a:rPr>
-              <a:t>"host"</a:t>
-            </a:r>
-            <a:r>
-              <a:rPr lang="en-US" dirty="0">
-                <a:solidFill>
-                  <a:srgbClr val="D4D4D4"/>
-                </a:solidFill>
-                <a:latin typeface="Menlo" panose="020B0609030804020204" pitchFamily="49" charset="0"/>
-              </a:rPr>
-              <a:t>: {</a:t>
-            </a:r>
-          </a:p>
-          <a:p>
-            <a:r>
-              <a:rPr lang="en-US" dirty="0">
-                <a:solidFill>
-                  <a:srgbClr val="D4D4D4"/>
-                </a:solidFill>
-                <a:latin typeface="Menlo" panose="020B0609030804020204" pitchFamily="49" charset="0"/>
-              </a:rPr>
-              <a:t>        </a:t>
-            </a:r>
-            <a:r>
-              <a:rPr lang="en-US" dirty="0">
-                <a:solidFill>
-                  <a:srgbClr val="0070C0"/>
-                </a:solidFill>
-                <a:latin typeface="Menlo" panose="020B0609030804020204" pitchFamily="49" charset="0"/>
-              </a:rPr>
-              <a:t>"app"</a:t>
-            </a:r>
-            <a:r>
-              <a:rPr lang="en-US" dirty="0">
-                <a:solidFill>
-                  <a:srgbClr val="D4D4D4"/>
-                </a:solidFill>
-                <a:latin typeface="Menlo" panose="020B0609030804020204" pitchFamily="49" charset="0"/>
-              </a:rPr>
-              <a:t>: </a:t>
-            </a:r>
-            <a:r>
-              <a:rPr lang="en-US" dirty="0">
-                <a:solidFill>
-                  <a:srgbClr val="CE9178"/>
-                </a:solidFill>
-                <a:latin typeface="Menlo" panose="020B0609030804020204" pitchFamily="49" charset="0"/>
-              </a:rPr>
-              <a:t>"XD"</a:t>
-            </a:r>
-            <a:r>
-              <a:rPr lang="en-US" dirty="0">
-                <a:solidFill>
-                  <a:srgbClr val="D4D4D4"/>
-                </a:solidFill>
-                <a:latin typeface="Menlo" panose="020B0609030804020204" pitchFamily="49" charset="0"/>
-              </a:rPr>
-              <a:t>,</a:t>
-            </a:r>
-          </a:p>
-          <a:p>
-            <a:r>
-              <a:rPr lang="en-US" dirty="0">
-                <a:solidFill>
-                  <a:srgbClr val="D4D4D4"/>
-                </a:solidFill>
-                <a:latin typeface="Menlo" panose="020B0609030804020204" pitchFamily="49" charset="0"/>
-              </a:rPr>
-              <a:t>        </a:t>
-            </a:r>
-            <a:r>
-              <a:rPr lang="en-US" dirty="0">
-                <a:solidFill>
-                  <a:srgbClr val="0070C0"/>
-                </a:solidFill>
-                <a:latin typeface="Menlo" panose="020B0609030804020204" pitchFamily="49" charset="0"/>
-              </a:rPr>
-              <a:t>"</a:t>
+              <a:rPr lang="en-US" dirty="0"/>
+              <a:t>Cerate these two files in your favorite text editor</a:t>
+            </a:r>
+          </a:p>
+        </p:txBody>
+      </p:sp>
+      <p:sp>
+        <p:nvSpPr>
+          <p:cNvPr id="6" name="Rectangle 5">
+            <a:extLst>
+              <a:ext uri="{FF2B5EF4-FFF2-40B4-BE49-F238E27FC236}">
+                <a16:creationId xmlns:a16="http://schemas.microsoft.com/office/drawing/2014/main" id="{27722368-1049-AC47-BB56-C272B2E9D8B2}"/>
+              </a:ext>
+            </a:extLst>
+          </p:cNvPr>
+          <p:cNvSpPr/>
+          <p:nvPr/>
+        </p:nvSpPr>
+        <p:spPr>
+          <a:xfrm>
+            <a:off x="3518854" y="5531614"/>
+            <a:ext cx="6096000" cy="923330"/>
+          </a:xfrm>
+          <a:prstGeom prst="rect">
+            <a:avLst/>
+          </a:prstGeom>
+        </p:spPr>
+        <p:txBody>
+          <a:bodyPr>
+            <a:spAutoFit/>
+          </a:bodyPr>
+          <a:lstStyle/>
+          <a:p>
+            <a:r>
+              <a:rPr lang="en-US" dirty="0">
+                <a:latin typeface="Menlo" panose="020B0609030804020204" pitchFamily="49" charset="0"/>
+              </a:rPr>
+              <a:t>my-first-plugin</a:t>
+            </a:r>
+            <a:br>
+              <a:rPr lang="en-US" dirty="0"/>
+            </a:br>
+            <a:r>
+              <a:rPr lang="en-US" dirty="0">
+                <a:latin typeface="Menlo" panose="020B0609030804020204" pitchFamily="49" charset="0"/>
+              </a:rPr>
+              <a:t>├── </a:t>
             </a:r>
             <a:r>
               <a:rPr lang="en-US" dirty="0" err="1">
-                <a:solidFill>
-                  <a:srgbClr val="0070C0"/>
-                </a:solidFill>
-                <a:latin typeface="Menlo" panose="020B0609030804020204" pitchFamily="49" charset="0"/>
-              </a:rPr>
-              <a:t>minVersion</a:t>
-            </a:r>
-            <a:r>
-              <a:rPr lang="en-US" dirty="0">
-                <a:solidFill>
-                  <a:srgbClr val="0070C0"/>
-                </a:solidFill>
-                <a:latin typeface="Menlo" panose="020B0609030804020204" pitchFamily="49" charset="0"/>
-              </a:rPr>
-              <a:t>"</a:t>
-            </a:r>
-            <a:r>
-              <a:rPr lang="en-US" dirty="0">
-                <a:solidFill>
-                  <a:srgbClr val="D4D4D4"/>
-                </a:solidFill>
-                <a:latin typeface="Menlo" panose="020B0609030804020204" pitchFamily="49" charset="0"/>
-              </a:rPr>
-              <a:t>: </a:t>
-            </a:r>
-            <a:r>
-              <a:rPr lang="en-US" dirty="0">
-                <a:solidFill>
-                  <a:srgbClr val="CE9178"/>
-                </a:solidFill>
-                <a:latin typeface="Menlo" panose="020B0609030804020204" pitchFamily="49" charset="0"/>
-              </a:rPr>
-              <a:t>"8.0"</a:t>
-            </a:r>
-            <a:endParaRPr lang="en-US" dirty="0">
-              <a:solidFill>
-                <a:srgbClr val="D4D4D4"/>
-              </a:solidFill>
-              <a:latin typeface="Menlo" panose="020B0609030804020204" pitchFamily="49" charset="0"/>
-            </a:endParaRPr>
-          </a:p>
-          <a:p>
-            <a:r>
-              <a:rPr lang="en-US" dirty="0">
-                <a:solidFill>
-                  <a:srgbClr val="D4D4D4"/>
-                </a:solidFill>
-                <a:latin typeface="Menlo" panose="020B0609030804020204" pitchFamily="49" charset="0"/>
-              </a:rPr>
-              <a:t>    },</a:t>
-            </a:r>
-          </a:p>
-          <a:p>
-            <a:r>
-              <a:rPr lang="en-US" dirty="0">
-                <a:solidFill>
-                  <a:srgbClr val="D4D4D4"/>
-                </a:solidFill>
-                <a:latin typeface="Menlo" panose="020B0609030804020204" pitchFamily="49" charset="0"/>
-              </a:rPr>
-              <a:t>    </a:t>
-            </a:r>
-            <a:r>
-              <a:rPr lang="en-US" dirty="0">
-                <a:solidFill>
-                  <a:srgbClr val="0070C0"/>
-                </a:solidFill>
-                <a:latin typeface="Menlo" panose="020B0609030804020204" pitchFamily="49" charset="0"/>
-              </a:rPr>
-              <a:t>"version"</a:t>
-            </a:r>
-            <a:r>
-              <a:rPr lang="en-US" dirty="0">
-                <a:solidFill>
-                  <a:srgbClr val="D4D4D4"/>
-                </a:solidFill>
-                <a:latin typeface="Menlo" panose="020B0609030804020204" pitchFamily="49" charset="0"/>
-              </a:rPr>
-              <a:t>: </a:t>
-            </a:r>
-            <a:r>
-              <a:rPr lang="en-US" dirty="0">
-                <a:solidFill>
-                  <a:srgbClr val="CE9178"/>
-                </a:solidFill>
-                <a:latin typeface="Menlo" panose="020B0609030804020204" pitchFamily="49" charset="0"/>
-              </a:rPr>
-              <a:t>"0.0.1"</a:t>
-            </a:r>
-            <a:r>
-              <a:rPr lang="en-US" dirty="0">
-                <a:solidFill>
-                  <a:srgbClr val="D4D4D4"/>
-                </a:solidFill>
-                <a:latin typeface="Menlo" panose="020B0609030804020204" pitchFamily="49" charset="0"/>
-              </a:rPr>
-              <a:t>,</a:t>
-            </a:r>
-          </a:p>
-          <a:p>
-            <a:r>
-              <a:rPr lang="en-US" dirty="0">
-                <a:solidFill>
-                  <a:srgbClr val="D4D4D4"/>
-                </a:solidFill>
-                <a:latin typeface="Menlo" panose="020B0609030804020204" pitchFamily="49" charset="0"/>
-              </a:rPr>
-              <a:t>    </a:t>
-            </a:r>
-            <a:r>
-              <a:rPr lang="en-US" dirty="0">
-                <a:solidFill>
-                  <a:srgbClr val="0070C0"/>
-                </a:solidFill>
-                <a:latin typeface="Menlo" panose="020B0609030804020204" pitchFamily="49" charset="0"/>
-              </a:rPr>
-              <a:t>"</a:t>
+                <a:latin typeface="Menlo" panose="020B0609030804020204" pitchFamily="49" charset="0"/>
+              </a:rPr>
+              <a:t>main.js</a:t>
+            </a:r>
+            <a:br>
+              <a:rPr lang="en-US" dirty="0"/>
+            </a:br>
+            <a:r>
+              <a:rPr lang="en-US" dirty="0">
+                <a:latin typeface="Menlo" panose="020B0609030804020204" pitchFamily="49" charset="0"/>
+              </a:rPr>
+              <a:t>└── </a:t>
             </a:r>
             <a:r>
               <a:rPr lang="en-US" dirty="0" err="1">
-                <a:solidFill>
-                  <a:srgbClr val="0070C0"/>
-                </a:solidFill>
-                <a:latin typeface="Menlo" panose="020B0609030804020204" pitchFamily="49" charset="0"/>
-              </a:rPr>
-              <a:t>uiEntryPoints</a:t>
-            </a:r>
-            <a:r>
-              <a:rPr lang="en-US" dirty="0">
-                <a:solidFill>
-                  <a:srgbClr val="0070C0"/>
-                </a:solidFill>
-                <a:latin typeface="Menlo" panose="020B0609030804020204" pitchFamily="49" charset="0"/>
-              </a:rPr>
-              <a:t>"</a:t>
-            </a:r>
-            <a:r>
-              <a:rPr lang="en-US" dirty="0">
-                <a:solidFill>
-                  <a:srgbClr val="D4D4D4"/>
-                </a:solidFill>
-                <a:latin typeface="Menlo" panose="020B0609030804020204" pitchFamily="49" charset="0"/>
-              </a:rPr>
-              <a:t>: [</a:t>
-            </a:r>
-          </a:p>
-          <a:p>
-            <a:r>
-              <a:rPr lang="en-US" dirty="0">
-                <a:solidFill>
-                  <a:srgbClr val="D4D4D4"/>
-                </a:solidFill>
-                <a:latin typeface="Menlo" panose="020B0609030804020204" pitchFamily="49" charset="0"/>
-              </a:rPr>
-              <a:t>        {</a:t>
-            </a:r>
-          </a:p>
-          <a:p>
-            <a:r>
-              <a:rPr lang="en-US" dirty="0">
-                <a:solidFill>
-                  <a:srgbClr val="D4D4D4"/>
-                </a:solidFill>
-                <a:latin typeface="Menlo" panose="020B0609030804020204" pitchFamily="49" charset="0"/>
-              </a:rPr>
-              <a:t>            </a:t>
-            </a:r>
-            <a:r>
-              <a:rPr lang="en-US" dirty="0">
-                <a:solidFill>
-                  <a:srgbClr val="0070C0"/>
-                </a:solidFill>
-                <a:latin typeface="Menlo" panose="020B0609030804020204" pitchFamily="49" charset="0"/>
-              </a:rPr>
-              <a:t>"type"</a:t>
-            </a:r>
-            <a:r>
-              <a:rPr lang="en-US" dirty="0">
-                <a:solidFill>
-                  <a:srgbClr val="D4D4D4"/>
-                </a:solidFill>
-                <a:latin typeface="Menlo" panose="020B0609030804020204" pitchFamily="49" charset="0"/>
-              </a:rPr>
-              <a:t>: </a:t>
-            </a:r>
-            <a:r>
-              <a:rPr lang="en-US" dirty="0">
-                <a:solidFill>
-                  <a:srgbClr val="CE9178"/>
-                </a:solidFill>
-                <a:latin typeface="Menlo" panose="020B0609030804020204" pitchFamily="49" charset="0"/>
-              </a:rPr>
-              <a:t>"menu"</a:t>
-            </a:r>
-            <a:r>
-              <a:rPr lang="en-US" dirty="0">
-                <a:solidFill>
-                  <a:srgbClr val="D4D4D4"/>
-                </a:solidFill>
-                <a:latin typeface="Menlo" panose="020B0609030804020204" pitchFamily="49" charset="0"/>
-              </a:rPr>
-              <a:t>,</a:t>
-            </a:r>
-          </a:p>
-          <a:p>
-            <a:r>
-              <a:rPr lang="en-US" dirty="0">
-                <a:solidFill>
-                  <a:srgbClr val="D4D4D4"/>
-                </a:solidFill>
-                <a:latin typeface="Menlo" panose="020B0609030804020204" pitchFamily="49" charset="0"/>
-              </a:rPr>
-              <a:t>            </a:t>
-            </a:r>
-            <a:r>
-              <a:rPr lang="en-US" dirty="0">
-                <a:solidFill>
-                  <a:srgbClr val="0070C0"/>
-                </a:solidFill>
-                <a:latin typeface="Menlo" panose="020B0609030804020204" pitchFamily="49" charset="0"/>
-              </a:rPr>
-              <a:t>"label"</a:t>
-            </a:r>
-            <a:r>
-              <a:rPr lang="en-US" dirty="0">
-                <a:solidFill>
-                  <a:srgbClr val="D4D4D4"/>
-                </a:solidFill>
-                <a:latin typeface="Menlo" panose="020B0609030804020204" pitchFamily="49" charset="0"/>
-              </a:rPr>
-              <a:t>: </a:t>
-            </a:r>
-            <a:r>
-              <a:rPr lang="en-US" dirty="0">
-                <a:solidFill>
-                  <a:srgbClr val="CE9178"/>
-                </a:solidFill>
-                <a:latin typeface="Menlo" panose="020B0609030804020204" pitchFamily="49" charset="0"/>
-              </a:rPr>
-              <a:t>"Part1-Getting Started"</a:t>
-            </a:r>
-            <a:r>
-              <a:rPr lang="en-US" dirty="0">
-                <a:solidFill>
-                  <a:srgbClr val="D4D4D4"/>
-                </a:solidFill>
-                <a:latin typeface="Menlo" panose="020B0609030804020204" pitchFamily="49" charset="0"/>
-              </a:rPr>
-              <a:t>,</a:t>
-            </a:r>
-          </a:p>
-          <a:p>
-            <a:r>
-              <a:rPr lang="en-US" dirty="0">
-                <a:solidFill>
-                  <a:srgbClr val="D4D4D4"/>
-                </a:solidFill>
-                <a:latin typeface="Menlo" panose="020B0609030804020204" pitchFamily="49" charset="0"/>
-              </a:rPr>
-              <a:t>            </a:t>
-            </a:r>
-            <a:r>
-              <a:rPr lang="en-US" dirty="0">
-                <a:solidFill>
-                  <a:srgbClr val="0070C0"/>
-                </a:solidFill>
-                <a:latin typeface="Menlo" panose="020B0609030804020204" pitchFamily="49" charset="0"/>
-              </a:rPr>
-              <a:t>"</a:t>
-            </a:r>
-            <a:r>
-              <a:rPr lang="en-US" dirty="0" err="1">
-                <a:solidFill>
-                  <a:srgbClr val="0070C0"/>
-                </a:solidFill>
-                <a:latin typeface="Menlo" panose="020B0609030804020204" pitchFamily="49" charset="0"/>
-              </a:rPr>
-              <a:t>commandId</a:t>
-            </a:r>
-            <a:r>
-              <a:rPr lang="en-US" dirty="0">
-                <a:solidFill>
-                  <a:srgbClr val="0070C0"/>
-                </a:solidFill>
-                <a:latin typeface="Menlo" panose="020B0609030804020204" pitchFamily="49" charset="0"/>
-              </a:rPr>
-              <a:t>"</a:t>
-            </a:r>
-            <a:r>
-              <a:rPr lang="en-US" dirty="0">
-                <a:solidFill>
-                  <a:srgbClr val="D4D4D4"/>
-                </a:solidFill>
-                <a:latin typeface="Menlo" panose="020B0609030804020204" pitchFamily="49" charset="0"/>
-              </a:rPr>
-              <a:t>: </a:t>
-            </a:r>
-            <a:r>
-              <a:rPr lang="en-US" dirty="0">
-                <a:solidFill>
-                  <a:srgbClr val="CE9178"/>
-                </a:solidFill>
-                <a:latin typeface="Menlo" panose="020B0609030804020204" pitchFamily="49" charset="0"/>
-              </a:rPr>
-              <a:t>"</a:t>
-            </a:r>
-            <a:r>
-              <a:rPr lang="en-US" dirty="0" err="1">
-                <a:solidFill>
-                  <a:srgbClr val="CE9178"/>
-                </a:solidFill>
-                <a:latin typeface="Menlo" panose="020B0609030804020204" pitchFamily="49" charset="0"/>
-              </a:rPr>
-              <a:t>myPluginCommand</a:t>
-            </a:r>
-            <a:r>
-              <a:rPr lang="en-US" dirty="0">
-                <a:solidFill>
-                  <a:srgbClr val="CE9178"/>
-                </a:solidFill>
-                <a:latin typeface="Menlo" panose="020B0609030804020204" pitchFamily="49" charset="0"/>
-              </a:rPr>
-              <a:t>"</a:t>
-            </a:r>
-            <a:endParaRPr lang="en-US" dirty="0">
-              <a:solidFill>
-                <a:srgbClr val="D4D4D4"/>
-              </a:solidFill>
-              <a:latin typeface="Menlo" panose="020B0609030804020204" pitchFamily="49" charset="0"/>
-            </a:endParaRPr>
-          </a:p>
-          <a:p>
-            <a:r>
-              <a:rPr lang="en-US" dirty="0">
-                <a:solidFill>
-                  <a:srgbClr val="D4D4D4"/>
-                </a:solidFill>
-                <a:latin typeface="Menlo" panose="020B0609030804020204" pitchFamily="49" charset="0"/>
-              </a:rPr>
-              <a:t>        }</a:t>
-            </a:r>
-          </a:p>
-          <a:p>
-            <a:r>
-              <a:rPr lang="en-US" dirty="0">
-                <a:solidFill>
-                  <a:srgbClr val="D4D4D4"/>
-                </a:solidFill>
-                <a:latin typeface="Menlo" panose="020B0609030804020204" pitchFamily="49" charset="0"/>
-              </a:rPr>
-              <a:t>    ]</a:t>
-            </a:r>
-          </a:p>
-          <a:p>
-            <a:r>
-              <a:rPr lang="en-US" dirty="0">
-                <a:solidFill>
-                  <a:srgbClr val="D4D4D4"/>
-                </a:solidFill>
-                <a:latin typeface="Menlo" panose="020B0609030804020204" pitchFamily="49" charset="0"/>
-              </a:rPr>
-              <a:t>}</a:t>
-            </a:r>
-            <a:endParaRPr lang="en-US" b="0" dirty="0">
-              <a:solidFill>
-                <a:srgbClr val="D4D4D4"/>
-              </a:solidFill>
-              <a:effectLst/>
-              <a:latin typeface="Menlo" panose="020B0609030804020204" pitchFamily="49" charset="0"/>
-            </a:endParaRPr>
+                <a:latin typeface="Menlo" panose="020B0609030804020204" pitchFamily="49" charset="0"/>
+              </a:rPr>
+              <a:t>manifest.json</a:t>
+            </a:r>
+            <a:endParaRPr lang="en-US" dirty="0"/>
           </a:p>
         </p:txBody>
       </p:sp>
     </p:spTree>
     <p:extLst>
       <p:ext uri="{BB962C8B-B14F-4D97-AF65-F5344CB8AC3E}">
-        <p14:creationId xmlns:p14="http://schemas.microsoft.com/office/powerpoint/2010/main" val="274094858"/>
+        <p14:creationId xmlns:p14="http://schemas.microsoft.com/office/powerpoint/2010/main" val="2287551640"/>
       </p:ext>
     </p:extLst>
   </p:cSld>
@@ -13678,7 +13818,7 @@
                   </a:schemeClr>
                 </a:solidFill>
               </a:rPr>
-              <a:t>main.js</a:t>
+              <a:t>manifest.json</a:t>
             </a:r>
             <a:endParaRPr lang="en-US" sz="4500" dirty="0">
               <a:solidFill>
@@ -13693,10 +13833,10 @@
       </p:sp>
       <p:sp>
         <p:nvSpPr>
-          <p:cNvPr id="4" name="Rectangle 3">
-            <a:extLst>
-              <a:ext uri="{FF2B5EF4-FFF2-40B4-BE49-F238E27FC236}">
-                <a16:creationId xmlns:a16="http://schemas.microsoft.com/office/drawing/2014/main" id="{18159D3C-AA5D-0549-8DCD-5176449BD7E8}"/>
+          <p:cNvPr id="6" name="Rectangle 5">
+            <a:extLst>
+              <a:ext uri="{FF2B5EF4-FFF2-40B4-BE49-F238E27FC236}">
+                <a16:creationId xmlns:a16="http://schemas.microsoft.com/office/drawing/2014/main" id="{7828AE25-1089-D340-8FF3-72CDC4323389}"/>
               </a:ext>
             </a:extLst>
           </p:cNvPr>
@@ -13705,8 +13845,8 @@
         </p:nvSpPr>
         <p:spPr>
           <a:xfrm>
-            <a:off x="2376880" y="1535471"/>
-            <a:ext cx="7438239" cy="3139321"/>
+            <a:off x="2799521" y="1166842"/>
+            <a:ext cx="6592957" cy="4247317"/>
           </a:xfrm>
           <a:prstGeom prst="rect">
             <a:avLst/>
@@ -13721,20 +13861,22 @@
             <a:r>
               <a:rPr lang="en-US" dirty="0">
                 <a:solidFill>
-                  <a:srgbClr val="569CD6"/>
-                </a:solidFill>
-                <a:latin typeface="Menlo" panose="020B0609030804020204" pitchFamily="49" charset="0"/>
-              </a:rPr>
-              <a:t>const</a:t>
-            </a:r>
-            <a:r>
-              <a:rPr lang="en-US" dirty="0">
-                <a:solidFill>
                   <a:srgbClr val="D4D4D4"/>
                 </a:solidFill>
                 <a:latin typeface="Menlo" panose="020B0609030804020204" pitchFamily="49" charset="0"/>
               </a:rPr>
-              <a:t> { </a:t>
+              <a:t>{</a:t>
+            </a:r>
+          </a:p>
+          <a:p>
+            <a:r>
+              <a:rPr lang="en-US" dirty="0">
+                <a:solidFill>
+                  <a:srgbClr val="D4D4D4"/>
+                </a:solidFill>
+                <a:latin typeface="Menlo" panose="020B0609030804020204" pitchFamily="49" charset="0"/>
+              </a:rPr>
+              <a:t>    </a:t>
             </a:r>
             <a:r>
               <a:rPr lang="en-US" dirty="0">
@@ -13743,7 +13885,7 @@
                 </a:solidFill>
                 <a:latin typeface="Menlo" panose="020B0609030804020204" pitchFamily="49" charset="0"/>
               </a:rPr>
-              <a:t>Rectangle</a:t>
+              <a:t>"id"</a:t>
             </a:r>
             <a:r>
               <a:rPr lang="en-US" dirty="0">
@@ -13752,7 +13894,36 @@
                 </a:solidFill>
                 <a:latin typeface="Menlo" panose="020B0609030804020204" pitchFamily="49" charset="0"/>
               </a:rPr>
-              <a:t>, </a:t>
+              <a:t>: </a:t>
+            </a:r>
+            <a:r>
+              <a:rPr lang="en-US" dirty="0">
+                <a:solidFill>
+                  <a:srgbClr val="CE9178"/>
+                </a:solidFill>
+                <a:latin typeface="Menlo" panose="020B0609030804020204" pitchFamily="49" charset="0"/>
+              </a:rPr>
+              <a:t>"your-unique-id"</a:t>
+            </a:r>
+            <a:r>
+              <a:rPr lang="en-US" dirty="0">
+                <a:solidFill>
+                  <a:srgbClr val="D4D4D4"/>
+                </a:solidFill>
+                <a:latin typeface="Menlo" panose="020B0609030804020204" pitchFamily="49" charset="0"/>
+              </a:rPr>
+              <a:t>,</a:t>
+            </a:r>
+          </a:p>
+          <a:p>
+            <a:r>
+              <a:rPr lang="en-US" dirty="0">
+                <a:solidFill>
+                  <a:srgbClr val="D4D4D4"/>
+                </a:solidFill>
+                <a:latin typeface="Menlo" panose="020B0609030804020204" pitchFamily="49" charset="0"/>
+              </a:rPr>
+              <a:t>    </a:t>
             </a:r>
             <a:r>
               <a:rPr lang="en-US" dirty="0">
@@ -13761,7 +13932,7 @@
                 </a:solidFill>
                 <a:latin typeface="Menlo" panose="020B0609030804020204" pitchFamily="49" charset="0"/>
               </a:rPr>
-              <a:t>Color</a:t>
+              <a:t>"name"</a:t>
             </a:r>
             <a:r>
               <a:rPr lang="en-US" dirty="0">
@@ -13770,16 +13941,16 @@
                 </a:solidFill>
                 <a:latin typeface="Menlo" panose="020B0609030804020204" pitchFamily="49" charset="0"/>
               </a:rPr>
-              <a:t> } = </a:t>
-            </a:r>
-            <a:r>
-              <a:rPr lang="en-US" dirty="0">
-                <a:solidFill>
-                  <a:schemeClr val="accent2"/>
-                </a:solidFill>
-                <a:latin typeface="Menlo" panose="020B0609030804020204" pitchFamily="49" charset="0"/>
-              </a:rPr>
-              <a:t>require</a:t>
+              <a:t>: </a:t>
+            </a:r>
+            <a:r>
+              <a:rPr lang="en-US" dirty="0">
+                <a:solidFill>
+                  <a:srgbClr val="CE9178"/>
+                </a:solidFill>
+                <a:latin typeface="Menlo" panose="020B0609030804020204" pitchFamily="49" charset="0"/>
+              </a:rPr>
+              <a:t>"Labs Starter Plugin"</a:t>
             </a:r>
             <a:r>
               <a:rPr lang="en-US" dirty="0">
@@ -13788,12 +13959,99 @@
                 </a:solidFill>
                 <a:latin typeface="Menlo" panose="020B0609030804020204" pitchFamily="49" charset="0"/>
               </a:rPr>
-              <a:t>(</a:t>
-            </a:r>
-            <a:r>
-              <a:rPr lang="en-US" dirty="0">
-                <a:solidFill>
-                  <a:srgbClr val="FF0000"/>
+              <a:t>,</a:t>
+            </a:r>
+          </a:p>
+          <a:p>
+            <a:r>
+              <a:rPr lang="en-US" dirty="0">
+                <a:solidFill>
+                  <a:srgbClr val="D4D4D4"/>
+                </a:solidFill>
+                <a:latin typeface="Menlo" panose="020B0609030804020204" pitchFamily="49" charset="0"/>
+              </a:rPr>
+              <a:t>    </a:t>
+            </a:r>
+            <a:r>
+              <a:rPr lang="en-US" dirty="0">
+                <a:solidFill>
+                  <a:srgbClr val="0070C0"/>
+                </a:solidFill>
+                <a:latin typeface="Menlo" panose="020B0609030804020204" pitchFamily="49" charset="0"/>
+              </a:rPr>
+              <a:t>"host"</a:t>
+            </a:r>
+            <a:r>
+              <a:rPr lang="en-US" dirty="0">
+                <a:solidFill>
+                  <a:srgbClr val="D4D4D4"/>
+                </a:solidFill>
+                <a:latin typeface="Menlo" panose="020B0609030804020204" pitchFamily="49" charset="0"/>
+              </a:rPr>
+              <a:t>: {</a:t>
+            </a:r>
+          </a:p>
+          <a:p>
+            <a:r>
+              <a:rPr lang="en-US" dirty="0">
+                <a:solidFill>
+                  <a:srgbClr val="D4D4D4"/>
+                </a:solidFill>
+                <a:latin typeface="Menlo" panose="020B0609030804020204" pitchFamily="49" charset="0"/>
+              </a:rPr>
+              <a:t>        </a:t>
+            </a:r>
+            <a:r>
+              <a:rPr lang="en-US" dirty="0">
+                <a:solidFill>
+                  <a:srgbClr val="0070C0"/>
+                </a:solidFill>
+                <a:latin typeface="Menlo" panose="020B0609030804020204" pitchFamily="49" charset="0"/>
+              </a:rPr>
+              <a:t>"app"</a:t>
+            </a:r>
+            <a:r>
+              <a:rPr lang="en-US" dirty="0">
+                <a:solidFill>
+                  <a:srgbClr val="D4D4D4"/>
+                </a:solidFill>
+                <a:latin typeface="Menlo" panose="020B0609030804020204" pitchFamily="49" charset="0"/>
+              </a:rPr>
+              <a:t>: </a:t>
+            </a:r>
+            <a:r>
+              <a:rPr lang="en-US" dirty="0">
+                <a:solidFill>
+                  <a:srgbClr val="CE9178"/>
+                </a:solidFill>
+                <a:latin typeface="Menlo" panose="020B0609030804020204" pitchFamily="49" charset="0"/>
+              </a:rPr>
+              <a:t>"XD"</a:t>
+            </a:r>
+            <a:r>
+              <a:rPr lang="en-US" dirty="0">
+                <a:solidFill>
+                  <a:srgbClr val="D4D4D4"/>
+                </a:solidFill>
+                <a:latin typeface="Menlo" panose="020B0609030804020204" pitchFamily="49" charset="0"/>
+              </a:rPr>
+              <a:t>,</a:t>
+            </a:r>
+          </a:p>
+          <a:p>
+            <a:r>
+              <a:rPr lang="en-US" dirty="0">
+                <a:solidFill>
+                  <a:srgbClr val="D4D4D4"/>
+                </a:solidFill>
+                <a:latin typeface="Menlo" panose="020B0609030804020204" pitchFamily="49" charset="0"/>
+              </a:rPr>
+              <a:t>        </a:t>
+            </a:r>
+            <a:r>
+              <a:rPr lang="en-US" dirty="0">
+                <a:solidFill>
+                  <a:srgbClr val="0070C0"/>
                 </a:solidFill>
                 <a:latin typeface="Menlo" panose="020B0609030804020204" pitchFamily="49" charset="0"/>
               </a:rPr>
@@ -13802,16 +14060,16 @@
             <a:r>
               <a:rPr lang="en-US" dirty="0" err="1">
                 <a:solidFill>
-                  <a:srgbClr val="FF0000"/>
-                </a:solidFill>
-                <a:latin typeface="Menlo" panose="020B0609030804020204" pitchFamily="49" charset="0"/>
-              </a:rPr>
-              <a:t>scenegraph</a:t>
-            </a:r>
-            <a:r>
-              <a:rPr lang="en-US" dirty="0">
-                <a:solidFill>
-                  <a:srgbClr val="FF0000"/>
+                  <a:srgbClr val="0070C0"/>
+                </a:solidFill>
+                <a:latin typeface="Menlo" panose="020B0609030804020204" pitchFamily="49" charset="0"/>
+              </a:rPr>
+              <a:t>minVersion</a:t>
+            </a:r>
+            <a:r>
+              <a:rPr lang="en-US" dirty="0">
+                <a:solidFill>
+                  <a:srgbClr val="0070C0"/>
                 </a:solidFill>
                 <a:latin typeface="Menlo" panose="020B0609030804020204" pitchFamily="49" charset="0"/>
               </a:rPr>
@@ -13824,213 +14082,20 @@
                 </a:solidFill>
                 <a:latin typeface="Menlo" panose="020B0609030804020204" pitchFamily="49" charset="0"/>
               </a:rPr>
-              <a:t>);</a:t>
-            </a:r>
-          </a:p>
-          <a:p>
-            <a:br>
-              <a:rPr lang="en-US" dirty="0">
-                <a:solidFill>
-                  <a:srgbClr val="D4D4D4"/>
-                </a:solidFill>
-                <a:latin typeface="Menlo" panose="020B0609030804020204" pitchFamily="49" charset="0"/>
-              </a:rPr>
-            </a:br>
-            <a:r>
-              <a:rPr lang="en-US" dirty="0">
-                <a:solidFill>
-                  <a:srgbClr val="569CD6"/>
-                </a:solidFill>
-                <a:latin typeface="Menlo" panose="020B0609030804020204" pitchFamily="49" charset="0"/>
-              </a:rPr>
-              <a:t>function</a:t>
-            </a:r>
-            <a:r>
-              <a:rPr lang="en-US" dirty="0">
-                <a:solidFill>
-                  <a:srgbClr val="D4D4D4"/>
-                </a:solidFill>
-                <a:latin typeface="Menlo" panose="020B0609030804020204" pitchFamily="49" charset="0"/>
-              </a:rPr>
-              <a:t> </a:t>
-            </a:r>
-            <a:r>
-              <a:rPr lang="en-US" dirty="0" err="1">
-                <a:solidFill>
-                  <a:schemeClr val="accent2"/>
-                </a:solidFill>
-                <a:latin typeface="Menlo" panose="020B0609030804020204" pitchFamily="49" charset="0"/>
-              </a:rPr>
-              <a:t>myPluginCommand</a:t>
-            </a:r>
-            <a:r>
-              <a:rPr lang="en-US" dirty="0">
-                <a:solidFill>
-                  <a:srgbClr val="D4D4D4"/>
-                </a:solidFill>
-                <a:latin typeface="Menlo" panose="020B0609030804020204" pitchFamily="49" charset="0"/>
-              </a:rPr>
-              <a:t>(</a:t>
-            </a:r>
-            <a:r>
-              <a:rPr lang="en-US" dirty="0">
-                <a:solidFill>
-                  <a:srgbClr val="0070C0"/>
-                </a:solidFill>
-                <a:latin typeface="Menlo" panose="020B0609030804020204" pitchFamily="49" charset="0"/>
-              </a:rPr>
-              <a:t>selection</a:t>
-            </a:r>
-            <a:r>
-              <a:rPr lang="en-US" dirty="0">
-                <a:solidFill>
-                  <a:srgbClr val="D4D4D4"/>
-                </a:solidFill>
-                <a:latin typeface="Menlo" panose="020B0609030804020204" pitchFamily="49" charset="0"/>
-              </a:rPr>
-              <a:t>) {</a:t>
-            </a:r>
-            <a:br>
-              <a:rPr lang="en-US" dirty="0">
-                <a:solidFill>
-                  <a:srgbClr val="D4D4D4"/>
-                </a:solidFill>
-                <a:latin typeface="Menlo" panose="020B0609030804020204" pitchFamily="49" charset="0"/>
-              </a:rPr>
-            </a:br>
-            <a:r>
-              <a:rPr lang="en-US" dirty="0">
-                <a:solidFill>
-                  <a:srgbClr val="D4D4D4"/>
-                </a:solidFill>
-                <a:latin typeface="Menlo" panose="020B0609030804020204" pitchFamily="49" charset="0"/>
-              </a:rPr>
-              <a:t>    // Your code goes here</a:t>
-            </a:r>
-            <a:br>
-              <a:rPr lang="en-US" dirty="0">
-                <a:solidFill>
-                  <a:srgbClr val="D4D4D4"/>
-                </a:solidFill>
-                <a:latin typeface="Menlo" panose="020B0609030804020204" pitchFamily="49" charset="0"/>
-              </a:rPr>
-            </a:br>
-            <a:r>
-              <a:rPr lang="en-US" dirty="0">
-                <a:solidFill>
-                  <a:srgbClr val="D4D4D4"/>
-                </a:solidFill>
-                <a:latin typeface="Menlo" panose="020B0609030804020204" pitchFamily="49" charset="0"/>
-              </a:rPr>
-              <a:t>}</a:t>
-            </a:r>
-          </a:p>
-          <a:p>
-            <a:br>
-              <a:rPr lang="en-US" dirty="0">
-                <a:solidFill>
-                  <a:srgbClr val="D4D4D4"/>
-                </a:solidFill>
-                <a:latin typeface="Menlo" panose="020B0609030804020204" pitchFamily="49" charset="0"/>
-              </a:rPr>
-            </a:br>
-            <a:r>
-              <a:rPr lang="en-US" dirty="0" err="1">
-                <a:solidFill>
-                  <a:srgbClr val="4EC9B0"/>
-                </a:solidFill>
-                <a:latin typeface="Menlo" panose="020B0609030804020204" pitchFamily="49" charset="0"/>
-              </a:rPr>
-              <a:t>module</a:t>
-            </a:r>
-            <a:r>
-              <a:rPr lang="en-US" dirty="0" err="1">
-                <a:solidFill>
-                  <a:srgbClr val="D4D4D4"/>
-                </a:solidFill>
-                <a:latin typeface="Menlo" panose="020B0609030804020204" pitchFamily="49" charset="0"/>
-              </a:rPr>
-              <a:t>.</a:t>
-            </a:r>
-            <a:r>
-              <a:rPr lang="en-US" dirty="0" err="1">
-                <a:solidFill>
-                  <a:srgbClr val="4EC9B0"/>
-                </a:solidFill>
-                <a:latin typeface="Menlo" panose="020B0609030804020204" pitchFamily="49" charset="0"/>
-              </a:rPr>
-              <a:t>exports</a:t>
-            </a:r>
-            <a:r>
-              <a:rPr lang="en-US" dirty="0">
-                <a:solidFill>
-                  <a:srgbClr val="D4D4D4"/>
-                </a:solidFill>
-                <a:latin typeface="Menlo" panose="020B0609030804020204" pitchFamily="49" charset="0"/>
-              </a:rPr>
-              <a:t> = {</a:t>
-            </a:r>
-          </a:p>
-          <a:p>
-            <a:r>
-              <a:rPr lang="en-US" dirty="0">
-                <a:solidFill>
-                  <a:srgbClr val="D4D4D4"/>
-                </a:solidFill>
-                <a:latin typeface="Menlo" panose="020B0609030804020204" pitchFamily="49" charset="0"/>
-              </a:rPr>
-              <a:t>    </a:t>
-            </a:r>
-            <a:r>
-              <a:rPr lang="en-US" dirty="0">
-                <a:solidFill>
-                  <a:srgbClr val="0070C0"/>
-                </a:solidFill>
-                <a:latin typeface="Menlo" panose="020B0609030804020204" pitchFamily="49" charset="0"/>
-              </a:rPr>
-              <a:t>commands</a:t>
-            </a:r>
-            <a:r>
-              <a:rPr lang="en-US" dirty="0">
-                <a:solidFill>
-                  <a:srgbClr val="9CDCFE"/>
-                </a:solidFill>
-                <a:latin typeface="Menlo" panose="020B0609030804020204" pitchFamily="49" charset="0"/>
-              </a:rPr>
-              <a:t>:</a:t>
-            </a:r>
-            <a:r>
-              <a:rPr lang="en-US" dirty="0">
-                <a:solidFill>
-                  <a:srgbClr val="D4D4D4"/>
-                </a:solidFill>
-                <a:latin typeface="Menlo" panose="020B0609030804020204" pitchFamily="49" charset="0"/>
-              </a:rPr>
-              <a:t> {</a:t>
-            </a:r>
-          </a:p>
-          <a:p>
-            <a:r>
-              <a:rPr lang="en-US" dirty="0">
-                <a:solidFill>
-                  <a:srgbClr val="D4D4D4"/>
-                </a:solidFill>
-                <a:latin typeface="Menlo" panose="020B0609030804020204" pitchFamily="49" charset="0"/>
-              </a:rPr>
-              <a:t>        </a:t>
-            </a:r>
-            <a:r>
-              <a:rPr lang="en-US" dirty="0" err="1">
-                <a:solidFill>
-                  <a:srgbClr val="0070C0"/>
-                </a:solidFill>
-                <a:latin typeface="Menlo" panose="020B0609030804020204" pitchFamily="49" charset="0"/>
-              </a:rPr>
-              <a:t>myPluginCommand</a:t>
+              <a:t>: </a:t>
+            </a:r>
+            <a:r>
+              <a:rPr lang="en-US" dirty="0">
+                <a:solidFill>
+                  <a:srgbClr val="CE9178"/>
+                </a:solidFill>
+                <a:latin typeface="Menlo" panose="020B0609030804020204" pitchFamily="49" charset="0"/>
+              </a:rPr>
+              <a:t> "21.0"</a:t>
             </a:r>
             <a:endParaRPr lang="en-US" dirty="0">
               <a:solidFill>
-                <a:srgbClr val="0070C0"/>
+                <a:srgbClr val="D4D4D4"/>
               </a:solidFill>
               <a:latin typeface="Menlo" panose="020B0609030804020204" pitchFamily="49" charset="0"/>
             </a:endParaRPr>
@@ -14043,7 +14108,7 @@
                 </a:solidFill>
                 <a:latin typeface="Menlo" panose="020B0609030804020204" pitchFamily="49" charset="0"/>
               </a:rPr>
-              <a:t>    }</a:t>
+              <a:t>    },</a:t>
             </a:r>
           </a:p>
           <a:p>
@@ -14054,7 +14119,261 @@
                 </a:solidFill>
                 <a:latin typeface="Menlo" panose="020B0609030804020204" pitchFamily="49" charset="0"/>
               </a:rPr>
-              <a:t>};</a:t>
+              <a:t>    </a:t>
+            </a:r>
+            <a:r>
+              <a:rPr lang="en-US" dirty="0">
+                <a:solidFill>
+                  <a:srgbClr val="0070C0"/>
+                </a:solidFill>
+                <a:latin typeface="Menlo" panose="020B0609030804020204" pitchFamily="49" charset="0"/>
+              </a:rPr>
+              <a:t>"version"</a:t>
+            </a:r>
+            <a:r>
+              <a:rPr lang="en-US" dirty="0">
+                <a:solidFill>
+                  <a:srgbClr val="D4D4D4"/>
+                </a:solidFill>
+                <a:latin typeface="Menlo" panose="020B0609030804020204" pitchFamily="49" charset="0"/>
+              </a:rPr>
+              <a:t>: </a:t>
+            </a:r>
+            <a:r>
+              <a:rPr lang="en-US" dirty="0">
+                <a:solidFill>
+                  <a:srgbClr val="CE9178"/>
+                </a:solidFill>
+                <a:latin typeface="Menlo" panose="020B0609030804020204" pitchFamily="49" charset="0"/>
+              </a:rPr>
+              <a:t>"0.0.1"</a:t>
+            </a:r>
+            <a:r>
+              <a:rPr lang="en-US" dirty="0">
+                <a:solidFill>
+                  <a:srgbClr val="D4D4D4"/>
+                </a:solidFill>
+                <a:latin typeface="Menlo" panose="020B0609030804020204" pitchFamily="49" charset="0"/>
+              </a:rPr>
+              <a:t>,</a:t>
+            </a:r>
+          </a:p>
+          <a:p>
+            <a:r>
+              <a:rPr lang="en-US" dirty="0">
+                <a:solidFill>
+                  <a:srgbClr val="D4D4D4"/>
+                </a:solidFill>
+                <a:latin typeface="Menlo" panose="020B0609030804020204" pitchFamily="49" charset="0"/>
+              </a:rPr>
+              <a:t>    </a:t>
+            </a:r>
+            <a:r>
+              <a:rPr lang="en-US" dirty="0">
+                <a:solidFill>
+                  <a:srgbClr val="0070C0"/>
+                </a:solidFill>
+                <a:latin typeface="Menlo" panose="020B0609030804020204" pitchFamily="49" charset="0"/>
+              </a:rPr>
+              <a:t>"</a:t>
+            </a:r>
+            <a:r>
+              <a:rPr lang="en-US" dirty="0" err="1">
+                <a:solidFill>
+                  <a:srgbClr val="0070C0"/>
+                </a:solidFill>
+                <a:latin typeface="Menlo" panose="020B0609030804020204" pitchFamily="49" charset="0"/>
+              </a:rPr>
+              <a:t>uiEntryPoints</a:t>
+            </a:r>
+            <a:r>
+              <a:rPr lang="en-US" dirty="0">
+                <a:solidFill>
+                  <a:srgbClr val="0070C0"/>
+                </a:solidFill>
+                <a:latin typeface="Menlo" panose="020B0609030804020204" pitchFamily="49" charset="0"/>
+              </a:rPr>
+              <a:t>"</a:t>
+            </a:r>
+            <a:r>
+              <a:rPr lang="en-US" dirty="0">
+                <a:solidFill>
+                  <a:srgbClr val="D4D4D4"/>
+                </a:solidFill>
+                <a:latin typeface="Menlo" panose="020B0609030804020204" pitchFamily="49" charset="0"/>
+              </a:rPr>
+              <a:t>: [</a:t>
+            </a:r>
+          </a:p>
+          <a:p>
+            <a:r>
+              <a:rPr lang="en-US" dirty="0">
+                <a:solidFill>
+                  <a:srgbClr val="D4D4D4"/>
+                </a:solidFill>
+                <a:latin typeface="Menlo" panose="020B0609030804020204" pitchFamily="49" charset="0"/>
+              </a:rPr>
+              <a:t>        {</a:t>
+            </a:r>
+          </a:p>
+          <a:p>
+            <a:r>
+              <a:rPr lang="en-US" dirty="0">
+                <a:solidFill>
+                  <a:srgbClr val="D4D4D4"/>
+                </a:solidFill>
+                <a:latin typeface="Menlo" panose="020B0609030804020204" pitchFamily="49" charset="0"/>
+              </a:rPr>
+              <a:t>            </a:t>
+            </a:r>
+            <a:r>
+              <a:rPr lang="en-US" dirty="0">
+                <a:solidFill>
+                  <a:srgbClr val="0070C0"/>
+                </a:solidFill>
+                <a:latin typeface="Menlo" panose="020B0609030804020204" pitchFamily="49" charset="0"/>
+              </a:rPr>
+              <a:t>"type"</a:t>
+            </a:r>
+            <a:r>
+              <a:rPr lang="en-US" dirty="0">
+                <a:solidFill>
+                  <a:srgbClr val="D4D4D4"/>
+                </a:solidFill>
+                <a:latin typeface="Menlo" panose="020B0609030804020204" pitchFamily="49" charset="0"/>
+              </a:rPr>
+              <a:t>: </a:t>
+            </a:r>
+            <a:r>
+              <a:rPr lang="en-US" dirty="0">
+                <a:solidFill>
+                  <a:srgbClr val="CE9178"/>
+                </a:solidFill>
+                <a:latin typeface="Menlo" panose="020B0609030804020204" pitchFamily="49" charset="0"/>
+              </a:rPr>
+              <a:t>"menu"</a:t>
+            </a:r>
+            <a:r>
+              <a:rPr lang="en-US" dirty="0">
+                <a:solidFill>
+                  <a:srgbClr val="D4D4D4"/>
+                </a:solidFill>
+                <a:latin typeface="Menlo" panose="020B0609030804020204" pitchFamily="49" charset="0"/>
+              </a:rPr>
+              <a:t>,</a:t>
+            </a:r>
+          </a:p>
+          <a:p>
+            <a:r>
+              <a:rPr lang="en-US" dirty="0">
+                <a:solidFill>
+                  <a:srgbClr val="D4D4D4"/>
+                </a:solidFill>
+                <a:latin typeface="Menlo" panose="020B0609030804020204" pitchFamily="49" charset="0"/>
+              </a:rPr>
+              <a:t>            </a:t>
+            </a:r>
+            <a:r>
+              <a:rPr lang="en-US" dirty="0">
+                <a:solidFill>
+                  <a:srgbClr val="0070C0"/>
+                </a:solidFill>
+                <a:latin typeface="Menlo" panose="020B0609030804020204" pitchFamily="49" charset="0"/>
+              </a:rPr>
+              <a:t>"</a:t>
+            </a:r>
+            <a:r>
+              <a:rPr lang="en-US" dirty="0" err="1">
+                <a:solidFill>
+                  <a:srgbClr val="0070C0"/>
+                </a:solidFill>
+                <a:latin typeface="Menlo" panose="020B0609030804020204" pitchFamily="49" charset="0"/>
+              </a:rPr>
+              <a:t>commandId</a:t>
+            </a:r>
+            <a:r>
+              <a:rPr lang="en-US" dirty="0">
+                <a:solidFill>
+                  <a:srgbClr val="0070C0"/>
+                </a:solidFill>
+                <a:latin typeface="Menlo" panose="020B0609030804020204" pitchFamily="49" charset="0"/>
+              </a:rPr>
+              <a:t>"</a:t>
+            </a:r>
+            <a:r>
+              <a:rPr lang="en-US" dirty="0">
+                <a:solidFill>
+                  <a:srgbClr val="D4D4D4"/>
+                </a:solidFill>
+                <a:latin typeface="Menlo" panose="020B0609030804020204" pitchFamily="49" charset="0"/>
+              </a:rPr>
+              <a:t>: </a:t>
+            </a:r>
+            <a:r>
+              <a:rPr lang="en-US" dirty="0">
+                <a:solidFill>
+                  <a:srgbClr val="CE9178"/>
+                </a:solidFill>
+                <a:latin typeface="Menlo" panose="020B0609030804020204" pitchFamily="49" charset="0"/>
+              </a:rPr>
+              <a:t>"</a:t>
+            </a:r>
+            <a:r>
+              <a:rPr lang="en-US" dirty="0" err="1">
+                <a:solidFill>
+                  <a:srgbClr val="CE9178"/>
+                </a:solidFill>
+                <a:latin typeface="Menlo" panose="020B0609030804020204" pitchFamily="49" charset="0"/>
+              </a:rPr>
+              <a:t>myPluginCommand</a:t>
+            </a:r>
+            <a:r>
+              <a:rPr lang="en-US" dirty="0">
+                <a:solidFill>
+                  <a:srgbClr val="CE9178"/>
+                </a:solidFill>
+                <a:latin typeface="Menlo" panose="020B0609030804020204" pitchFamily="49" charset="0"/>
+              </a:rPr>
+              <a:t>"</a:t>
+            </a:r>
+            <a:endParaRPr lang="en-US" dirty="0">
+              <a:solidFill>
+                <a:srgbClr val="D4D4D4"/>
+              </a:solidFill>
+              <a:latin typeface="Menlo" panose="020B0609030804020204" pitchFamily="49" charset="0"/>
+            </a:endParaRPr>
+          </a:p>
+          <a:p>
+            <a:r>
+              <a:rPr lang="en-US" dirty="0">
+                <a:solidFill>
+                  <a:srgbClr val="D4D4D4"/>
+                </a:solidFill>
+                <a:latin typeface="Menlo" panose="020B0609030804020204" pitchFamily="49" charset="0"/>
+              </a:rPr>
+              <a:t>        }</a:t>
+            </a:r>
+          </a:p>
+          <a:p>
+            <a:r>
+              <a:rPr lang="en-US" dirty="0">
+                <a:solidFill>
+                  <a:srgbClr val="D4D4D4"/>
+                </a:solidFill>
+                <a:latin typeface="Menlo" panose="020B0609030804020204" pitchFamily="49" charset="0"/>
+              </a:rPr>
+              <a:t>    ]</a:t>
+            </a:r>
+          </a:p>
+          <a:p>
+            <a:r>
+              <a:rPr lang="en-US" dirty="0">
+                <a:solidFill>
+                  <a:srgbClr val="D4D4D4"/>
+                </a:solidFill>
+                <a:latin typeface="Menlo" panose="020B0609030804020204" pitchFamily="49" charset="0"/>
+              </a:rPr>
+              <a:t>}</a:t>
             </a:r>
             <a:endParaRPr lang="en-US" b="0" dirty="0">
               <a:solidFill>
@@ -14069,7 +14388,7 @@
     </p:spTree>
     <p:extLst>
       <p:ext uri="{BB962C8B-B14F-4D97-AF65-F5344CB8AC3E}">
-        <p14:creationId xmlns:p14="http://schemas.microsoft.com/office/powerpoint/2010/main" val="677555719"/>
+        <p14:creationId xmlns:p14="http://schemas.microsoft.com/office/powerpoint/2010/main" val="274094858"/>
       </p:ext>
     </p:extLst>
   </p:cSld>
@@ -14098,10 +14417,10 @@
       </p:grpSpPr>
       <p:sp>
         <p:nvSpPr>
-          <p:cNvPr id="2" name="TextBox 1">
-            <a:extLst>
-              <a:ext uri="{FF2B5EF4-FFF2-40B4-BE49-F238E27FC236}">
-                <a16:creationId xmlns:a16="http://schemas.microsoft.com/office/drawing/2014/main" id="{67B4816E-72C2-F84B-80B4-E397406F2CDA}"/>
+          <p:cNvPr id="3" name="TextBox 2">
+            <a:extLst>
+              <a:ext uri="{FF2B5EF4-FFF2-40B4-BE49-F238E27FC236}">
+                <a16:creationId xmlns:a16="http://schemas.microsoft.com/office/drawing/2014/main" id="{343C25F1-7B9A-C94C-A52A-9476D93D4996}"/>
               </a:ext>
             </a:extLst>
           </p:cNvPr>
@@ -14110,8 +14429,8 @@
         </p:nvSpPr>
         <p:spPr>
           <a:xfrm>
-            <a:off x="2272748" y="2921169"/>
-            <a:ext cx="7646504" cy="1015663"/>
+            <a:off x="2551044" y="104840"/>
+            <a:ext cx="7089913" cy="784830"/>
           </a:xfrm>
           <a:prstGeom prst="rect">
             <a:avLst/>
@@ -14124,31 +14443,419 @@
           </a:bodyPr>
           <a:lstStyle/>
           <a:p>
-            <a:r>
-              <a:rPr lang="en-US" sz="6000" dirty="0">
-                <a:solidFill>
-                  <a:schemeClr val="accent4">
-                    <a:lumMod val="75000"/>
+            <a:pPr algn="ctr"/>
+            <a:r>
+              <a:rPr lang="en-US" sz="4500" dirty="0">
+                <a:solidFill>
+                  <a:schemeClr val="tx1">
+                    <a:lumMod val="50000"/>
+                    <a:lumOff val="50000"/>
                   </a:schemeClr>
                 </a:solidFill>
               </a:rPr>
-              <a:t>PART1</a:t>
-            </a:r>
-            <a:r>
-              <a:rPr lang="en-US" sz="6000" dirty="0">
+              <a:t>Populate </a:t>
+            </a:r>
+            <a:r>
+              <a:rPr lang="en-US" sz="4500" dirty="0" err="1">
+                <a:solidFill>
+                  <a:schemeClr val="tx1">
+                    <a:lumMod val="50000"/>
+                    <a:lumOff val="50000"/>
+                  </a:schemeClr>
+                </a:solidFill>
+              </a:rPr>
+              <a:t>main.js</a:t>
+            </a:r>
+            <a:endParaRPr lang="en-US" sz="4500" dirty="0">
+              <a:solidFill>
+                <a:schemeClr val="tx1">
+                  <a:lumMod val="50000"/>
+                  <a:lumOff val="50000"/>
+                </a:schemeClr>
+              </a:solidFill>
+            </a:endParaRPr>
+          </a:p>
+        </p:txBody>
+      </p:sp>
+      <p:sp>
+        <p:nvSpPr>
+          <p:cNvPr id="4" name="Rectangle 3">
+            <a:extLst>
+              <a:ext uri="{FF2B5EF4-FFF2-40B4-BE49-F238E27FC236}">
+                <a16:creationId xmlns:a16="http://schemas.microsoft.com/office/drawing/2014/main" id="{18159D3C-AA5D-0549-8DCD-5176449BD7E8}"/>
+              </a:ext>
+            </a:extLst>
+          </p:cNvPr>
+          <p:cNvSpPr/>
+          <p:nvPr/>
+        </p:nvSpPr>
+        <p:spPr>
+          <a:xfrm>
+            <a:off x="2376880" y="1535471"/>
+            <a:ext cx="7438239" cy="3139321"/>
+          </a:xfrm>
+          <a:prstGeom prst="rect">
+            <a:avLst/>
+          </a:prstGeom>
+        </p:spPr>
+        <p:txBody>
+          <a:bodyPr wrap="square">
+            <a:spAutoFit/>
+          </a:bodyPr>
+          <a:lstStyle/>
+          <a:p>
+            <a:r>
+              <a:rPr lang="en-US" dirty="0">
+                <a:solidFill>
+                  <a:srgbClr val="569CD6"/>
+                </a:solidFill>
+                <a:latin typeface="Menlo" panose="020B0609030804020204" pitchFamily="49" charset="0"/>
+              </a:rPr>
+              <a:t>const</a:t>
+            </a:r>
+            <a:r>
+              <a:rPr lang="en-US" dirty="0">
+                <a:solidFill>
+                  <a:srgbClr val="D4D4D4"/>
+                </a:solidFill>
+                <a:latin typeface="Menlo" panose="020B0609030804020204" pitchFamily="49" charset="0"/>
+              </a:rPr>
+              <a:t> { </a:t>
+            </a:r>
+            <a:r>
+              <a:rPr lang="en-US" dirty="0">
                 <a:solidFill>
                   <a:srgbClr val="0070C0"/>
                 </a:solidFill>
-              </a:rPr>
-              <a:t>  Getting started</a:t>
-            </a:r>
+                <a:latin typeface="Menlo" panose="020B0609030804020204" pitchFamily="49" charset="0"/>
+              </a:rPr>
+              <a:t>Rectangle</a:t>
+            </a:r>
+            <a:r>
+              <a:rPr lang="en-US" dirty="0">
+                <a:solidFill>
+                  <a:srgbClr val="D4D4D4"/>
+                </a:solidFill>
+                <a:latin typeface="Menlo" panose="020B0609030804020204" pitchFamily="49" charset="0"/>
+              </a:rPr>
+              <a:t>, </a:t>
+            </a:r>
+            <a:r>
+              <a:rPr lang="en-US" dirty="0">
+                <a:solidFill>
+                  <a:srgbClr val="0070C0"/>
+                </a:solidFill>
+                <a:latin typeface="Menlo" panose="020B0609030804020204" pitchFamily="49" charset="0"/>
+              </a:rPr>
+              <a:t>Color</a:t>
+            </a:r>
+            <a:r>
+              <a:rPr lang="en-US" dirty="0">
+                <a:solidFill>
+                  <a:srgbClr val="D4D4D4"/>
+                </a:solidFill>
+                <a:latin typeface="Menlo" panose="020B0609030804020204" pitchFamily="49" charset="0"/>
+              </a:rPr>
+              <a:t> } = </a:t>
+            </a:r>
+            <a:r>
+              <a:rPr lang="en-US" dirty="0">
+                <a:solidFill>
+                  <a:schemeClr val="accent2"/>
+                </a:solidFill>
+                <a:latin typeface="Menlo" panose="020B0609030804020204" pitchFamily="49" charset="0"/>
+              </a:rPr>
+              <a:t>require</a:t>
+            </a:r>
+            <a:r>
+              <a:rPr lang="en-US" dirty="0">
+                <a:solidFill>
+                  <a:srgbClr val="D4D4D4"/>
+                </a:solidFill>
+                <a:latin typeface="Menlo" panose="020B0609030804020204" pitchFamily="49" charset="0"/>
+              </a:rPr>
+              <a:t>(</a:t>
+            </a:r>
+            <a:r>
+              <a:rPr lang="en-US" dirty="0">
+                <a:solidFill>
+                  <a:srgbClr val="FF0000"/>
+                </a:solidFill>
+                <a:latin typeface="Menlo" panose="020B0609030804020204" pitchFamily="49" charset="0"/>
+              </a:rPr>
+              <a:t>"</a:t>
+            </a:r>
+            <a:r>
+              <a:rPr lang="en-US" dirty="0" err="1">
+                <a:solidFill>
+                  <a:srgbClr val="FF0000"/>
+                </a:solidFill>
+                <a:latin typeface="Menlo" panose="020B0609030804020204" pitchFamily="49" charset="0"/>
+              </a:rPr>
+              <a:t>scenegraph</a:t>
+            </a:r>
+            <a:r>
+              <a:rPr lang="en-US" dirty="0">
+                <a:solidFill>
+                  <a:srgbClr val="FF0000"/>
+                </a:solidFill>
+                <a:latin typeface="Menlo" panose="020B0609030804020204" pitchFamily="49" charset="0"/>
+              </a:rPr>
+              <a:t>"</a:t>
+            </a:r>
+            <a:r>
+              <a:rPr lang="en-US" dirty="0">
+                <a:solidFill>
+                  <a:srgbClr val="D4D4D4"/>
+                </a:solidFill>
+                <a:latin typeface="Menlo" panose="020B0609030804020204" pitchFamily="49" charset="0"/>
+              </a:rPr>
+              <a:t>);</a:t>
+            </a:r>
+          </a:p>
+          <a:p>
+            <a:br>
+              <a:rPr lang="en-US" dirty="0">
+                <a:solidFill>
+                  <a:srgbClr val="D4D4D4"/>
+                </a:solidFill>
+                <a:latin typeface="Menlo" panose="020B0609030804020204" pitchFamily="49" charset="0"/>
+              </a:rPr>
+            </a:br>
+            <a:r>
+              <a:rPr lang="en-US" dirty="0">
+                <a:solidFill>
+                  <a:srgbClr val="569CD6"/>
+                </a:solidFill>
+                <a:latin typeface="Menlo" panose="020B0609030804020204" pitchFamily="49" charset="0"/>
+              </a:rPr>
+              <a:t>function</a:t>
+            </a:r>
+            <a:r>
+              <a:rPr lang="en-US" dirty="0">
+                <a:solidFill>
+                  <a:srgbClr val="D4D4D4"/>
+                </a:solidFill>
+                <a:latin typeface="Menlo" panose="020B0609030804020204" pitchFamily="49" charset="0"/>
+              </a:rPr>
+              <a:t> </a:t>
+            </a:r>
+            <a:r>
+              <a:rPr lang="en-US" dirty="0" err="1">
+                <a:solidFill>
+                  <a:schemeClr val="accent2"/>
+                </a:solidFill>
+                <a:latin typeface="Menlo" panose="020B0609030804020204" pitchFamily="49" charset="0"/>
+              </a:rPr>
+              <a:t>myPluginCommand</a:t>
+            </a:r>
+            <a:r>
+              <a:rPr lang="en-US" dirty="0">
+                <a:solidFill>
+                  <a:srgbClr val="D4D4D4"/>
+                </a:solidFill>
+                <a:latin typeface="Menlo" panose="020B0609030804020204" pitchFamily="49" charset="0"/>
+              </a:rPr>
+              <a:t>(</a:t>
+            </a:r>
+            <a:r>
+              <a:rPr lang="en-US" dirty="0">
+                <a:solidFill>
+                  <a:srgbClr val="0070C0"/>
+                </a:solidFill>
+                <a:latin typeface="Menlo" panose="020B0609030804020204" pitchFamily="49" charset="0"/>
+              </a:rPr>
+              <a:t>selection</a:t>
+            </a:r>
+            <a:r>
+              <a:rPr lang="en-US" dirty="0">
+                <a:solidFill>
+                  <a:srgbClr val="D4D4D4"/>
+                </a:solidFill>
+                <a:latin typeface="Menlo" panose="020B0609030804020204" pitchFamily="49" charset="0"/>
+              </a:rPr>
+              <a:t>) {</a:t>
+            </a:r>
+            <a:br>
+              <a:rPr lang="en-US" dirty="0">
+                <a:solidFill>
+                  <a:srgbClr val="D4D4D4"/>
+                </a:solidFill>
+                <a:latin typeface="Menlo" panose="020B0609030804020204" pitchFamily="49" charset="0"/>
+              </a:rPr>
+            </a:br>
+            <a:r>
+              <a:rPr lang="en-US" dirty="0">
+                <a:solidFill>
+                  <a:srgbClr val="D4D4D4"/>
+                </a:solidFill>
+                <a:latin typeface="Menlo" panose="020B0609030804020204" pitchFamily="49" charset="0"/>
+              </a:rPr>
+              <a:t>    // Your code goes here</a:t>
+            </a:r>
+            <a:br>
+              <a:rPr lang="en-US" dirty="0">
+                <a:solidFill>
+                  <a:srgbClr val="D4D4D4"/>
+                </a:solidFill>
+                <a:latin typeface="Menlo" panose="020B0609030804020204" pitchFamily="49" charset="0"/>
+              </a:rPr>
+            </a:br>
+            <a:r>
+              <a:rPr lang="en-US" dirty="0">
+                <a:solidFill>
+                  <a:srgbClr val="D4D4D4"/>
+                </a:solidFill>
+                <a:latin typeface="Menlo" panose="020B0609030804020204" pitchFamily="49" charset="0"/>
+              </a:rPr>
+              <a:t>}</a:t>
+            </a:r>
+          </a:p>
+          <a:p>
+            <a:br>
+              <a:rPr lang="en-US" dirty="0">
+                <a:solidFill>
+                  <a:srgbClr val="D4D4D4"/>
+                </a:solidFill>
+                <a:latin typeface="Menlo" panose="020B0609030804020204" pitchFamily="49" charset="0"/>
+              </a:rPr>
+            </a:br>
+            <a:r>
+              <a:rPr lang="en-US" dirty="0" err="1">
+                <a:solidFill>
+                  <a:srgbClr val="4EC9B0"/>
+                </a:solidFill>
+                <a:latin typeface="Menlo" panose="020B0609030804020204" pitchFamily="49" charset="0"/>
+              </a:rPr>
+              <a:t>module</a:t>
+            </a:r>
+            <a:r>
+              <a:rPr lang="en-US" dirty="0" err="1">
+                <a:solidFill>
+                  <a:srgbClr val="D4D4D4"/>
+                </a:solidFill>
+                <a:latin typeface="Menlo" panose="020B0609030804020204" pitchFamily="49" charset="0"/>
+              </a:rPr>
+              <a:t>.</a:t>
+            </a:r>
+            <a:r>
+              <a:rPr lang="en-US" dirty="0" err="1">
+                <a:solidFill>
+                  <a:srgbClr val="4EC9B0"/>
+                </a:solidFill>
+                <a:latin typeface="Menlo" panose="020B0609030804020204" pitchFamily="49" charset="0"/>
+              </a:rPr>
+              <a:t>exports</a:t>
+            </a:r>
+            <a:r>
+              <a:rPr lang="en-US" dirty="0">
+                <a:solidFill>
+                  <a:srgbClr val="D4D4D4"/>
+                </a:solidFill>
+                <a:latin typeface="Menlo" panose="020B0609030804020204" pitchFamily="49" charset="0"/>
+              </a:rPr>
+              <a:t> = {</a:t>
+            </a:r>
+          </a:p>
+          <a:p>
+            <a:r>
+              <a:rPr lang="en-US" dirty="0">
+                <a:solidFill>
+                  <a:srgbClr val="D4D4D4"/>
+                </a:solidFill>
+                <a:latin typeface="Menlo" panose="020B0609030804020204" pitchFamily="49" charset="0"/>
+              </a:rPr>
+              <a:t>    </a:t>
+            </a:r>
+            <a:r>
+              <a:rPr lang="en-US" dirty="0">
+                <a:solidFill>
+                  <a:srgbClr val="0070C0"/>
+                </a:solidFill>
+                <a:latin typeface="Menlo" panose="020B0609030804020204" pitchFamily="49" charset="0"/>
+              </a:rPr>
+              <a:t>commands</a:t>
+            </a:r>
+            <a:r>
+              <a:rPr lang="en-US" dirty="0">
+                <a:solidFill>
+                  <a:srgbClr val="9CDCFE"/>
+                </a:solidFill>
+                <a:latin typeface="Menlo" panose="020B0609030804020204" pitchFamily="49" charset="0"/>
+              </a:rPr>
+              <a:t>:</a:t>
+            </a:r>
+            <a:r>
+              <a:rPr lang="en-US" dirty="0">
+                <a:solidFill>
+                  <a:srgbClr val="D4D4D4"/>
+                </a:solidFill>
+                <a:latin typeface="Menlo" panose="020B0609030804020204" pitchFamily="49" charset="0"/>
+              </a:rPr>
+              <a:t> {</a:t>
+            </a:r>
+          </a:p>
+          <a:p>
+            <a:r>
+              <a:rPr lang="en-US" dirty="0">
+                <a:solidFill>
+                  <a:srgbClr val="D4D4D4"/>
+                </a:solidFill>
+                <a:latin typeface="Menlo" panose="020B0609030804020204" pitchFamily="49" charset="0"/>
+              </a:rPr>
+              <a:t>        </a:t>
+            </a:r>
+            <a:r>
+              <a:rPr lang="en-US" dirty="0" err="1">
+                <a:solidFill>
+                  <a:srgbClr val="0070C0"/>
+                </a:solidFill>
+                <a:latin typeface="Menlo" panose="020B0609030804020204" pitchFamily="49" charset="0"/>
+              </a:rPr>
+              <a:t>myPluginCommand</a:t>
+            </a:r>
+            <a:endParaRPr lang="en-US" dirty="0">
+              <a:solidFill>
+                <a:srgbClr val="0070C0"/>
+              </a:solidFill>
+              <a:latin typeface="Menlo" panose="020B0609030804020204" pitchFamily="49" charset="0"/>
+            </a:endParaRPr>
+          </a:p>
+          <a:p>
+            <a:r>
+              <a:rPr lang="en-US" dirty="0">
+                <a:solidFill>
+                  <a:srgbClr val="D4D4D4"/>
+                </a:solidFill>
+                <a:latin typeface="Menlo" panose="020B0609030804020204" pitchFamily="49" charset="0"/>
+              </a:rPr>
+              <a:t>    }</a:t>
+            </a:r>
+          </a:p>
+          <a:p>
+            <a:r>
+              <a:rPr lang="en-US" dirty="0">
+                <a:solidFill>
+                  <a:srgbClr val="D4D4D4"/>
+                </a:solidFill>
+                <a:latin typeface="Menlo" panose="020B0609030804020204" pitchFamily="49" charset="0"/>
+              </a:rPr>
+              <a:t>};</a:t>
+            </a:r>
+            <a:endParaRPr lang="en-US" b="0" dirty="0">
+              <a:solidFill>
+                <a:srgbClr val="D4D4D4"/>
+              </a:solidFill>
+              <a:effectLst/>
+              <a:latin typeface="Menlo" panose="020B0609030804020204" pitchFamily="49" charset="0"/>
+            </a:endParaRPr>
           </a:p>
         </p:txBody>
       </p:sp>
     </p:spTree>
     <p:extLst>
       <p:ext uri="{BB962C8B-B14F-4D97-AF65-F5344CB8AC3E}">
-        <p14:creationId xmlns:p14="http://schemas.microsoft.com/office/powerpoint/2010/main" val="2085856702"/>
+        <p14:creationId xmlns:p14="http://schemas.microsoft.com/office/powerpoint/2010/main" val="677555719"/>
       </p:ext>
     </p:extLst>
   </p:cSld>
@@ -14177,10 +14884,10 @@
       </p:grpSpPr>
       <p:sp>
         <p:nvSpPr>
-          <p:cNvPr id="21" name="TextBox 20">
-            <a:extLst>
-              <a:ext uri="{FF2B5EF4-FFF2-40B4-BE49-F238E27FC236}">
-                <a16:creationId xmlns:a16="http://schemas.microsoft.com/office/drawing/2014/main" id="{887247C4-8834-874B-8F45-B85DB5798056}"/>
+          <p:cNvPr id="2" name="TextBox 1">
+            <a:extLst>
+              <a:ext uri="{FF2B5EF4-FFF2-40B4-BE49-F238E27FC236}">
+                <a16:creationId xmlns:a16="http://schemas.microsoft.com/office/drawing/2014/main" id="{67B4816E-72C2-F84B-80B4-E397406F2CDA}"/>
               </a:ext>
             </a:extLst>
           </p:cNvPr>
@@ -14189,8 +14896,8 @@
         </p:nvSpPr>
         <p:spPr>
           <a:xfrm>
-            <a:off x="2551044" y="104840"/>
-            <a:ext cx="7089913" cy="784830"/>
+            <a:off x="2272748" y="2921169"/>
+            <a:ext cx="7646504" cy="1015663"/>
           </a:xfrm>
           <a:prstGeom prst="rect">
             <a:avLst/>
@@ -14203,349 +14910,31 @@
           </a:bodyPr>
           <a:lstStyle/>
           <a:p>
-            <a:pPr algn="ctr"/>
-            <a:r>
-              <a:rPr lang="en-US" sz="4500" dirty="0">
-                <a:solidFill>
-                  <a:schemeClr val="tx1">
-                    <a:lumMod val="50000"/>
-                    <a:lumOff val="50000"/>
-                  </a:schemeClr>
-                </a:solidFill>
-              </a:rPr>
-              <a:t>Create a Rectangle Instance</a:t>
-            </a:r>
-          </a:p>
-        </p:txBody>
-      </p:sp>
-      <p:sp>
-        <p:nvSpPr>
-          <p:cNvPr id="5" name="Down Arrow 4">
-            <a:extLst>
-              <a:ext uri="{FF2B5EF4-FFF2-40B4-BE49-F238E27FC236}">
-                <a16:creationId xmlns:a16="http://schemas.microsoft.com/office/drawing/2014/main" id="{948CEE77-B360-DE4B-8F69-6918DE6A523A}"/>
-              </a:ext>
-            </a:extLst>
-          </p:cNvPr>
-          <p:cNvSpPr/>
-          <p:nvPr/>
-        </p:nvSpPr>
-        <p:spPr>
-          <a:xfrm>
-            <a:off x="5420139" y="2984329"/>
-            <a:ext cx="1351722" cy="1417983"/>
-          </a:xfrm>
-          <a:prstGeom prst="downArrow">
-            <a:avLst/>
-          </a:prstGeom>
-        </p:spPr>
-        <p:style>
-          <a:lnRef idx="2">
-            <a:schemeClr val="accent1">
-              <a:shade val="50000"/>
-            </a:schemeClr>
-          </a:lnRef>
-          <a:fillRef idx="1">
-            <a:schemeClr val="accent1"/>
-          </a:fillRef>
-          <a:effectRef idx="0">
-            <a:schemeClr val="accent1"/>
-          </a:effectRef>
-          <a:fontRef idx="minor">
-            <a:schemeClr val="lt1"/>
-          </a:fontRef>
-        </p:style>
-        <p:txBody>
-          <a:bodyPr rtlCol="0" anchor="ctr"/>
-          <a:lstStyle/>
-          <a:p>
-            <a:pPr algn="ctr"/>
-            <a:endParaRPr lang="en-US" dirty="0"/>
-          </a:p>
-        </p:txBody>
-      </p:sp>
-      <p:sp>
-        <p:nvSpPr>
-          <p:cNvPr id="12" name="Rectangle 11">
-            <a:extLst>
-              <a:ext uri="{FF2B5EF4-FFF2-40B4-BE49-F238E27FC236}">
-                <a16:creationId xmlns:a16="http://schemas.microsoft.com/office/drawing/2014/main" id="{4202D67D-925A-8E46-A725-492B9933C266}"/>
-              </a:ext>
-            </a:extLst>
-          </p:cNvPr>
-          <p:cNvSpPr/>
-          <p:nvPr/>
-        </p:nvSpPr>
-        <p:spPr>
-          <a:xfrm>
-            <a:off x="5254394" y="4717770"/>
-            <a:ext cx="1828800" cy="1828800"/>
-          </a:xfrm>
-          <a:prstGeom prst="rect">
-            <a:avLst/>
-          </a:prstGeom>
-          <a:noFill/>
-        </p:spPr>
-        <p:style>
-          <a:lnRef idx="2">
-            <a:schemeClr val="accent1">
-              <a:shade val="50000"/>
-            </a:schemeClr>
-          </a:lnRef>
-          <a:fillRef idx="1">
-            <a:schemeClr val="accent1"/>
-          </a:fillRef>
-          <a:effectRef idx="0">
-            <a:schemeClr val="accent1"/>
-          </a:effectRef>
-          <a:fontRef idx="minor">
-            <a:schemeClr val="lt1"/>
-          </a:fontRef>
-        </p:style>
-        <p:txBody>
-          <a:bodyPr rtlCol="0" anchor="ctr"/>
-          <a:lstStyle/>
-          <a:p>
-            <a:pPr algn="ctr"/>
-            <a:endParaRPr lang="en-US" dirty="0"/>
-          </a:p>
-        </p:txBody>
-      </p:sp>
-      <p:sp>
-        <p:nvSpPr>
-          <p:cNvPr id="13" name="Rectangle 12">
-            <a:extLst>
-              <a:ext uri="{FF2B5EF4-FFF2-40B4-BE49-F238E27FC236}">
-                <a16:creationId xmlns:a16="http://schemas.microsoft.com/office/drawing/2014/main" id="{A4F5ACA1-F995-4E4E-BAD4-9487E1E92CE1}"/>
-              </a:ext>
-            </a:extLst>
-          </p:cNvPr>
-          <p:cNvSpPr/>
-          <p:nvPr/>
-        </p:nvSpPr>
-        <p:spPr>
-          <a:xfrm>
-            <a:off x="1895061" y="1191543"/>
-            <a:ext cx="8401878" cy="1477328"/>
-          </a:xfrm>
-          <a:prstGeom prst="rect">
-            <a:avLst/>
-          </a:prstGeom>
-        </p:spPr>
-        <p:txBody>
-          <a:bodyPr wrap="square">
-            <a:spAutoFit/>
-          </a:bodyPr>
-          <a:lstStyle/>
-          <a:p>
-            <a:r>
-              <a:rPr lang="en-US" sz="3000" dirty="0">
-                <a:solidFill>
-                  <a:srgbClr val="569CD6"/>
-                </a:solidFill>
-                <a:latin typeface="Menlo" panose="020B0609030804020204" pitchFamily="49" charset="0"/>
-              </a:rPr>
-              <a:t>const</a:t>
-            </a:r>
-            <a:r>
-              <a:rPr lang="en-US" sz="3000" dirty="0">
-                <a:solidFill>
-                  <a:srgbClr val="D4D4D4"/>
-                </a:solidFill>
-                <a:latin typeface="Menlo" panose="020B0609030804020204" pitchFamily="49" charset="0"/>
-              </a:rPr>
-              <a:t> </a:t>
-            </a:r>
-            <a:r>
-              <a:rPr lang="en-US" sz="3000" dirty="0">
-                <a:solidFill>
-                  <a:schemeClr val="accent1">
+            <a:r>
+              <a:rPr lang="en-US" sz="6000" dirty="0">
+                <a:solidFill>
+                  <a:schemeClr val="accent4">
                     <a:lumMod val="75000"/>
                   </a:schemeClr>
                 </a:solidFill>
-                <a:latin typeface="Menlo" panose="020B0609030804020204" pitchFamily="49" charset="0"/>
-              </a:rPr>
-              <a:t>shape</a:t>
-            </a:r>
-            <a:r>
-              <a:rPr lang="en-US" sz="3000" dirty="0">
-                <a:solidFill>
-                  <a:srgbClr val="D4D4D4"/>
-                </a:solidFill>
-                <a:latin typeface="Menlo" panose="020B0609030804020204" pitchFamily="49" charset="0"/>
-              </a:rPr>
-              <a:t> = </a:t>
-            </a:r>
-            <a:r>
-              <a:rPr lang="en-US" sz="3000" dirty="0">
-                <a:solidFill>
-                  <a:srgbClr val="569CD6"/>
-                </a:solidFill>
-                <a:latin typeface="Menlo" panose="020B0609030804020204" pitchFamily="49" charset="0"/>
-              </a:rPr>
-              <a:t>new</a:t>
-            </a:r>
-            <a:r>
-              <a:rPr lang="en-US" sz="3000" dirty="0">
-                <a:solidFill>
-                  <a:srgbClr val="D4D4D4"/>
-                </a:solidFill>
-                <a:latin typeface="Menlo" panose="020B0609030804020204" pitchFamily="49" charset="0"/>
-              </a:rPr>
-              <a:t> </a:t>
-            </a:r>
-            <a:r>
-              <a:rPr lang="en-US" sz="3000" dirty="0">
-                <a:solidFill>
-                  <a:srgbClr val="4EC9B0"/>
-                </a:solidFill>
-                <a:latin typeface="Menlo" panose="020B0609030804020204" pitchFamily="49" charset="0"/>
-              </a:rPr>
-              <a:t>Rectangle</a:t>
-            </a:r>
-            <a:r>
-              <a:rPr lang="en-US" sz="3000" dirty="0">
-                <a:solidFill>
-                  <a:srgbClr val="D4D4D4"/>
-                </a:solidFill>
-                <a:latin typeface="Menlo" panose="020B0609030804020204" pitchFamily="49" charset="0"/>
-              </a:rPr>
-              <a:t>();</a:t>
-            </a:r>
-          </a:p>
-          <a:p>
-            <a:r>
-              <a:rPr lang="en-US" sz="3000" dirty="0">
-                <a:solidFill>
-                  <a:schemeClr val="accent1">
-                    <a:lumMod val="75000"/>
-                  </a:schemeClr>
-                </a:solidFill>
-                <a:latin typeface="Menlo" panose="020B0609030804020204" pitchFamily="49" charset="0"/>
-              </a:rPr>
-              <a:t>shape</a:t>
-            </a:r>
-            <a:r>
-              <a:rPr lang="en-US" sz="3000" dirty="0">
-                <a:solidFill>
-                  <a:srgbClr val="D4D4D4"/>
-                </a:solidFill>
-                <a:latin typeface="Menlo" panose="020B0609030804020204" pitchFamily="49" charset="0"/>
-              </a:rPr>
-              <a:t>.</a:t>
-            </a:r>
-            <a:r>
-              <a:rPr lang="en-US" sz="3000" dirty="0">
-                <a:solidFill>
-                  <a:schemeClr val="accent1">
-                    <a:lumMod val="75000"/>
-                  </a:schemeClr>
-                </a:solidFill>
-                <a:latin typeface="Menlo" panose="020B0609030804020204" pitchFamily="49" charset="0"/>
-              </a:rPr>
-              <a:t>width</a:t>
-            </a:r>
-            <a:r>
-              <a:rPr lang="en-US" sz="3000" dirty="0">
-                <a:solidFill>
-                  <a:srgbClr val="D4D4D4"/>
-                </a:solidFill>
-                <a:latin typeface="Menlo" panose="020B0609030804020204" pitchFamily="49" charset="0"/>
-              </a:rPr>
-              <a:t> = </a:t>
-            </a:r>
-            <a:r>
-              <a:rPr lang="en-US" sz="3000" dirty="0">
-                <a:solidFill>
-                  <a:schemeClr val="accent2"/>
-                </a:solidFill>
-                <a:latin typeface="Menlo" panose="020B0609030804020204" pitchFamily="49" charset="0"/>
-              </a:rPr>
-              <a:t>100</a:t>
-            </a:r>
-            <a:r>
-              <a:rPr lang="en-US" sz="3000" dirty="0">
-                <a:solidFill>
-                  <a:srgbClr val="D4D4D4"/>
-                </a:solidFill>
-                <a:latin typeface="Menlo" panose="020B0609030804020204" pitchFamily="49" charset="0"/>
-              </a:rPr>
-              <a:t>;</a:t>
-            </a:r>
-          </a:p>
-          <a:p>
-            <a:r>
-              <a:rPr lang="en-US" sz="3000" dirty="0">
-                <a:solidFill>
-                  <a:schemeClr val="accent1">
-                    <a:lumMod val="75000"/>
-                  </a:schemeClr>
-                </a:solidFill>
-                <a:latin typeface="Menlo" panose="020B0609030804020204" pitchFamily="49" charset="0"/>
-              </a:rPr>
-              <a:t>shape</a:t>
-            </a:r>
-            <a:r>
-              <a:rPr lang="en-US" sz="3000" dirty="0">
-                <a:solidFill>
-                  <a:srgbClr val="D4D4D4"/>
-                </a:solidFill>
-                <a:latin typeface="Menlo" panose="020B0609030804020204" pitchFamily="49" charset="0"/>
-              </a:rPr>
-              <a:t>.</a:t>
-            </a:r>
-            <a:r>
-              <a:rPr lang="en-US" sz="3000" dirty="0">
-                <a:solidFill>
-                  <a:schemeClr val="accent1">
-                    <a:lumMod val="75000"/>
-                  </a:schemeClr>
-                </a:solidFill>
-                <a:latin typeface="Menlo" panose="020B0609030804020204" pitchFamily="49" charset="0"/>
-              </a:rPr>
-              <a:t>height</a:t>
-            </a:r>
-            <a:r>
-              <a:rPr lang="en-US" sz="3000" dirty="0">
-                <a:solidFill>
-                  <a:srgbClr val="D4D4D4"/>
-                </a:solidFill>
-                <a:latin typeface="Menlo" panose="020B0609030804020204" pitchFamily="49" charset="0"/>
-              </a:rPr>
-              <a:t> = </a:t>
-            </a:r>
-            <a:r>
-              <a:rPr lang="en-US" sz="3000" dirty="0">
-                <a:solidFill>
-                  <a:schemeClr val="accent2"/>
-                </a:solidFill>
-                <a:latin typeface="Menlo" panose="020B0609030804020204" pitchFamily="49" charset="0"/>
-              </a:rPr>
-              <a:t>100</a:t>
-            </a:r>
-            <a:r>
-              <a:rPr lang="en-US" sz="3000" dirty="0">
-                <a:solidFill>
-                  <a:srgbClr val="D4D4D4"/>
-                </a:solidFill>
-                <a:latin typeface="Menlo" panose="020B0609030804020204" pitchFamily="49" charset="0"/>
-              </a:rPr>
-              <a:t>;</a:t>
-            </a:r>
-            <a:endParaRPr lang="en-US" sz="3000" b="0" dirty="0">
-              <a:solidFill>
-                <a:srgbClr val="D4D4D4"/>
-              </a:solidFill>
-              <a:effectLst/>
-              <a:latin typeface="Menlo" panose="020B0609030804020204" pitchFamily="49" charset="0"/>
-            </a:endParaRPr>
+              </a:rPr>
+              <a:t>PART1</a:t>
+            </a:r>
+            <a:r>
+              <a:rPr lang="en-US" sz="6000" dirty="0">
+                <a:solidFill>
+                  <a:srgbClr val="0070C0"/>
+                </a:solidFill>
+              </a:rPr>
+              <a:t>  Getting started</a:t>
+            </a:r>
           </a:p>
         </p:txBody>
       </p:sp>
     </p:spTree>
     <p:extLst>
       <p:ext uri="{BB962C8B-B14F-4D97-AF65-F5344CB8AC3E}">
-        <p14:creationId xmlns:p14="http://schemas.microsoft.com/office/powerpoint/2010/main" val="1132534878"/>
+        <p14:creationId xmlns:p14="http://schemas.microsoft.com/office/powerpoint/2010/main" val="2085856702"/>
       </p:ext>
     </p:extLst>
   </p:cSld>

</xml_diff>